<commit_message>
Finished Act 1-4 reports
</commit_message>
<xml_diff>
--- a/03 PCA for Compression/Activity 3 - PCA for Compression.pptx
+++ b/03 PCA for Compression/Activity 3 - PCA for Compression.pptx
@@ -5,7 +5,7 @@
     <p:sldMasterId id="2147483660" r:id="rId1"/>
   </p:sldMasterIdLst>
   <p:notesMasterIdLst>
-    <p:notesMasterId r:id="rId16"/>
+    <p:notesMasterId r:id="rId15"/>
   </p:notesMasterIdLst>
   <p:sldIdLst>
     <p:sldId id="256" r:id="rId2"/>
@@ -21,7 +21,6 @@
     <p:sldId id="283" r:id="rId12"/>
     <p:sldId id="287" r:id="rId13"/>
     <p:sldId id="275" r:id="rId14"/>
-    <p:sldId id="286" r:id="rId15"/>
   </p:sldIdLst>
   <p:sldSz cx="9144000" cy="6858000" type="screen4x3"/>
   <p:notesSz cx="6858000" cy="9144000"/>
@@ -2786,7 +2785,7 @@
           <a:p>
             <a:fld id="{5C1B11F4-4A81-4A1F-8746-8659FC968F94}" type="datetimeFigureOut">
               <a:rPr lang="en-US" smtClean="0"/>
-              <a:t>6/5/2022</a:t>
+              <a:t>6/6/2022</a:t>
             </a:fld>
             <a:endParaRPr lang="en-US"/>
           </a:p>
@@ -3816,6 +3815,392 @@
 </file>
 
 <file path=ppt/slideLayouts/slideLayout10.xml><?xml version="1.0" encoding="utf-8"?>
+<p:sldLayout xmlns:a="http://schemas.openxmlformats.org/drawingml/2006/main" xmlns:r="http://schemas.openxmlformats.org/officeDocument/2006/relationships" xmlns:p="http://schemas.openxmlformats.org/presentationml/2006/main" type="blank" preserve="1">
+  <p:cSld name="Blank">
+    <p:spTree>
+      <p:nvGrpSpPr>
+        <p:cNvPr id="1" name=""/>
+        <p:cNvGrpSpPr/>
+        <p:nvPr/>
+      </p:nvGrpSpPr>
+      <p:grpSpPr>
+        <a:xfrm>
+          <a:off x="0" y="0"/>
+          <a:ext cx="0" cy="0"/>
+          <a:chOff x="0" y="0"/>
+          <a:chExt cx="0" cy="0"/>
+        </a:xfrm>
+      </p:grpSpPr>
+      <p:sp>
+        <p:nvSpPr>
+          <p:cNvPr id="2" name="Date Placeholder 1"/>
+          <p:cNvSpPr>
+            <a:spLocks noGrp="1"/>
+          </p:cNvSpPr>
+          <p:nvPr>
+            <p:ph type="dt" sz="half" idx="10"/>
+          </p:nvPr>
+        </p:nvSpPr>
+        <p:spPr>
+          <a:xfrm>
+            <a:off x="628650" y="6356351"/>
+            <a:ext cx="2057400" cy="365125"/>
+          </a:xfrm>
+          <a:prstGeom prst="rect">
+            <a:avLst/>
+          </a:prstGeom>
+        </p:spPr>
+        <p:txBody>
+          <a:bodyPr/>
+          <a:lstStyle/>
+          <a:p>
+            <a:endParaRPr lang="en-US"/>
+          </a:p>
+        </p:txBody>
+      </p:sp>
+      <p:sp>
+        <p:nvSpPr>
+          <p:cNvPr id="3" name="Footer Placeholder 2"/>
+          <p:cNvSpPr>
+            <a:spLocks noGrp="1"/>
+          </p:cNvSpPr>
+          <p:nvPr>
+            <p:ph type="ftr" sz="quarter" idx="11"/>
+          </p:nvPr>
+        </p:nvSpPr>
+        <p:spPr/>
+        <p:txBody>
+          <a:bodyPr/>
+          <a:lstStyle/>
+          <a:p>
+            <a:r>
+              <a:rPr lang="en-US"/>
+              <a:t>Physics 301 - Advanced Signal and Image Processing</a:t>
+            </a:r>
+          </a:p>
+        </p:txBody>
+      </p:sp>
+      <p:sp>
+        <p:nvSpPr>
+          <p:cNvPr id="4" name="Slide Number Placeholder 3"/>
+          <p:cNvSpPr>
+            <a:spLocks noGrp="1"/>
+          </p:cNvSpPr>
+          <p:nvPr>
+            <p:ph type="sldNum" sz="quarter" idx="12"/>
+          </p:nvPr>
+        </p:nvSpPr>
+        <p:spPr/>
+        <p:txBody>
+          <a:bodyPr/>
+          <a:lstStyle/>
+          <a:p>
+            <a:fld id="{8262CFD8-7A98-47E6-A2CC-B17DDA24BA0E}" type="slidenum">
+              <a:rPr lang="en-US" smtClean="0"/>
+              <a:t>‹#›</a:t>
+            </a:fld>
+            <a:endParaRPr lang="en-US"/>
+          </a:p>
+        </p:txBody>
+      </p:sp>
+    </p:spTree>
+    <p:extLst>
+      <p:ext uri="{BB962C8B-B14F-4D97-AF65-F5344CB8AC3E}">
+        <p14:creationId xmlns:p14="http://schemas.microsoft.com/office/powerpoint/2010/main" val="3604995932"/>
+      </p:ext>
+    </p:extLst>
+  </p:cSld>
+  <p:clrMapOvr>
+    <a:masterClrMapping/>
+  </p:clrMapOvr>
+</p:sldLayout>
+</file>
+
+<file path=ppt/slideLayouts/slideLayout11.xml><?xml version="1.0" encoding="utf-8"?>
+<p:sldLayout xmlns:a="http://schemas.openxmlformats.org/drawingml/2006/main" xmlns:r="http://schemas.openxmlformats.org/officeDocument/2006/relationships" xmlns:p="http://schemas.openxmlformats.org/presentationml/2006/main" type="objTx" preserve="1">
+  <p:cSld name="Content with Caption">
+    <p:spTree>
+      <p:nvGrpSpPr>
+        <p:cNvPr id="1" name=""/>
+        <p:cNvGrpSpPr/>
+        <p:nvPr/>
+      </p:nvGrpSpPr>
+      <p:grpSpPr>
+        <a:xfrm>
+          <a:off x="0" y="0"/>
+          <a:ext cx="0" cy="0"/>
+          <a:chOff x="0" y="0"/>
+          <a:chExt cx="0" cy="0"/>
+        </a:xfrm>
+      </p:grpSpPr>
+      <p:sp>
+        <p:nvSpPr>
+          <p:cNvPr id="2" name="Title 1"/>
+          <p:cNvSpPr>
+            <a:spLocks noGrp="1"/>
+          </p:cNvSpPr>
+          <p:nvPr>
+            <p:ph type="title"/>
+          </p:nvPr>
+        </p:nvSpPr>
+        <p:spPr>
+          <a:xfrm>
+            <a:off x="629841" y="457200"/>
+            <a:ext cx="2949178" cy="1600200"/>
+          </a:xfrm>
+        </p:spPr>
+        <p:txBody>
+          <a:bodyPr anchor="b"/>
+          <a:lstStyle>
+            <a:lvl1pPr>
+              <a:defRPr sz="3200"/>
+            </a:lvl1pPr>
+          </a:lstStyle>
+          <a:p>
+            <a:r>
+              <a:rPr lang="en-US"/>
+              <a:t>Click to edit Master title style</a:t>
+            </a:r>
+            <a:endParaRPr lang="en-US" dirty="0"/>
+          </a:p>
+        </p:txBody>
+      </p:sp>
+      <p:sp>
+        <p:nvSpPr>
+          <p:cNvPr id="3" name="Content Placeholder 2"/>
+          <p:cNvSpPr>
+            <a:spLocks noGrp="1"/>
+          </p:cNvSpPr>
+          <p:nvPr>
+            <p:ph idx="1"/>
+          </p:nvPr>
+        </p:nvSpPr>
+        <p:spPr>
+          <a:xfrm>
+            <a:off x="3887391" y="987426"/>
+            <a:ext cx="4629150" cy="4873625"/>
+          </a:xfrm>
+        </p:spPr>
+        <p:txBody>
+          <a:bodyPr/>
+          <a:lstStyle>
+            <a:lvl1pPr>
+              <a:defRPr sz="3200"/>
+            </a:lvl1pPr>
+            <a:lvl2pPr>
+              <a:defRPr sz="2800"/>
+            </a:lvl2pPr>
+            <a:lvl3pPr>
+              <a:defRPr sz="2400"/>
+            </a:lvl3pPr>
+            <a:lvl4pPr>
+              <a:defRPr sz="2000"/>
+            </a:lvl4pPr>
+            <a:lvl5pPr>
+              <a:defRPr sz="2000"/>
+            </a:lvl5pPr>
+            <a:lvl6pPr>
+              <a:defRPr sz="2000"/>
+            </a:lvl6pPr>
+            <a:lvl7pPr>
+              <a:defRPr sz="2000"/>
+            </a:lvl7pPr>
+            <a:lvl8pPr>
+              <a:defRPr sz="2000"/>
+            </a:lvl8pPr>
+            <a:lvl9pPr>
+              <a:defRPr sz="2000"/>
+            </a:lvl9pPr>
+          </a:lstStyle>
+          <a:p>
+            <a:pPr lvl="0"/>
+            <a:r>
+              <a:rPr lang="en-US"/>
+              <a:t>Click to edit Master text styles</a:t>
+            </a:r>
+          </a:p>
+          <a:p>
+            <a:pPr lvl="1"/>
+            <a:r>
+              <a:rPr lang="en-US"/>
+              <a:t>Second level</a:t>
+            </a:r>
+          </a:p>
+          <a:p>
+            <a:pPr lvl="2"/>
+            <a:r>
+              <a:rPr lang="en-US"/>
+              <a:t>Third level</a:t>
+            </a:r>
+          </a:p>
+          <a:p>
+            <a:pPr lvl="3"/>
+            <a:r>
+              <a:rPr lang="en-US"/>
+              <a:t>Fourth level</a:t>
+            </a:r>
+          </a:p>
+          <a:p>
+            <a:pPr lvl="4"/>
+            <a:r>
+              <a:rPr lang="en-US"/>
+              <a:t>Fifth level</a:t>
+            </a:r>
+            <a:endParaRPr lang="en-US" dirty="0"/>
+          </a:p>
+        </p:txBody>
+      </p:sp>
+      <p:sp>
+        <p:nvSpPr>
+          <p:cNvPr id="4" name="Text Placeholder 3"/>
+          <p:cNvSpPr>
+            <a:spLocks noGrp="1"/>
+          </p:cNvSpPr>
+          <p:nvPr>
+            <p:ph type="body" sz="half" idx="2"/>
+          </p:nvPr>
+        </p:nvSpPr>
+        <p:spPr>
+          <a:xfrm>
+            <a:off x="629841" y="2057400"/>
+            <a:ext cx="2949178" cy="3811588"/>
+          </a:xfrm>
+        </p:spPr>
+        <p:txBody>
+          <a:bodyPr/>
+          <a:lstStyle>
+            <a:lvl1pPr marL="0" indent="0">
+              <a:buNone/>
+              <a:defRPr sz="1600"/>
+            </a:lvl1pPr>
+            <a:lvl2pPr marL="457200" indent="0">
+              <a:buNone/>
+              <a:defRPr sz="1400"/>
+            </a:lvl2pPr>
+            <a:lvl3pPr marL="914400" indent="0">
+              <a:buNone/>
+              <a:defRPr sz="1200"/>
+            </a:lvl3pPr>
+            <a:lvl4pPr marL="1371600" indent="0">
+              <a:buNone/>
+              <a:defRPr sz="1000"/>
+            </a:lvl4pPr>
+            <a:lvl5pPr marL="1828800" indent="0">
+              <a:buNone/>
+              <a:defRPr sz="1000"/>
+            </a:lvl5pPr>
+            <a:lvl6pPr marL="2286000" indent="0">
+              <a:buNone/>
+              <a:defRPr sz="1000"/>
+            </a:lvl6pPr>
+            <a:lvl7pPr marL="2743200" indent="0">
+              <a:buNone/>
+              <a:defRPr sz="1000"/>
+            </a:lvl7pPr>
+            <a:lvl8pPr marL="3200400" indent="0">
+              <a:buNone/>
+              <a:defRPr sz="1000"/>
+            </a:lvl8pPr>
+            <a:lvl9pPr marL="3657600" indent="0">
+              <a:buNone/>
+              <a:defRPr sz="1000"/>
+            </a:lvl9pPr>
+          </a:lstStyle>
+          <a:p>
+            <a:pPr lvl="0"/>
+            <a:r>
+              <a:rPr lang="en-US"/>
+              <a:t>Click to edit Master text styles</a:t>
+            </a:r>
+          </a:p>
+        </p:txBody>
+      </p:sp>
+      <p:sp>
+        <p:nvSpPr>
+          <p:cNvPr id="5" name="Date Placeholder 4"/>
+          <p:cNvSpPr>
+            <a:spLocks noGrp="1"/>
+          </p:cNvSpPr>
+          <p:nvPr>
+            <p:ph type="dt" sz="half" idx="10"/>
+          </p:nvPr>
+        </p:nvSpPr>
+        <p:spPr>
+          <a:xfrm>
+            <a:off x="628650" y="6356351"/>
+            <a:ext cx="2057400" cy="365125"/>
+          </a:xfrm>
+          <a:prstGeom prst="rect">
+            <a:avLst/>
+          </a:prstGeom>
+        </p:spPr>
+        <p:txBody>
+          <a:bodyPr/>
+          <a:lstStyle/>
+          <a:p>
+            <a:endParaRPr lang="en-US"/>
+          </a:p>
+        </p:txBody>
+      </p:sp>
+      <p:sp>
+        <p:nvSpPr>
+          <p:cNvPr id="6" name="Footer Placeholder 5"/>
+          <p:cNvSpPr>
+            <a:spLocks noGrp="1"/>
+          </p:cNvSpPr>
+          <p:nvPr>
+            <p:ph type="ftr" sz="quarter" idx="11"/>
+          </p:nvPr>
+        </p:nvSpPr>
+        <p:spPr/>
+        <p:txBody>
+          <a:bodyPr/>
+          <a:lstStyle/>
+          <a:p>
+            <a:r>
+              <a:rPr lang="en-US"/>
+              <a:t>Physics 301 - Advanced Signal and Image Processing</a:t>
+            </a:r>
+          </a:p>
+        </p:txBody>
+      </p:sp>
+      <p:sp>
+        <p:nvSpPr>
+          <p:cNvPr id="7" name="Slide Number Placeholder 6"/>
+          <p:cNvSpPr>
+            <a:spLocks noGrp="1"/>
+          </p:cNvSpPr>
+          <p:nvPr>
+            <p:ph type="sldNum" sz="quarter" idx="12"/>
+          </p:nvPr>
+        </p:nvSpPr>
+        <p:spPr/>
+        <p:txBody>
+          <a:bodyPr/>
+          <a:lstStyle/>
+          <a:p>
+            <a:fld id="{8262CFD8-7A98-47E6-A2CC-B17DDA24BA0E}" type="slidenum">
+              <a:rPr lang="en-US" smtClean="0"/>
+              <a:t>‹#›</a:t>
+            </a:fld>
+            <a:endParaRPr lang="en-US"/>
+          </a:p>
+        </p:txBody>
+      </p:sp>
+    </p:spTree>
+    <p:extLst>
+      <p:ext uri="{BB962C8B-B14F-4D97-AF65-F5344CB8AC3E}">
+        <p14:creationId xmlns:p14="http://schemas.microsoft.com/office/powerpoint/2010/main" val="4138949225"/>
+      </p:ext>
+    </p:extLst>
+  </p:cSld>
+  <p:clrMapOvr>
+    <a:masterClrMapping/>
+  </p:clrMapOvr>
+</p:sldLayout>
+</file>
+
+<file path=ppt/slideLayouts/slideLayout12.xml><?xml version="1.0" encoding="utf-8"?>
 <p:sldLayout xmlns:a="http://schemas.openxmlformats.org/drawingml/2006/main" xmlns:r="http://schemas.openxmlformats.org/officeDocument/2006/relationships" xmlns:p="http://schemas.openxmlformats.org/presentationml/2006/main" type="picTx" preserve="1">
   <p:cSld name="Picture with Caption">
     <p:spTree>
@@ -4079,7 +4464,7 @@
 </p:sldLayout>
 </file>
 
-<file path=ppt/slideLayouts/slideLayout11.xml><?xml version="1.0" encoding="utf-8"?>
+<file path=ppt/slideLayouts/slideLayout13.xml><?xml version="1.0" encoding="utf-8"?>
 <p:sldLayout xmlns:a="http://schemas.openxmlformats.org/drawingml/2006/main" xmlns:r="http://schemas.openxmlformats.org/officeDocument/2006/relationships" xmlns:p="http://schemas.openxmlformats.org/presentationml/2006/main" type="vertTx" preserve="1">
   <p:cSld name="Title and Vertical Text">
     <p:spTree>
@@ -4256,7 +4641,7 @@
 </p:sldLayout>
 </file>
 
-<file path=ppt/slideLayouts/slideLayout12.xml><?xml version="1.0" encoding="utf-8"?>
+<file path=ppt/slideLayouts/slideLayout14.xml><?xml version="1.0" encoding="utf-8"?>
 <p:sldLayout xmlns:a="http://schemas.openxmlformats.org/drawingml/2006/main" xmlns:r="http://schemas.openxmlformats.org/officeDocument/2006/relationships" xmlns:p="http://schemas.openxmlformats.org/presentationml/2006/main" type="vertTitleAndTx" preserve="1">
   <p:cSld name="Vertical Title and Text">
     <p:spTree>
@@ -5514,6 +5899,2387 @@
 </file>
 
 <file path=ppt/slideLayouts/slideLayout3.xml><?xml version="1.0" encoding="utf-8"?>
+<p:sldLayout xmlns:a="http://schemas.openxmlformats.org/drawingml/2006/main" xmlns:r="http://schemas.openxmlformats.org/officeDocument/2006/relationships" xmlns:p="http://schemas.openxmlformats.org/presentationml/2006/main" matchingName="Title and Content" preserve="1" userDrawn="1">
+  <p:cSld name="1_Title and Content">
+    <p:bg>
+      <p:bgPr>
+        <a:solidFill>
+          <a:schemeClr val="bg1"/>
+        </a:solidFill>
+        <a:effectLst/>
+      </p:bgPr>
+    </p:bg>
+    <p:spTree>
+      <p:nvGrpSpPr>
+        <p:cNvPr id="1" name="Shape 27"/>
+        <p:cNvGrpSpPr/>
+        <p:nvPr/>
+      </p:nvGrpSpPr>
+      <p:grpSpPr>
+        <a:xfrm>
+          <a:off x="0" y="0"/>
+          <a:ext cx="0" cy="0"/>
+          <a:chOff x="0" y="0"/>
+          <a:chExt cx="0" cy="0"/>
+        </a:xfrm>
+      </p:grpSpPr>
+      <p:sp>
+        <p:nvSpPr>
+          <p:cNvPr id="25" name="Google Shape;29;p31">
+            <a:extLst>
+              <a:ext uri="{FF2B5EF4-FFF2-40B4-BE49-F238E27FC236}">
+                <a16:creationId xmlns:a16="http://schemas.microsoft.com/office/drawing/2014/main" id="{D933B60E-9596-75BF-40EF-1D954957F451}"/>
+              </a:ext>
+            </a:extLst>
+          </p:cNvPr>
+          <p:cNvSpPr txBox="1">
+            <a:spLocks noGrp="1"/>
+          </p:cNvSpPr>
+          <p:nvPr>
+            <p:ph type="body" idx="1" hasCustomPrompt="1"/>
+          </p:nvPr>
+        </p:nvSpPr>
+        <p:spPr>
+          <a:xfrm>
+            <a:off x="628649" y="949242"/>
+            <a:ext cx="8058151" cy="1177612"/>
+          </a:xfrm>
+          <a:prstGeom prst="rect">
+            <a:avLst/>
+          </a:prstGeom>
+          <a:noFill/>
+          <a:ln>
+            <a:noFill/>
+          </a:ln>
+        </p:spPr>
+        <p:txBody>
+          <a:bodyPr spcFirstLastPara="1" wrap="square" lIns="91425" tIns="45700" rIns="91425" bIns="45700" anchor="t" anchorCtr="0">
+            <a:normAutofit/>
+          </a:bodyPr>
+          <a:lstStyle>
+            <a:lvl1pPr marL="312896" lvl="0" indent="-214313" algn="l">
+              <a:spcBef>
+                <a:spcPts val="600"/>
+              </a:spcBef>
+              <a:spcAft>
+                <a:spcPts val="600"/>
+              </a:spcAft>
+              <a:buClr>
+                <a:srgbClr val="1D3354"/>
+              </a:buClr>
+              <a:buSzPct val="100000"/>
+              <a:buFont typeface="Wingdings" panose="05000000000000000000" pitchFamily="2" charset="2"/>
+              <a:buChar char="§"/>
+              <a:defRPr sz="2000" spc="0">
+                <a:solidFill>
+                  <a:schemeClr val="tx1"/>
+                </a:solidFill>
+                <a:effectLst/>
+                <a:latin typeface="Bahnschrift Light" panose="020B0502040204020203" pitchFamily="34" charset="0"/>
+                <a:ea typeface="Verdana" panose="020B0604030504040204" pitchFamily="34" charset="0"/>
+                <a:cs typeface="Helvetica" panose="020B0604020202020204" pitchFamily="34" charset="0"/>
+              </a:defRPr>
+            </a:lvl1pPr>
+            <a:lvl2pPr marL="784384" lvl="1" indent="-342900" algn="l">
+              <a:spcBef>
+                <a:spcPts val="600"/>
+              </a:spcBef>
+              <a:spcAft>
+                <a:spcPts val="600"/>
+              </a:spcAft>
+              <a:buClr>
+                <a:srgbClr val="AF0E3F"/>
+              </a:buClr>
+              <a:buSzPct val="140000"/>
+              <a:buFont typeface="Wingdings" panose="05000000000000000000" pitchFamily="2" charset="2"/>
+              <a:buChar char="§"/>
+              <a:defRPr sz="2100">
+                <a:solidFill>
+                  <a:srgbClr val="FF6464"/>
+                </a:solidFill>
+              </a:defRPr>
+            </a:lvl2pPr>
+            <a:lvl3pPr marL="1122998" lvl="2" indent="-342900" algn="l">
+              <a:spcBef>
+                <a:spcPts val="600"/>
+              </a:spcBef>
+              <a:spcAft>
+                <a:spcPts val="600"/>
+              </a:spcAft>
+              <a:buClr>
+                <a:srgbClr val="AF0E3F"/>
+              </a:buClr>
+              <a:buSzPct val="140000"/>
+              <a:buFont typeface="Wingdings" panose="05000000000000000000" pitchFamily="2" charset="2"/>
+              <a:buChar char="§"/>
+              <a:defRPr sz="2100"/>
+            </a:lvl3pPr>
+            <a:lvl4pPr marL="1457325" lvl="3" indent="-342900" algn="l">
+              <a:spcBef>
+                <a:spcPts val="600"/>
+              </a:spcBef>
+              <a:spcAft>
+                <a:spcPts val="600"/>
+              </a:spcAft>
+              <a:buClr>
+                <a:srgbClr val="AF0E3F"/>
+              </a:buClr>
+              <a:buSzPct val="140000"/>
+              <a:buFont typeface="Wingdings" panose="05000000000000000000" pitchFamily="2" charset="2"/>
+              <a:buChar char="§"/>
+              <a:defRPr sz="2100" b="1"/>
+            </a:lvl4pPr>
+            <a:lvl5pPr marL="1800225" lvl="4" indent="-342900" algn="l">
+              <a:spcBef>
+                <a:spcPts val="600"/>
+              </a:spcBef>
+              <a:spcAft>
+                <a:spcPts val="600"/>
+              </a:spcAft>
+              <a:buClr>
+                <a:srgbClr val="AF0E3F"/>
+              </a:buClr>
+              <a:buSzPct val="140000"/>
+              <a:buFont typeface="Wingdings" panose="05000000000000000000" pitchFamily="2" charset="2"/>
+              <a:buChar char="§"/>
+              <a:defRPr sz="2100" i="1">
+                <a:solidFill>
+                  <a:srgbClr val="C00000"/>
+                </a:solidFill>
+              </a:defRPr>
+            </a:lvl5pPr>
+            <a:lvl6pPr marL="1800225" lvl="5" indent="0" algn="l">
+              <a:spcBef>
+                <a:spcPts val="600"/>
+              </a:spcBef>
+              <a:spcAft>
+                <a:spcPts val="600"/>
+              </a:spcAft>
+              <a:buClr>
+                <a:srgbClr val="AF0E3F"/>
+              </a:buClr>
+              <a:buSzPct val="140000"/>
+              <a:buFont typeface="Wingdings" panose="05000000000000000000" pitchFamily="2" charset="2"/>
+              <a:buNone/>
+              <a:defRPr sz="2100"/>
+            </a:lvl6pPr>
+            <a:lvl7pPr marL="2400300" lvl="6" indent="-257175" algn="l">
+              <a:spcBef>
+                <a:spcPts val="270"/>
+              </a:spcBef>
+              <a:spcAft>
+                <a:spcPts val="0"/>
+              </a:spcAft>
+              <a:buSzPts val="1800"/>
+              <a:buChar char="•"/>
+              <a:defRPr/>
+            </a:lvl7pPr>
+            <a:lvl8pPr marL="2743200" lvl="7" indent="-257175" algn="l">
+              <a:spcBef>
+                <a:spcPts val="270"/>
+              </a:spcBef>
+              <a:spcAft>
+                <a:spcPts val="0"/>
+              </a:spcAft>
+              <a:buSzPts val="1800"/>
+              <a:buChar char="•"/>
+              <a:defRPr/>
+            </a:lvl8pPr>
+            <a:lvl9pPr marL="3086100" lvl="8" indent="-257175" algn="l">
+              <a:spcBef>
+                <a:spcPts val="270"/>
+              </a:spcBef>
+              <a:spcAft>
+                <a:spcPts val="0"/>
+              </a:spcAft>
+              <a:buSzPts val="1800"/>
+              <a:buChar char="•"/>
+              <a:defRPr/>
+            </a:lvl9pPr>
+          </a:lstStyle>
+          <a:p>
+            <a:r>
+              <a:rPr lang="en-PH" dirty="0"/>
+              <a:t>Sample text</a:t>
+            </a:r>
+          </a:p>
+        </p:txBody>
+      </p:sp>
+      <p:sp>
+        <p:nvSpPr>
+          <p:cNvPr id="27" name="Google Shape;28;p31">
+            <a:extLst>
+              <a:ext uri="{FF2B5EF4-FFF2-40B4-BE49-F238E27FC236}">
+                <a16:creationId xmlns:a16="http://schemas.microsoft.com/office/drawing/2014/main" id="{F9EBFDC1-A551-FD54-3832-55F976F86CE4}"/>
+              </a:ext>
+            </a:extLst>
+          </p:cNvPr>
+          <p:cNvSpPr txBox="1">
+            <a:spLocks noGrp="1"/>
+          </p:cNvSpPr>
+          <p:nvPr>
+            <p:ph type="title" hasCustomPrompt="1"/>
+          </p:nvPr>
+        </p:nvSpPr>
+        <p:spPr>
+          <a:xfrm>
+            <a:off x="457200" y="187697"/>
+            <a:ext cx="8229600" cy="619827"/>
+          </a:xfrm>
+          <a:prstGeom prst="rect">
+            <a:avLst/>
+          </a:prstGeom>
+          <a:noFill/>
+          <a:ln>
+            <a:noFill/>
+          </a:ln>
+        </p:spPr>
+        <p:txBody>
+          <a:bodyPr spcFirstLastPara="1" wrap="square" lIns="91425" tIns="45700" rIns="91425" bIns="45700" anchor="ctr" anchorCtr="0">
+            <a:noAutofit/>
+          </a:bodyPr>
+          <a:lstStyle>
+            <a:lvl1pPr lvl="0" algn="l">
+              <a:spcBef>
+                <a:spcPts val="0"/>
+              </a:spcBef>
+              <a:spcAft>
+                <a:spcPts val="0"/>
+              </a:spcAft>
+              <a:buClr>
+                <a:srgbClr val="C00000"/>
+              </a:buClr>
+              <a:buSzPts val="1800"/>
+              <a:buNone/>
+              <a:defRPr sz="6000" b="1">
+                <a:ln w="0">
+                  <a:noFill/>
+                </a:ln>
+                <a:solidFill>
+                  <a:srgbClr val="467599"/>
+                </a:solidFill>
+                <a:effectLst>
+                  <a:outerShdw dist="38100" dir="8100000" algn="tr" rotWithShape="0">
+                    <a:srgbClr val="D64045"/>
+                  </a:outerShdw>
+                </a:effectLst>
+                <a:latin typeface="Bahnschrift Condensed" panose="020B0502040204020203" pitchFamily="34" charset="0"/>
+                <a:cs typeface="Helvetica" panose="020B0604020202020204" pitchFamily="34" charset="0"/>
+              </a:defRPr>
+            </a:lvl1pPr>
+            <a:lvl2pPr lvl="1">
+              <a:spcBef>
+                <a:spcPts val="0"/>
+              </a:spcBef>
+              <a:spcAft>
+                <a:spcPts val="0"/>
+              </a:spcAft>
+              <a:buSzPts val="1400"/>
+              <a:buNone/>
+              <a:defRPr/>
+            </a:lvl2pPr>
+            <a:lvl3pPr lvl="2">
+              <a:spcBef>
+                <a:spcPts val="0"/>
+              </a:spcBef>
+              <a:spcAft>
+                <a:spcPts val="0"/>
+              </a:spcAft>
+              <a:buSzPts val="1400"/>
+              <a:buNone/>
+              <a:defRPr/>
+            </a:lvl3pPr>
+            <a:lvl4pPr lvl="3">
+              <a:spcBef>
+                <a:spcPts val="0"/>
+              </a:spcBef>
+              <a:spcAft>
+                <a:spcPts val="0"/>
+              </a:spcAft>
+              <a:buSzPts val="1400"/>
+              <a:buNone/>
+              <a:defRPr/>
+            </a:lvl4pPr>
+            <a:lvl5pPr lvl="4">
+              <a:spcBef>
+                <a:spcPts val="0"/>
+              </a:spcBef>
+              <a:spcAft>
+                <a:spcPts val="0"/>
+              </a:spcAft>
+              <a:buSzPts val="1400"/>
+              <a:buNone/>
+              <a:defRPr/>
+            </a:lvl5pPr>
+            <a:lvl6pPr lvl="5">
+              <a:spcBef>
+                <a:spcPts val="0"/>
+              </a:spcBef>
+              <a:spcAft>
+                <a:spcPts val="0"/>
+              </a:spcAft>
+              <a:buSzPts val="1400"/>
+              <a:buNone/>
+              <a:defRPr/>
+            </a:lvl6pPr>
+            <a:lvl7pPr lvl="6">
+              <a:spcBef>
+                <a:spcPts val="0"/>
+              </a:spcBef>
+              <a:spcAft>
+                <a:spcPts val="0"/>
+              </a:spcAft>
+              <a:buSzPts val="1400"/>
+              <a:buNone/>
+              <a:defRPr/>
+            </a:lvl7pPr>
+            <a:lvl8pPr lvl="7">
+              <a:spcBef>
+                <a:spcPts val="0"/>
+              </a:spcBef>
+              <a:spcAft>
+                <a:spcPts val="0"/>
+              </a:spcAft>
+              <a:buSzPts val="1400"/>
+              <a:buNone/>
+              <a:defRPr/>
+            </a:lvl8pPr>
+            <a:lvl9pPr lvl="8">
+              <a:spcBef>
+                <a:spcPts val="0"/>
+              </a:spcBef>
+              <a:spcAft>
+                <a:spcPts val="0"/>
+              </a:spcAft>
+              <a:buSzPts val="1400"/>
+              <a:buNone/>
+              <a:defRPr/>
+            </a:lvl9pPr>
+          </a:lstStyle>
+          <a:p>
+            <a:r>
+              <a:rPr lang="en-US" dirty="0"/>
+              <a:t>	 objectives</a:t>
+            </a:r>
+            <a:endParaRPr dirty="0"/>
+          </a:p>
+        </p:txBody>
+      </p:sp>
+      <p:pic>
+        <p:nvPicPr>
+          <p:cNvPr id="42" name="Graphic 41" descr="A puzzle">
+            <a:extLst>
+              <a:ext uri="{FF2B5EF4-FFF2-40B4-BE49-F238E27FC236}">
+                <a16:creationId xmlns:a16="http://schemas.microsoft.com/office/drawing/2014/main" id="{7B11378C-27AA-1673-7712-BDE19253E1E5}"/>
+              </a:ext>
+            </a:extLst>
+          </p:cNvPr>
+          <p:cNvPicPr>
+            <a:picLocks noChangeAspect="1"/>
+          </p:cNvPicPr>
+          <p:nvPr userDrawn="1"/>
+        </p:nvPicPr>
+        <p:blipFill>
+          <a:blip r:embed="rId2">
+            <a:extLst>
+              <a:ext uri="{28A0092B-C50C-407E-A947-70E740481C1C}">
+                <a14:useLocalDpi xmlns:a14="http://schemas.microsoft.com/office/drawing/2010/main" val="0"/>
+              </a:ext>
+              <a:ext uri="{96DAC541-7B7A-43D3-8B79-37D633B846F1}">
+                <asvg:svgBlip xmlns:asvg="http://schemas.microsoft.com/office/drawing/2016/SVG/main" r:embed="rId3"/>
+              </a:ext>
+            </a:extLst>
+          </a:blip>
+          <a:stretch>
+            <a:fillRect/>
+          </a:stretch>
+        </p:blipFill>
+        <p:spPr>
+          <a:xfrm>
+            <a:off x="28279" y="-242655"/>
+            <a:ext cx="1939156" cy="1939156"/>
+          </a:xfrm>
+          <a:prstGeom prst="rect">
+            <a:avLst/>
+          </a:prstGeom>
+          <a:effectLst>
+            <a:outerShdw dist="25400" dir="8100000" algn="tr" rotWithShape="0">
+              <a:srgbClr val="D64045"/>
+            </a:outerShdw>
+          </a:effectLst>
+        </p:spPr>
+      </p:pic>
+      <p:sp>
+        <p:nvSpPr>
+          <p:cNvPr id="10" name="Footer Placeholder 4">
+            <a:extLst>
+              <a:ext uri="{FF2B5EF4-FFF2-40B4-BE49-F238E27FC236}">
+                <a16:creationId xmlns:a16="http://schemas.microsoft.com/office/drawing/2014/main" id="{0C0EA192-0932-FEAE-9E17-3AF1158A6950}"/>
+              </a:ext>
+            </a:extLst>
+          </p:cNvPr>
+          <p:cNvSpPr>
+            <a:spLocks noGrp="1"/>
+          </p:cNvSpPr>
+          <p:nvPr>
+            <p:ph type="ftr" sz="quarter" idx="3"/>
+          </p:nvPr>
+        </p:nvSpPr>
+        <p:spPr>
+          <a:xfrm>
+            <a:off x="628649" y="6356351"/>
+            <a:ext cx="6818525" cy="365125"/>
+          </a:xfrm>
+          <a:prstGeom prst="rect">
+            <a:avLst/>
+          </a:prstGeom>
+        </p:spPr>
+        <p:txBody>
+          <a:bodyPr vert="horz" lIns="91440" tIns="45720" rIns="91440" bIns="45720" rtlCol="0" anchor="ctr"/>
+          <a:lstStyle>
+            <a:lvl1pPr algn="l">
+              <a:defRPr sz="1800" spc="300">
+                <a:solidFill>
+                  <a:srgbClr val="D64045"/>
+                </a:solidFill>
+                <a:latin typeface="Bahnschrift Condensed" panose="020B0502040204020203" pitchFamily="34" charset="0"/>
+              </a:defRPr>
+            </a:lvl1pPr>
+          </a:lstStyle>
+          <a:p>
+            <a:r>
+              <a:rPr lang="en-US"/>
+              <a:t>Physics 301 - Advanced Signal and Image Processing</a:t>
+            </a:r>
+            <a:endParaRPr lang="en-US" dirty="0"/>
+          </a:p>
+        </p:txBody>
+      </p:sp>
+      <p:sp>
+        <p:nvSpPr>
+          <p:cNvPr id="11" name="Slide Number Placeholder 5">
+            <a:extLst>
+              <a:ext uri="{FF2B5EF4-FFF2-40B4-BE49-F238E27FC236}">
+                <a16:creationId xmlns:a16="http://schemas.microsoft.com/office/drawing/2014/main" id="{5997149A-AE92-98E3-B00D-1C6E247F5246}"/>
+              </a:ext>
+            </a:extLst>
+          </p:cNvPr>
+          <p:cNvSpPr>
+            <a:spLocks noGrp="1"/>
+          </p:cNvSpPr>
+          <p:nvPr>
+            <p:ph type="sldNum" sz="quarter" idx="4"/>
+          </p:nvPr>
+        </p:nvSpPr>
+        <p:spPr>
+          <a:xfrm>
+            <a:off x="7588576" y="6356351"/>
+            <a:ext cx="926773" cy="365125"/>
+          </a:xfrm>
+          <a:prstGeom prst="rect">
+            <a:avLst/>
+          </a:prstGeom>
+        </p:spPr>
+        <p:txBody>
+          <a:bodyPr vert="horz" lIns="91440" tIns="45720" rIns="91440" bIns="45720" rtlCol="0" anchor="ctr"/>
+          <a:lstStyle>
+            <a:lvl1pPr algn="r">
+              <a:defRPr sz="1800" spc="300">
+                <a:solidFill>
+                  <a:srgbClr val="D64045"/>
+                </a:solidFill>
+                <a:latin typeface="Bahnschrift Condensed" panose="020B0502040204020203" pitchFamily="34" charset="0"/>
+              </a:defRPr>
+            </a:lvl1pPr>
+          </a:lstStyle>
+          <a:p>
+            <a:fld id="{8262CFD8-7A98-47E6-A2CC-B17DDA24BA0E}" type="slidenum">
+              <a:rPr lang="en-US" smtClean="0"/>
+              <a:pPr/>
+              <a:t>‹#›</a:t>
+            </a:fld>
+            <a:endParaRPr lang="en-US"/>
+          </a:p>
+        </p:txBody>
+      </p:sp>
+      <p:grpSp>
+        <p:nvGrpSpPr>
+          <p:cNvPr id="12" name="Group 11">
+            <a:extLst>
+              <a:ext uri="{FF2B5EF4-FFF2-40B4-BE49-F238E27FC236}">
+                <a16:creationId xmlns:a16="http://schemas.microsoft.com/office/drawing/2014/main" id="{A4693759-34FC-FBCE-ABBE-AA6FD7E86521}"/>
+              </a:ext>
+            </a:extLst>
+          </p:cNvPr>
+          <p:cNvGrpSpPr/>
+          <p:nvPr userDrawn="1"/>
+        </p:nvGrpSpPr>
+        <p:grpSpPr>
+          <a:xfrm>
+            <a:off x="457200" y="1946934"/>
+            <a:ext cx="5773918" cy="1143536"/>
+            <a:chOff x="457200" y="3429000"/>
+            <a:chExt cx="5773918" cy="1143536"/>
+          </a:xfrm>
+        </p:grpSpPr>
+        <p:sp>
+          <p:nvSpPr>
+            <p:cNvPr id="13" name="Google Shape;28;p31">
+              <a:extLst>
+                <a:ext uri="{FF2B5EF4-FFF2-40B4-BE49-F238E27FC236}">
+                  <a16:creationId xmlns:a16="http://schemas.microsoft.com/office/drawing/2014/main" id="{69155587-274E-3D4D-6FAB-37A2307CD7B0}"/>
+                </a:ext>
+              </a:extLst>
+            </p:cNvPr>
+            <p:cNvSpPr txBox="1">
+              <a:spLocks/>
+            </p:cNvSpPr>
+            <p:nvPr userDrawn="1"/>
+          </p:nvSpPr>
+          <p:spPr>
+            <a:xfrm>
+              <a:off x="457200" y="3791354"/>
+              <a:ext cx="5773918" cy="619827"/>
+            </a:xfrm>
+            <a:prstGeom prst="rect">
+              <a:avLst/>
+            </a:prstGeom>
+            <a:noFill/>
+            <a:ln>
+              <a:noFill/>
+            </a:ln>
+          </p:spPr>
+          <p:txBody>
+            <a:bodyPr spcFirstLastPara="1" wrap="square" lIns="91425" tIns="45700" rIns="91425" bIns="45700" anchor="ctr" anchorCtr="0">
+              <a:noAutofit/>
+            </a:bodyPr>
+            <a:lstStyle>
+              <a:defPPr marR="0" lvl="0" algn="l" rtl="0">
+                <a:lnSpc>
+                  <a:spcPct val="100000"/>
+                </a:lnSpc>
+                <a:spcBef>
+                  <a:spcPts val="0"/>
+                </a:spcBef>
+                <a:spcAft>
+                  <a:spcPts val="0"/>
+                </a:spcAft>
+              </a:defPPr>
+              <a:lvl1pPr marR="0" lvl="0" algn="l" rtl="0" eaLnBrk="1" hangingPunct="1">
+                <a:lnSpc>
+                  <a:spcPct val="100000"/>
+                </a:lnSpc>
+                <a:spcBef>
+                  <a:spcPts val="0"/>
+                </a:spcBef>
+                <a:spcAft>
+                  <a:spcPts val="0"/>
+                </a:spcAft>
+                <a:buClr>
+                  <a:srgbClr val="C00000"/>
+                </a:buClr>
+                <a:buSzPts val="1800"/>
+                <a:buFont typeface="Arial"/>
+                <a:buNone/>
+                <a:defRPr sz="6000" b="1" i="0" u="none" strike="noStrike" cap="none">
+                  <a:ln w="0">
+                    <a:noFill/>
+                  </a:ln>
+                  <a:solidFill>
+                    <a:srgbClr val="D64045"/>
+                  </a:solidFill>
+                  <a:effectLst>
+                    <a:outerShdw dist="38100" dir="8100000" algn="tr" rotWithShape="0">
+                      <a:srgbClr val="467599"/>
+                    </a:outerShdw>
+                  </a:effectLst>
+                  <a:latin typeface="Bahnschrift Condensed" panose="020B0502040204020203" pitchFamily="34" charset="0"/>
+                  <a:ea typeface="Verdana" panose="020B0604030504040204" pitchFamily="34" charset="0"/>
+                  <a:cs typeface="Helvetica" panose="020B0604020202020204" pitchFamily="34" charset="0"/>
+                  <a:sym typeface="Arial"/>
+                </a:defRPr>
+              </a:lvl1pPr>
+              <a:lvl2pPr marR="0" lvl="1" algn="l" rtl="0" eaLnBrk="1" hangingPunct="1">
+                <a:lnSpc>
+                  <a:spcPct val="100000"/>
+                </a:lnSpc>
+                <a:spcBef>
+                  <a:spcPts val="0"/>
+                </a:spcBef>
+                <a:spcAft>
+                  <a:spcPts val="0"/>
+                </a:spcAft>
+                <a:buClr>
+                  <a:srgbClr val="000000"/>
+                </a:buClr>
+                <a:buSzPts val="1400"/>
+                <a:buFont typeface="Arial"/>
+                <a:buNone/>
+                <a:defRPr sz="1050" b="0" i="0" u="none" strike="noStrike" cap="none">
+                  <a:solidFill>
+                    <a:srgbClr val="000000"/>
+                  </a:solidFill>
+                  <a:latin typeface="Arial"/>
+                  <a:ea typeface="Arial"/>
+                  <a:cs typeface="Arial"/>
+                  <a:sym typeface="Arial"/>
+                </a:defRPr>
+              </a:lvl2pPr>
+              <a:lvl3pPr marR="0" lvl="2" algn="l" rtl="0" eaLnBrk="1" hangingPunct="1">
+                <a:lnSpc>
+                  <a:spcPct val="100000"/>
+                </a:lnSpc>
+                <a:spcBef>
+                  <a:spcPts val="0"/>
+                </a:spcBef>
+                <a:spcAft>
+                  <a:spcPts val="0"/>
+                </a:spcAft>
+                <a:buClr>
+                  <a:srgbClr val="000000"/>
+                </a:buClr>
+                <a:buSzPts val="1400"/>
+                <a:buFont typeface="Arial"/>
+                <a:buNone/>
+                <a:defRPr sz="1050" b="0" i="0" u="none" strike="noStrike" cap="none">
+                  <a:solidFill>
+                    <a:srgbClr val="000000"/>
+                  </a:solidFill>
+                  <a:latin typeface="Arial"/>
+                  <a:ea typeface="Arial"/>
+                  <a:cs typeface="Arial"/>
+                  <a:sym typeface="Arial"/>
+                </a:defRPr>
+              </a:lvl3pPr>
+              <a:lvl4pPr marR="0" lvl="3" algn="l" rtl="0" eaLnBrk="1" hangingPunct="1">
+                <a:lnSpc>
+                  <a:spcPct val="100000"/>
+                </a:lnSpc>
+                <a:spcBef>
+                  <a:spcPts val="0"/>
+                </a:spcBef>
+                <a:spcAft>
+                  <a:spcPts val="0"/>
+                </a:spcAft>
+                <a:buClr>
+                  <a:srgbClr val="000000"/>
+                </a:buClr>
+                <a:buSzPts val="1400"/>
+                <a:buFont typeface="Arial"/>
+                <a:buNone/>
+                <a:defRPr sz="1050" b="0" i="0" u="none" strike="noStrike" cap="none">
+                  <a:solidFill>
+                    <a:srgbClr val="000000"/>
+                  </a:solidFill>
+                  <a:latin typeface="Arial"/>
+                  <a:ea typeface="Arial"/>
+                  <a:cs typeface="Arial"/>
+                  <a:sym typeface="Arial"/>
+                </a:defRPr>
+              </a:lvl4pPr>
+              <a:lvl5pPr marR="0" lvl="4" algn="l" rtl="0" eaLnBrk="1" hangingPunct="1">
+                <a:lnSpc>
+                  <a:spcPct val="100000"/>
+                </a:lnSpc>
+                <a:spcBef>
+                  <a:spcPts val="0"/>
+                </a:spcBef>
+                <a:spcAft>
+                  <a:spcPts val="0"/>
+                </a:spcAft>
+                <a:buClr>
+                  <a:srgbClr val="000000"/>
+                </a:buClr>
+                <a:buSzPts val="1400"/>
+                <a:buFont typeface="Arial"/>
+                <a:buNone/>
+                <a:defRPr sz="1050" b="0" i="0" u="none" strike="noStrike" cap="none">
+                  <a:solidFill>
+                    <a:srgbClr val="000000"/>
+                  </a:solidFill>
+                  <a:latin typeface="Arial"/>
+                  <a:ea typeface="Arial"/>
+                  <a:cs typeface="Arial"/>
+                  <a:sym typeface="Arial"/>
+                </a:defRPr>
+              </a:lvl5pPr>
+              <a:lvl6pPr marR="0" lvl="5" algn="l" rtl="0" eaLnBrk="1" hangingPunct="1">
+                <a:lnSpc>
+                  <a:spcPct val="100000"/>
+                </a:lnSpc>
+                <a:spcBef>
+                  <a:spcPts val="0"/>
+                </a:spcBef>
+                <a:spcAft>
+                  <a:spcPts val="0"/>
+                </a:spcAft>
+                <a:buClr>
+                  <a:srgbClr val="000000"/>
+                </a:buClr>
+                <a:buSzPts val="1400"/>
+                <a:buFont typeface="Arial"/>
+                <a:buNone/>
+                <a:defRPr sz="1050" b="0" i="0" u="none" strike="noStrike" cap="none">
+                  <a:solidFill>
+                    <a:srgbClr val="000000"/>
+                  </a:solidFill>
+                  <a:latin typeface="Arial"/>
+                  <a:ea typeface="Arial"/>
+                  <a:cs typeface="Arial"/>
+                  <a:sym typeface="Arial"/>
+                </a:defRPr>
+              </a:lvl6pPr>
+              <a:lvl7pPr marR="0" lvl="6" algn="l" rtl="0" eaLnBrk="1" hangingPunct="1">
+                <a:lnSpc>
+                  <a:spcPct val="100000"/>
+                </a:lnSpc>
+                <a:spcBef>
+                  <a:spcPts val="0"/>
+                </a:spcBef>
+                <a:spcAft>
+                  <a:spcPts val="0"/>
+                </a:spcAft>
+                <a:buClr>
+                  <a:srgbClr val="000000"/>
+                </a:buClr>
+                <a:buSzPts val="1400"/>
+                <a:buFont typeface="Arial"/>
+                <a:buNone/>
+                <a:defRPr sz="1050" b="0" i="0" u="none" strike="noStrike" cap="none">
+                  <a:solidFill>
+                    <a:srgbClr val="000000"/>
+                  </a:solidFill>
+                  <a:latin typeface="Arial"/>
+                  <a:ea typeface="Arial"/>
+                  <a:cs typeface="Arial"/>
+                  <a:sym typeface="Arial"/>
+                </a:defRPr>
+              </a:lvl7pPr>
+              <a:lvl8pPr marR="0" lvl="7" algn="l" rtl="0" eaLnBrk="1" hangingPunct="1">
+                <a:lnSpc>
+                  <a:spcPct val="100000"/>
+                </a:lnSpc>
+                <a:spcBef>
+                  <a:spcPts val="0"/>
+                </a:spcBef>
+                <a:spcAft>
+                  <a:spcPts val="0"/>
+                </a:spcAft>
+                <a:buClr>
+                  <a:srgbClr val="000000"/>
+                </a:buClr>
+                <a:buSzPts val="1400"/>
+                <a:buFont typeface="Arial"/>
+                <a:buNone/>
+                <a:defRPr sz="1050" b="0" i="0" u="none" strike="noStrike" cap="none">
+                  <a:solidFill>
+                    <a:srgbClr val="000000"/>
+                  </a:solidFill>
+                  <a:latin typeface="Arial"/>
+                  <a:ea typeface="Arial"/>
+                  <a:cs typeface="Arial"/>
+                  <a:sym typeface="Arial"/>
+                </a:defRPr>
+              </a:lvl8pPr>
+              <a:lvl9pPr marR="0" lvl="8" algn="l" rtl="0" eaLnBrk="1" hangingPunct="1">
+                <a:lnSpc>
+                  <a:spcPct val="100000"/>
+                </a:lnSpc>
+                <a:spcBef>
+                  <a:spcPts val="0"/>
+                </a:spcBef>
+                <a:spcAft>
+                  <a:spcPts val="0"/>
+                </a:spcAft>
+                <a:buClr>
+                  <a:srgbClr val="000000"/>
+                </a:buClr>
+                <a:buSzPts val="1400"/>
+                <a:buFont typeface="Arial"/>
+                <a:buNone/>
+                <a:defRPr sz="1050" b="0" i="0" u="none" strike="noStrike" cap="none">
+                  <a:solidFill>
+                    <a:srgbClr val="000000"/>
+                  </a:solidFill>
+                  <a:latin typeface="Arial"/>
+                  <a:ea typeface="Arial"/>
+                  <a:cs typeface="Arial"/>
+                  <a:sym typeface="Arial"/>
+                </a:defRPr>
+              </a:lvl9pPr>
+            </a:lstStyle>
+            <a:p>
+              <a:pPr algn="l"/>
+              <a:r>
+                <a:rPr lang="en-US" dirty="0"/>
+                <a:t>		 key take-aways</a:t>
+              </a:r>
+            </a:p>
+          </p:txBody>
+        </p:sp>
+        <p:pic>
+          <p:nvPicPr>
+            <p:cNvPr id="14" name="Graphic 13" descr="A lightbulb">
+              <a:extLst>
+                <a:ext uri="{FF2B5EF4-FFF2-40B4-BE49-F238E27FC236}">
+                  <a16:creationId xmlns:a16="http://schemas.microsoft.com/office/drawing/2014/main" id="{4C2D8F07-5D0C-A510-D9CA-C7FEBE01B735}"/>
+                </a:ext>
+              </a:extLst>
+            </p:cNvPr>
+            <p:cNvPicPr>
+              <a:picLocks noChangeAspect="1"/>
+            </p:cNvPicPr>
+            <p:nvPr userDrawn="1"/>
+          </p:nvPicPr>
+          <p:blipFill rotWithShape="1">
+            <a:blip r:embed="rId4">
+              <a:extLst>
+                <a:ext uri="{28A0092B-C50C-407E-A947-70E740481C1C}">
+                  <a14:useLocalDpi xmlns:a14="http://schemas.microsoft.com/office/drawing/2010/main" val="0"/>
+                </a:ext>
+                <a:ext uri="{96DAC541-7B7A-43D3-8B79-37D633B846F1}">
+                  <asvg:svgBlip xmlns:asvg="http://schemas.microsoft.com/office/drawing/2016/SVG/main" r:embed="rId5"/>
+                </a:ext>
+              </a:extLst>
+            </a:blip>
+            <a:srcRect l="16030" t="10286" r="16030" b="10286"/>
+            <a:stretch/>
+          </p:blipFill>
+          <p:spPr>
+            <a:xfrm>
+              <a:off x="457200" y="3429000"/>
+              <a:ext cx="978154" cy="1143536"/>
+            </a:xfrm>
+            <a:prstGeom prst="rect">
+              <a:avLst/>
+            </a:prstGeom>
+            <a:effectLst>
+              <a:outerShdw dist="25400" dir="8100000" algn="tr" rotWithShape="0">
+                <a:srgbClr val="467599"/>
+              </a:outerShdw>
+            </a:effectLst>
+          </p:spPr>
+        </p:pic>
+      </p:grpSp>
+      <p:sp>
+        <p:nvSpPr>
+          <p:cNvPr id="15" name="Google Shape;29;p31">
+            <a:extLst>
+              <a:ext uri="{FF2B5EF4-FFF2-40B4-BE49-F238E27FC236}">
+                <a16:creationId xmlns:a16="http://schemas.microsoft.com/office/drawing/2014/main" id="{8DE1B49A-DE74-91FA-2C55-7A926302AD4F}"/>
+              </a:ext>
+            </a:extLst>
+          </p:cNvPr>
+          <p:cNvSpPr txBox="1">
+            <a:spLocks noGrp="1"/>
+          </p:cNvSpPr>
+          <p:nvPr>
+            <p:ph type="body" idx="10" hasCustomPrompt="1"/>
+          </p:nvPr>
+        </p:nvSpPr>
+        <p:spPr>
+          <a:xfrm>
+            <a:off x="628649" y="3161378"/>
+            <a:ext cx="8058152" cy="2283758"/>
+          </a:xfrm>
+          <a:prstGeom prst="rect">
+            <a:avLst/>
+          </a:prstGeom>
+          <a:noFill/>
+          <a:ln>
+            <a:noFill/>
+          </a:ln>
+        </p:spPr>
+        <p:txBody>
+          <a:bodyPr spcFirstLastPara="1" wrap="square" lIns="91425" tIns="45700" rIns="91425" bIns="45700" anchor="t" anchorCtr="0">
+            <a:normAutofit/>
+          </a:bodyPr>
+          <a:lstStyle>
+            <a:lvl1pPr marL="312896" lvl="0" indent="-214313" algn="l">
+              <a:spcBef>
+                <a:spcPts val="0"/>
+              </a:spcBef>
+              <a:spcAft>
+                <a:spcPts val="0"/>
+              </a:spcAft>
+              <a:buClr>
+                <a:srgbClr val="C00000"/>
+              </a:buClr>
+              <a:buSzPct val="100000"/>
+              <a:buFont typeface="Wingdings" panose="05000000000000000000" pitchFamily="2" charset="2"/>
+              <a:buChar char="§"/>
+              <a:defRPr sz="2000" spc="0">
+                <a:solidFill>
+                  <a:schemeClr val="tx1"/>
+                </a:solidFill>
+                <a:effectLst/>
+                <a:latin typeface="Bahnschrift Light" panose="020B0502040204020203" pitchFamily="34" charset="0"/>
+                <a:ea typeface="Verdana" panose="020B0604030504040204" pitchFamily="34" charset="0"/>
+                <a:cs typeface="Helvetica" panose="020B0604020202020204" pitchFamily="34" charset="0"/>
+              </a:defRPr>
+            </a:lvl1pPr>
+            <a:lvl2pPr marL="784384" lvl="1" indent="-342900" algn="l">
+              <a:spcBef>
+                <a:spcPts val="600"/>
+              </a:spcBef>
+              <a:spcAft>
+                <a:spcPts val="600"/>
+              </a:spcAft>
+              <a:buClr>
+                <a:srgbClr val="AF0E3F"/>
+              </a:buClr>
+              <a:buSzPct val="140000"/>
+              <a:buFont typeface="Wingdings" panose="05000000000000000000" pitchFamily="2" charset="2"/>
+              <a:buChar char="§"/>
+              <a:defRPr sz="2100">
+                <a:solidFill>
+                  <a:srgbClr val="FF6464"/>
+                </a:solidFill>
+              </a:defRPr>
+            </a:lvl2pPr>
+            <a:lvl3pPr marL="1122998" lvl="2" indent="-342900" algn="l">
+              <a:spcBef>
+                <a:spcPts val="600"/>
+              </a:spcBef>
+              <a:spcAft>
+                <a:spcPts val="600"/>
+              </a:spcAft>
+              <a:buClr>
+                <a:srgbClr val="AF0E3F"/>
+              </a:buClr>
+              <a:buSzPct val="140000"/>
+              <a:buFont typeface="Wingdings" panose="05000000000000000000" pitchFamily="2" charset="2"/>
+              <a:buChar char="§"/>
+              <a:defRPr sz="2100"/>
+            </a:lvl3pPr>
+            <a:lvl4pPr marL="1457325" lvl="3" indent="-342900" algn="l">
+              <a:spcBef>
+                <a:spcPts val="600"/>
+              </a:spcBef>
+              <a:spcAft>
+                <a:spcPts val="600"/>
+              </a:spcAft>
+              <a:buClr>
+                <a:srgbClr val="AF0E3F"/>
+              </a:buClr>
+              <a:buSzPct val="140000"/>
+              <a:buFont typeface="Wingdings" panose="05000000000000000000" pitchFamily="2" charset="2"/>
+              <a:buChar char="§"/>
+              <a:defRPr sz="2100" b="1"/>
+            </a:lvl4pPr>
+            <a:lvl5pPr marL="1800225" lvl="4" indent="-342900" algn="l">
+              <a:spcBef>
+                <a:spcPts val="600"/>
+              </a:spcBef>
+              <a:spcAft>
+                <a:spcPts val="600"/>
+              </a:spcAft>
+              <a:buClr>
+                <a:srgbClr val="AF0E3F"/>
+              </a:buClr>
+              <a:buSzPct val="140000"/>
+              <a:buFont typeface="Wingdings" panose="05000000000000000000" pitchFamily="2" charset="2"/>
+              <a:buChar char="§"/>
+              <a:defRPr sz="2100" i="1">
+                <a:solidFill>
+                  <a:srgbClr val="C00000"/>
+                </a:solidFill>
+              </a:defRPr>
+            </a:lvl5pPr>
+            <a:lvl6pPr marL="1800225" lvl="5" indent="0" algn="l">
+              <a:spcBef>
+                <a:spcPts val="600"/>
+              </a:spcBef>
+              <a:spcAft>
+                <a:spcPts val="600"/>
+              </a:spcAft>
+              <a:buClr>
+                <a:srgbClr val="AF0E3F"/>
+              </a:buClr>
+              <a:buSzPct val="140000"/>
+              <a:buFont typeface="Wingdings" panose="05000000000000000000" pitchFamily="2" charset="2"/>
+              <a:buNone/>
+              <a:defRPr sz="2100"/>
+            </a:lvl6pPr>
+            <a:lvl7pPr marL="2400300" lvl="6" indent="-257175" algn="l">
+              <a:spcBef>
+                <a:spcPts val="270"/>
+              </a:spcBef>
+              <a:spcAft>
+                <a:spcPts val="0"/>
+              </a:spcAft>
+              <a:buSzPts val="1800"/>
+              <a:buChar char="•"/>
+              <a:defRPr/>
+            </a:lvl7pPr>
+            <a:lvl8pPr marL="2743200" lvl="7" indent="-257175" algn="l">
+              <a:spcBef>
+                <a:spcPts val="270"/>
+              </a:spcBef>
+              <a:spcAft>
+                <a:spcPts val="0"/>
+              </a:spcAft>
+              <a:buSzPts val="1800"/>
+              <a:buChar char="•"/>
+              <a:defRPr/>
+            </a:lvl8pPr>
+            <a:lvl9pPr marL="3086100" lvl="8" indent="-257175" algn="l">
+              <a:spcBef>
+                <a:spcPts val="270"/>
+              </a:spcBef>
+              <a:spcAft>
+                <a:spcPts val="0"/>
+              </a:spcAft>
+              <a:buSzPts val="1800"/>
+              <a:buChar char="•"/>
+              <a:defRPr/>
+            </a:lvl9pPr>
+          </a:lstStyle>
+          <a:p>
+            <a:r>
+              <a:rPr lang="en-PH" dirty="0"/>
+              <a:t>Sample text</a:t>
+            </a:r>
+          </a:p>
+        </p:txBody>
+      </p:sp>
+      <p:sp>
+        <p:nvSpPr>
+          <p:cNvPr id="16" name="Google Shape;29;p31">
+            <a:extLst>
+              <a:ext uri="{FF2B5EF4-FFF2-40B4-BE49-F238E27FC236}">
+                <a16:creationId xmlns:a16="http://schemas.microsoft.com/office/drawing/2014/main" id="{D8622480-41A5-CA42-51F1-3E2BDB6802F4}"/>
+              </a:ext>
+            </a:extLst>
+          </p:cNvPr>
+          <p:cNvSpPr txBox="1">
+            <a:spLocks noGrp="1"/>
+          </p:cNvSpPr>
+          <p:nvPr>
+            <p:ph type="body" idx="11" hasCustomPrompt="1"/>
+          </p:nvPr>
+        </p:nvSpPr>
+        <p:spPr>
+          <a:xfrm>
+            <a:off x="628648" y="5816603"/>
+            <a:ext cx="8058152" cy="468841"/>
+          </a:xfrm>
+          <a:prstGeom prst="rect">
+            <a:avLst/>
+          </a:prstGeom>
+          <a:noFill/>
+          <a:ln>
+            <a:noFill/>
+          </a:ln>
+        </p:spPr>
+        <p:txBody>
+          <a:bodyPr spcFirstLastPara="1" wrap="square" lIns="91425" tIns="45700" rIns="91425" bIns="45700" anchor="t" anchorCtr="0">
+            <a:noAutofit/>
+          </a:bodyPr>
+          <a:lstStyle>
+            <a:lvl1pPr marL="270033" lvl="0" indent="-171450" algn="l">
+              <a:spcBef>
+                <a:spcPts val="0"/>
+              </a:spcBef>
+              <a:spcAft>
+                <a:spcPts val="0"/>
+              </a:spcAft>
+              <a:buClr>
+                <a:srgbClr val="467599"/>
+              </a:buClr>
+              <a:buSzPct val="100000"/>
+              <a:buFont typeface="Wingdings" panose="05000000000000000000" pitchFamily="2" charset="2"/>
+              <a:buChar char="§"/>
+              <a:defRPr sz="1200" spc="0">
+                <a:solidFill>
+                  <a:srgbClr val="467599"/>
+                </a:solidFill>
+                <a:effectLst/>
+                <a:latin typeface="Bahnschrift SemiLight" panose="020B0502040204020203" pitchFamily="34" charset="0"/>
+                <a:ea typeface="Verdana" panose="020B0604030504040204" pitchFamily="34" charset="0"/>
+                <a:cs typeface="Helvetica" panose="020B0604020202020204" pitchFamily="34" charset="0"/>
+              </a:defRPr>
+            </a:lvl1pPr>
+            <a:lvl2pPr marL="784384" lvl="1" indent="-342900" algn="l">
+              <a:spcBef>
+                <a:spcPts val="600"/>
+              </a:spcBef>
+              <a:spcAft>
+                <a:spcPts val="600"/>
+              </a:spcAft>
+              <a:buClr>
+                <a:srgbClr val="AF0E3F"/>
+              </a:buClr>
+              <a:buSzPct val="140000"/>
+              <a:buFont typeface="Wingdings" panose="05000000000000000000" pitchFamily="2" charset="2"/>
+              <a:buChar char="§"/>
+              <a:defRPr sz="2100">
+                <a:solidFill>
+                  <a:srgbClr val="FF6464"/>
+                </a:solidFill>
+              </a:defRPr>
+            </a:lvl2pPr>
+            <a:lvl3pPr marL="1122998" lvl="2" indent="-342900" algn="l">
+              <a:spcBef>
+                <a:spcPts val="600"/>
+              </a:spcBef>
+              <a:spcAft>
+                <a:spcPts val="600"/>
+              </a:spcAft>
+              <a:buClr>
+                <a:srgbClr val="AF0E3F"/>
+              </a:buClr>
+              <a:buSzPct val="140000"/>
+              <a:buFont typeface="Wingdings" panose="05000000000000000000" pitchFamily="2" charset="2"/>
+              <a:buChar char="§"/>
+              <a:defRPr sz="2100"/>
+            </a:lvl3pPr>
+            <a:lvl4pPr marL="1457325" lvl="3" indent="-342900" algn="l">
+              <a:spcBef>
+                <a:spcPts val="600"/>
+              </a:spcBef>
+              <a:spcAft>
+                <a:spcPts val="600"/>
+              </a:spcAft>
+              <a:buClr>
+                <a:srgbClr val="AF0E3F"/>
+              </a:buClr>
+              <a:buSzPct val="140000"/>
+              <a:buFont typeface="Wingdings" panose="05000000000000000000" pitchFamily="2" charset="2"/>
+              <a:buChar char="§"/>
+              <a:defRPr sz="2100" b="1"/>
+            </a:lvl4pPr>
+            <a:lvl5pPr marL="1800225" lvl="4" indent="-342900" algn="l">
+              <a:spcBef>
+                <a:spcPts val="600"/>
+              </a:spcBef>
+              <a:spcAft>
+                <a:spcPts val="600"/>
+              </a:spcAft>
+              <a:buClr>
+                <a:srgbClr val="AF0E3F"/>
+              </a:buClr>
+              <a:buSzPct val="140000"/>
+              <a:buFont typeface="Wingdings" panose="05000000000000000000" pitchFamily="2" charset="2"/>
+              <a:buChar char="§"/>
+              <a:defRPr sz="2100" i="1">
+                <a:solidFill>
+                  <a:srgbClr val="C00000"/>
+                </a:solidFill>
+              </a:defRPr>
+            </a:lvl5pPr>
+            <a:lvl6pPr marL="1800225" lvl="5" indent="0" algn="l">
+              <a:spcBef>
+                <a:spcPts val="600"/>
+              </a:spcBef>
+              <a:spcAft>
+                <a:spcPts val="600"/>
+              </a:spcAft>
+              <a:buClr>
+                <a:srgbClr val="AF0E3F"/>
+              </a:buClr>
+              <a:buSzPct val="140000"/>
+              <a:buFont typeface="Wingdings" panose="05000000000000000000" pitchFamily="2" charset="2"/>
+              <a:buNone/>
+              <a:defRPr sz="2100"/>
+            </a:lvl6pPr>
+            <a:lvl7pPr marL="2400300" lvl="6" indent="-257175" algn="l">
+              <a:spcBef>
+                <a:spcPts val="270"/>
+              </a:spcBef>
+              <a:spcAft>
+                <a:spcPts val="0"/>
+              </a:spcAft>
+              <a:buSzPts val="1800"/>
+              <a:buChar char="•"/>
+              <a:defRPr/>
+            </a:lvl7pPr>
+            <a:lvl8pPr marL="2743200" lvl="7" indent="-257175" algn="l">
+              <a:spcBef>
+                <a:spcPts val="270"/>
+              </a:spcBef>
+              <a:spcAft>
+                <a:spcPts val="0"/>
+              </a:spcAft>
+              <a:buSzPts val="1800"/>
+              <a:buChar char="•"/>
+              <a:defRPr/>
+            </a:lvl8pPr>
+            <a:lvl9pPr marL="3086100" lvl="8" indent="-257175" algn="l">
+              <a:spcBef>
+                <a:spcPts val="270"/>
+              </a:spcBef>
+              <a:spcAft>
+                <a:spcPts val="0"/>
+              </a:spcAft>
+              <a:buSzPts val="1800"/>
+              <a:buChar char="•"/>
+              <a:defRPr/>
+            </a:lvl9pPr>
+          </a:lstStyle>
+          <a:p>
+            <a:r>
+              <a:rPr lang="en-PH" dirty="0"/>
+              <a:t>GITHUB:</a:t>
+            </a:r>
+          </a:p>
+          <a:p>
+            <a:r>
+              <a:rPr lang="en-PH" dirty="0"/>
+              <a:t>GOOGLE DRIVE:</a:t>
+            </a:r>
+          </a:p>
+          <a:p>
+            <a:endParaRPr lang="en-PH" dirty="0"/>
+          </a:p>
+        </p:txBody>
+      </p:sp>
+      <p:sp>
+        <p:nvSpPr>
+          <p:cNvPr id="17" name="TextBox 16">
+            <a:extLst>
+              <a:ext uri="{FF2B5EF4-FFF2-40B4-BE49-F238E27FC236}">
+                <a16:creationId xmlns:a16="http://schemas.microsoft.com/office/drawing/2014/main" id="{A8B4850B-96CC-FEF3-5F30-A7761AB3B5A0}"/>
+              </a:ext>
+            </a:extLst>
+          </p:cNvPr>
+          <p:cNvSpPr txBox="1"/>
+          <p:nvPr userDrawn="1"/>
+        </p:nvSpPr>
+        <p:spPr>
+          <a:xfrm>
+            <a:off x="536051" y="5447271"/>
+            <a:ext cx="4572000" cy="369332"/>
+          </a:xfrm>
+          <a:prstGeom prst="rect">
+            <a:avLst/>
+          </a:prstGeom>
+          <a:noFill/>
+        </p:spPr>
+        <p:txBody>
+          <a:bodyPr wrap="square">
+            <a:spAutoFit/>
+          </a:bodyPr>
+          <a:lstStyle/>
+          <a:p>
+            <a:pPr algn="l"/>
+            <a:r>
+              <a:rPr lang="en-PH" sz="1800" b="1" spc="600" baseline="0" dirty="0">
+                <a:solidFill>
+                  <a:schemeClr val="bg1"/>
+                </a:solidFill>
+                <a:effectLst/>
+                <a:highlight>
+                  <a:srgbClr val="467599"/>
+                </a:highlight>
+                <a:latin typeface="Bahnschrift" panose="020B0502040204020203" pitchFamily="34" charset="0"/>
+                <a:ea typeface="Verdana" panose="020B0604030504040204" pitchFamily="34" charset="0"/>
+              </a:rPr>
+              <a:t> SOURCE CODE</a:t>
+            </a:r>
+          </a:p>
+        </p:txBody>
+      </p:sp>
+    </p:spTree>
+    <p:extLst>
+      <p:ext uri="{BB962C8B-B14F-4D97-AF65-F5344CB8AC3E}">
+        <p14:creationId xmlns:p14="http://schemas.microsoft.com/office/powerpoint/2010/main" val="1514047244"/>
+      </p:ext>
+    </p:extLst>
+  </p:cSld>
+  <p:clrMapOvr>
+    <a:masterClrMapping/>
+  </p:clrMapOvr>
+  <mc:AlternateContent xmlns:mc="http://schemas.openxmlformats.org/markup-compatibility/2006" xmlns:p14="http://schemas.microsoft.com/office/powerpoint/2010/main">
+    <mc:Choice Requires="p14">
+      <p:transition p14:dur="200">
+        <p:fade/>
+      </p:transition>
+    </mc:Choice>
+    <mc:Fallback xmlns:ahyp="http://schemas.microsoft.com/office/drawing/2018/hyperlinkcolor" xmlns:p15="http://schemas.microsoft.com/office/powerpoint/2012/main" xmlns:com="http://schemas.openxmlformats.org/drawingml/2006/compatibility" xmlns:pvml="urn:schemas-microsoft-com:office:powerpoint" xmlns:v="urn:schemas-microsoft-com:vml" xmlns:o="urn:schemas-microsoft-com:office:office" xmlns:dgm="http://schemas.openxmlformats.org/drawingml/2006/diagram" xmlns:c="http://schemas.openxmlformats.org/drawingml/2006/chart" xmlns:mv="urn:schemas-microsoft-com:mac:vml" xmlns="">
+      <p:transition>
+        <p:fade/>
+      </p:transition>
+    </mc:Fallback>
+  </mc:AlternateContent>
+</p:sldLayout>
+</file>
+
+<file path=ppt/slideLayouts/slideLayout4.xml><?xml version="1.0" encoding="utf-8"?>
+<p:sldLayout xmlns:a="http://schemas.openxmlformats.org/drawingml/2006/main" xmlns:r="http://schemas.openxmlformats.org/officeDocument/2006/relationships" xmlns:p="http://schemas.openxmlformats.org/presentationml/2006/main" matchingName="Title and Content" preserve="1" userDrawn="1">
+  <p:cSld name="1_Title and Content">
+    <p:bg>
+      <p:bgPr>
+        <a:solidFill>
+          <a:schemeClr val="bg1"/>
+        </a:solidFill>
+        <a:effectLst/>
+      </p:bgPr>
+    </p:bg>
+    <p:spTree>
+      <p:nvGrpSpPr>
+        <p:cNvPr id="1" name="Shape 27"/>
+        <p:cNvGrpSpPr/>
+        <p:nvPr/>
+      </p:nvGrpSpPr>
+      <p:grpSpPr>
+        <a:xfrm>
+          <a:off x="0" y="0"/>
+          <a:ext cx="0" cy="0"/>
+          <a:chOff x="0" y="0"/>
+          <a:chExt cx="0" cy="0"/>
+        </a:xfrm>
+      </p:grpSpPr>
+      <p:sp>
+        <p:nvSpPr>
+          <p:cNvPr id="25" name="Google Shape;29;p31">
+            <a:extLst>
+              <a:ext uri="{FF2B5EF4-FFF2-40B4-BE49-F238E27FC236}">
+                <a16:creationId xmlns:a16="http://schemas.microsoft.com/office/drawing/2014/main" id="{D933B60E-9596-75BF-40EF-1D954957F451}"/>
+              </a:ext>
+            </a:extLst>
+          </p:cNvPr>
+          <p:cNvSpPr txBox="1">
+            <a:spLocks noGrp="1"/>
+          </p:cNvSpPr>
+          <p:nvPr>
+            <p:ph type="body" idx="1" hasCustomPrompt="1"/>
+          </p:nvPr>
+        </p:nvSpPr>
+        <p:spPr>
+          <a:xfrm>
+            <a:off x="628649" y="1325161"/>
+            <a:ext cx="8058151" cy="2137701"/>
+          </a:xfrm>
+          <a:prstGeom prst="rect">
+            <a:avLst/>
+          </a:prstGeom>
+          <a:noFill/>
+          <a:ln>
+            <a:noFill/>
+          </a:ln>
+        </p:spPr>
+        <p:txBody>
+          <a:bodyPr spcFirstLastPara="1" wrap="square" lIns="91425" tIns="45700" rIns="91425" bIns="45700" anchor="t" anchorCtr="0">
+            <a:noAutofit/>
+          </a:bodyPr>
+          <a:lstStyle>
+            <a:lvl1pPr marL="312896" lvl="0" indent="-214313" algn="l">
+              <a:spcBef>
+                <a:spcPts val="0"/>
+              </a:spcBef>
+              <a:spcAft>
+                <a:spcPts val="600"/>
+              </a:spcAft>
+              <a:buClr>
+                <a:srgbClr val="1D3354"/>
+              </a:buClr>
+              <a:buSzPct val="100000"/>
+              <a:buFont typeface="Wingdings" panose="05000000000000000000" pitchFamily="2" charset="2"/>
+              <a:buChar char="§"/>
+              <a:defRPr sz="1400" spc="0">
+                <a:solidFill>
+                  <a:schemeClr val="tx1"/>
+                </a:solidFill>
+                <a:effectLst/>
+                <a:latin typeface="Bahnschrift Light" panose="020B0502040204020203" pitchFamily="34" charset="0"/>
+                <a:ea typeface="Verdana" panose="020B0604030504040204" pitchFamily="34" charset="0"/>
+                <a:cs typeface="Helvetica" panose="020B0604020202020204" pitchFamily="34" charset="0"/>
+              </a:defRPr>
+            </a:lvl1pPr>
+            <a:lvl2pPr marL="784384" lvl="1" indent="-342900" algn="l">
+              <a:spcBef>
+                <a:spcPts val="600"/>
+              </a:spcBef>
+              <a:spcAft>
+                <a:spcPts val="600"/>
+              </a:spcAft>
+              <a:buClr>
+                <a:srgbClr val="AF0E3F"/>
+              </a:buClr>
+              <a:buSzPct val="140000"/>
+              <a:buFont typeface="Wingdings" panose="05000000000000000000" pitchFamily="2" charset="2"/>
+              <a:buChar char="§"/>
+              <a:defRPr sz="2100">
+                <a:solidFill>
+                  <a:srgbClr val="FF6464"/>
+                </a:solidFill>
+              </a:defRPr>
+            </a:lvl2pPr>
+            <a:lvl3pPr marL="1122998" lvl="2" indent="-342900" algn="l">
+              <a:spcBef>
+                <a:spcPts val="600"/>
+              </a:spcBef>
+              <a:spcAft>
+                <a:spcPts val="600"/>
+              </a:spcAft>
+              <a:buClr>
+                <a:srgbClr val="AF0E3F"/>
+              </a:buClr>
+              <a:buSzPct val="140000"/>
+              <a:buFont typeface="Wingdings" panose="05000000000000000000" pitchFamily="2" charset="2"/>
+              <a:buChar char="§"/>
+              <a:defRPr sz="2100"/>
+            </a:lvl3pPr>
+            <a:lvl4pPr marL="1457325" lvl="3" indent="-342900" algn="l">
+              <a:spcBef>
+                <a:spcPts val="600"/>
+              </a:spcBef>
+              <a:spcAft>
+                <a:spcPts val="600"/>
+              </a:spcAft>
+              <a:buClr>
+                <a:srgbClr val="AF0E3F"/>
+              </a:buClr>
+              <a:buSzPct val="140000"/>
+              <a:buFont typeface="Wingdings" panose="05000000000000000000" pitchFamily="2" charset="2"/>
+              <a:buChar char="§"/>
+              <a:defRPr sz="2100" b="1"/>
+            </a:lvl4pPr>
+            <a:lvl5pPr marL="1800225" lvl="4" indent="-342900" algn="l">
+              <a:spcBef>
+                <a:spcPts val="600"/>
+              </a:spcBef>
+              <a:spcAft>
+                <a:spcPts val="600"/>
+              </a:spcAft>
+              <a:buClr>
+                <a:srgbClr val="AF0E3F"/>
+              </a:buClr>
+              <a:buSzPct val="140000"/>
+              <a:buFont typeface="Wingdings" panose="05000000000000000000" pitchFamily="2" charset="2"/>
+              <a:buChar char="§"/>
+              <a:defRPr sz="2100" i="1">
+                <a:solidFill>
+                  <a:srgbClr val="C00000"/>
+                </a:solidFill>
+              </a:defRPr>
+            </a:lvl5pPr>
+            <a:lvl6pPr marL="1800225" lvl="5" indent="0" algn="l">
+              <a:spcBef>
+                <a:spcPts val="600"/>
+              </a:spcBef>
+              <a:spcAft>
+                <a:spcPts val="600"/>
+              </a:spcAft>
+              <a:buClr>
+                <a:srgbClr val="AF0E3F"/>
+              </a:buClr>
+              <a:buSzPct val="140000"/>
+              <a:buFont typeface="Wingdings" panose="05000000000000000000" pitchFamily="2" charset="2"/>
+              <a:buNone/>
+              <a:defRPr sz="2100"/>
+            </a:lvl6pPr>
+            <a:lvl7pPr marL="2400300" lvl="6" indent="-257175" algn="l">
+              <a:spcBef>
+                <a:spcPts val="270"/>
+              </a:spcBef>
+              <a:spcAft>
+                <a:spcPts val="0"/>
+              </a:spcAft>
+              <a:buSzPts val="1800"/>
+              <a:buChar char="•"/>
+              <a:defRPr/>
+            </a:lvl7pPr>
+            <a:lvl8pPr marL="2743200" lvl="7" indent="-257175" algn="l">
+              <a:spcBef>
+                <a:spcPts val="270"/>
+              </a:spcBef>
+              <a:spcAft>
+                <a:spcPts val="0"/>
+              </a:spcAft>
+              <a:buSzPts val="1800"/>
+              <a:buChar char="•"/>
+              <a:defRPr/>
+            </a:lvl8pPr>
+            <a:lvl9pPr marL="3086100" lvl="8" indent="-257175" algn="l">
+              <a:spcBef>
+                <a:spcPts val="270"/>
+              </a:spcBef>
+              <a:spcAft>
+                <a:spcPts val="0"/>
+              </a:spcAft>
+              <a:buSzPts val="1800"/>
+              <a:buChar char="•"/>
+              <a:defRPr/>
+            </a:lvl9pPr>
+          </a:lstStyle>
+          <a:p>
+            <a:r>
+              <a:rPr lang="en-PH" dirty="0"/>
+              <a:t>Sample text</a:t>
+            </a:r>
+          </a:p>
+        </p:txBody>
+      </p:sp>
+      <p:sp>
+        <p:nvSpPr>
+          <p:cNvPr id="27" name="Google Shape;28;p31">
+            <a:extLst>
+              <a:ext uri="{FF2B5EF4-FFF2-40B4-BE49-F238E27FC236}">
+                <a16:creationId xmlns:a16="http://schemas.microsoft.com/office/drawing/2014/main" id="{F9EBFDC1-A551-FD54-3832-55F976F86CE4}"/>
+              </a:ext>
+            </a:extLst>
+          </p:cNvPr>
+          <p:cNvSpPr txBox="1">
+            <a:spLocks noGrp="1"/>
+          </p:cNvSpPr>
+          <p:nvPr>
+            <p:ph type="title" hasCustomPrompt="1"/>
+          </p:nvPr>
+        </p:nvSpPr>
+        <p:spPr>
+          <a:xfrm>
+            <a:off x="628648" y="592963"/>
+            <a:ext cx="8058151" cy="619827"/>
+          </a:xfrm>
+          <a:prstGeom prst="rect">
+            <a:avLst/>
+          </a:prstGeom>
+          <a:noFill/>
+          <a:ln>
+            <a:noFill/>
+          </a:ln>
+        </p:spPr>
+        <p:txBody>
+          <a:bodyPr spcFirstLastPara="1" wrap="square" lIns="91425" tIns="45700" rIns="91425" bIns="45700" anchor="ctr" anchorCtr="0">
+            <a:noAutofit/>
+          </a:bodyPr>
+          <a:lstStyle>
+            <a:lvl1pPr lvl="0" algn="l">
+              <a:spcBef>
+                <a:spcPts val="0"/>
+              </a:spcBef>
+              <a:spcAft>
+                <a:spcPts val="0"/>
+              </a:spcAft>
+              <a:buClr>
+                <a:srgbClr val="C00000"/>
+              </a:buClr>
+              <a:buSzPts val="1800"/>
+              <a:buNone/>
+              <a:defRPr sz="6000" b="1">
+                <a:ln w="0">
+                  <a:noFill/>
+                </a:ln>
+                <a:solidFill>
+                  <a:srgbClr val="467599"/>
+                </a:solidFill>
+                <a:effectLst>
+                  <a:outerShdw dist="38100" dir="8100000" algn="tr" rotWithShape="0">
+                    <a:srgbClr val="D64045"/>
+                  </a:outerShdw>
+                </a:effectLst>
+                <a:latin typeface="Bahnschrift Condensed" panose="020B0502040204020203" pitchFamily="34" charset="0"/>
+                <a:cs typeface="Helvetica" panose="020B0604020202020204" pitchFamily="34" charset="0"/>
+              </a:defRPr>
+            </a:lvl1pPr>
+            <a:lvl2pPr lvl="1">
+              <a:spcBef>
+                <a:spcPts val="0"/>
+              </a:spcBef>
+              <a:spcAft>
+                <a:spcPts val="0"/>
+              </a:spcAft>
+              <a:buSzPts val="1400"/>
+              <a:buNone/>
+              <a:defRPr/>
+            </a:lvl2pPr>
+            <a:lvl3pPr lvl="2">
+              <a:spcBef>
+                <a:spcPts val="0"/>
+              </a:spcBef>
+              <a:spcAft>
+                <a:spcPts val="0"/>
+              </a:spcAft>
+              <a:buSzPts val="1400"/>
+              <a:buNone/>
+              <a:defRPr/>
+            </a:lvl3pPr>
+            <a:lvl4pPr lvl="3">
+              <a:spcBef>
+                <a:spcPts val="0"/>
+              </a:spcBef>
+              <a:spcAft>
+                <a:spcPts val="0"/>
+              </a:spcAft>
+              <a:buSzPts val="1400"/>
+              <a:buNone/>
+              <a:defRPr/>
+            </a:lvl4pPr>
+            <a:lvl5pPr lvl="4">
+              <a:spcBef>
+                <a:spcPts val="0"/>
+              </a:spcBef>
+              <a:spcAft>
+                <a:spcPts val="0"/>
+              </a:spcAft>
+              <a:buSzPts val="1400"/>
+              <a:buNone/>
+              <a:defRPr/>
+            </a:lvl5pPr>
+            <a:lvl6pPr lvl="5">
+              <a:spcBef>
+                <a:spcPts val="0"/>
+              </a:spcBef>
+              <a:spcAft>
+                <a:spcPts val="0"/>
+              </a:spcAft>
+              <a:buSzPts val="1400"/>
+              <a:buNone/>
+              <a:defRPr/>
+            </a:lvl6pPr>
+            <a:lvl7pPr lvl="6">
+              <a:spcBef>
+                <a:spcPts val="0"/>
+              </a:spcBef>
+              <a:spcAft>
+                <a:spcPts val="0"/>
+              </a:spcAft>
+              <a:buSzPts val="1400"/>
+              <a:buNone/>
+              <a:defRPr/>
+            </a:lvl7pPr>
+            <a:lvl8pPr lvl="7">
+              <a:spcBef>
+                <a:spcPts val="0"/>
+              </a:spcBef>
+              <a:spcAft>
+                <a:spcPts val="0"/>
+              </a:spcAft>
+              <a:buSzPts val="1400"/>
+              <a:buNone/>
+              <a:defRPr/>
+            </a:lvl8pPr>
+            <a:lvl9pPr lvl="8">
+              <a:spcBef>
+                <a:spcPts val="0"/>
+              </a:spcBef>
+              <a:spcAft>
+                <a:spcPts val="0"/>
+              </a:spcAft>
+              <a:buSzPts val="1400"/>
+              <a:buNone/>
+              <a:defRPr/>
+            </a:lvl9pPr>
+          </a:lstStyle>
+          <a:p>
+            <a:r>
+              <a:rPr lang="en-US" dirty="0"/>
+              <a:t>	reflection</a:t>
+            </a:r>
+            <a:endParaRPr dirty="0"/>
+          </a:p>
+        </p:txBody>
+      </p:sp>
+      <p:sp>
+        <p:nvSpPr>
+          <p:cNvPr id="10" name="Footer Placeholder 4">
+            <a:extLst>
+              <a:ext uri="{FF2B5EF4-FFF2-40B4-BE49-F238E27FC236}">
+                <a16:creationId xmlns:a16="http://schemas.microsoft.com/office/drawing/2014/main" id="{0C0EA192-0932-FEAE-9E17-3AF1158A6950}"/>
+              </a:ext>
+            </a:extLst>
+          </p:cNvPr>
+          <p:cNvSpPr>
+            <a:spLocks noGrp="1"/>
+          </p:cNvSpPr>
+          <p:nvPr>
+            <p:ph type="ftr" sz="quarter" idx="3"/>
+          </p:nvPr>
+        </p:nvSpPr>
+        <p:spPr>
+          <a:xfrm>
+            <a:off x="628649" y="6356351"/>
+            <a:ext cx="6818525" cy="365125"/>
+          </a:xfrm>
+          <a:prstGeom prst="rect">
+            <a:avLst/>
+          </a:prstGeom>
+        </p:spPr>
+        <p:txBody>
+          <a:bodyPr vert="horz" lIns="91440" tIns="45720" rIns="91440" bIns="45720" rtlCol="0" anchor="ctr"/>
+          <a:lstStyle>
+            <a:lvl1pPr algn="l">
+              <a:defRPr sz="1800" spc="300">
+                <a:solidFill>
+                  <a:srgbClr val="D64045"/>
+                </a:solidFill>
+                <a:latin typeface="Bahnschrift Condensed" panose="020B0502040204020203" pitchFamily="34" charset="0"/>
+              </a:defRPr>
+            </a:lvl1pPr>
+          </a:lstStyle>
+          <a:p>
+            <a:r>
+              <a:rPr lang="en-US"/>
+              <a:t>Physics 301 - Advanced Signal and Image Processing</a:t>
+            </a:r>
+            <a:endParaRPr lang="en-US" dirty="0"/>
+          </a:p>
+        </p:txBody>
+      </p:sp>
+      <p:sp>
+        <p:nvSpPr>
+          <p:cNvPr id="11" name="Slide Number Placeholder 5">
+            <a:extLst>
+              <a:ext uri="{FF2B5EF4-FFF2-40B4-BE49-F238E27FC236}">
+                <a16:creationId xmlns:a16="http://schemas.microsoft.com/office/drawing/2014/main" id="{5997149A-AE92-98E3-B00D-1C6E247F5246}"/>
+              </a:ext>
+            </a:extLst>
+          </p:cNvPr>
+          <p:cNvSpPr>
+            <a:spLocks noGrp="1"/>
+          </p:cNvSpPr>
+          <p:nvPr>
+            <p:ph type="sldNum" sz="quarter" idx="4"/>
+          </p:nvPr>
+        </p:nvSpPr>
+        <p:spPr>
+          <a:xfrm>
+            <a:off x="7588576" y="6356351"/>
+            <a:ext cx="926773" cy="365125"/>
+          </a:xfrm>
+          <a:prstGeom prst="rect">
+            <a:avLst/>
+          </a:prstGeom>
+        </p:spPr>
+        <p:txBody>
+          <a:bodyPr vert="horz" lIns="91440" tIns="45720" rIns="91440" bIns="45720" rtlCol="0" anchor="ctr"/>
+          <a:lstStyle>
+            <a:lvl1pPr algn="r">
+              <a:defRPr sz="1800" spc="300">
+                <a:solidFill>
+                  <a:srgbClr val="D64045"/>
+                </a:solidFill>
+                <a:latin typeface="Bahnschrift Condensed" panose="020B0502040204020203" pitchFamily="34" charset="0"/>
+              </a:defRPr>
+            </a:lvl1pPr>
+          </a:lstStyle>
+          <a:p>
+            <a:fld id="{8262CFD8-7A98-47E6-A2CC-B17DDA24BA0E}" type="slidenum">
+              <a:rPr lang="en-US" smtClean="0"/>
+              <a:pPr/>
+              <a:t>‹#›</a:t>
+            </a:fld>
+            <a:endParaRPr lang="en-US"/>
+          </a:p>
+        </p:txBody>
+      </p:sp>
+      <p:sp>
+        <p:nvSpPr>
+          <p:cNvPr id="15" name="Google Shape;29;p31">
+            <a:extLst>
+              <a:ext uri="{FF2B5EF4-FFF2-40B4-BE49-F238E27FC236}">
+                <a16:creationId xmlns:a16="http://schemas.microsoft.com/office/drawing/2014/main" id="{8DE1B49A-DE74-91FA-2C55-7A926302AD4F}"/>
+              </a:ext>
+            </a:extLst>
+          </p:cNvPr>
+          <p:cNvSpPr txBox="1">
+            <a:spLocks noGrp="1"/>
+          </p:cNvSpPr>
+          <p:nvPr>
+            <p:ph type="body" idx="10" hasCustomPrompt="1"/>
+          </p:nvPr>
+        </p:nvSpPr>
+        <p:spPr>
+          <a:xfrm>
+            <a:off x="628649" y="4887236"/>
+            <a:ext cx="8058152" cy="1377801"/>
+          </a:xfrm>
+          <a:prstGeom prst="rect">
+            <a:avLst/>
+          </a:prstGeom>
+          <a:noFill/>
+          <a:ln>
+            <a:noFill/>
+          </a:ln>
+        </p:spPr>
+        <p:txBody>
+          <a:bodyPr spcFirstLastPara="1" wrap="square" lIns="91425" tIns="45700" rIns="91425" bIns="45700" anchor="t" anchorCtr="0">
+            <a:noAutofit/>
+          </a:bodyPr>
+          <a:lstStyle>
+            <a:lvl1pPr marL="312896" lvl="0" indent="-214313" algn="l">
+              <a:lnSpc>
+                <a:spcPct val="100000"/>
+              </a:lnSpc>
+              <a:spcBef>
+                <a:spcPts val="0"/>
+              </a:spcBef>
+              <a:spcAft>
+                <a:spcPts val="0"/>
+              </a:spcAft>
+              <a:buClr>
+                <a:srgbClr val="C00000"/>
+              </a:buClr>
+              <a:buSzPct val="100000"/>
+              <a:buFont typeface="Wingdings" panose="05000000000000000000" pitchFamily="2" charset="2"/>
+              <a:buChar char="§"/>
+              <a:defRPr sz="1400" spc="0">
+                <a:solidFill>
+                  <a:schemeClr val="tx1"/>
+                </a:solidFill>
+                <a:effectLst/>
+                <a:latin typeface="Bahnschrift Light" panose="020B0502040204020203" pitchFamily="34" charset="0"/>
+                <a:ea typeface="Verdana" panose="020B0604030504040204" pitchFamily="34" charset="0"/>
+                <a:cs typeface="Helvetica" panose="020B0604020202020204" pitchFamily="34" charset="0"/>
+              </a:defRPr>
+            </a:lvl1pPr>
+            <a:lvl2pPr marL="784384" lvl="1" indent="-342900" algn="l">
+              <a:spcBef>
+                <a:spcPts val="600"/>
+              </a:spcBef>
+              <a:spcAft>
+                <a:spcPts val="600"/>
+              </a:spcAft>
+              <a:buClr>
+                <a:srgbClr val="AF0E3F"/>
+              </a:buClr>
+              <a:buSzPct val="140000"/>
+              <a:buFont typeface="Wingdings" panose="05000000000000000000" pitchFamily="2" charset="2"/>
+              <a:buChar char="§"/>
+              <a:defRPr sz="2100">
+                <a:solidFill>
+                  <a:srgbClr val="FF6464"/>
+                </a:solidFill>
+              </a:defRPr>
+            </a:lvl2pPr>
+            <a:lvl3pPr marL="1122998" lvl="2" indent="-342900" algn="l">
+              <a:spcBef>
+                <a:spcPts val="600"/>
+              </a:spcBef>
+              <a:spcAft>
+                <a:spcPts val="600"/>
+              </a:spcAft>
+              <a:buClr>
+                <a:srgbClr val="AF0E3F"/>
+              </a:buClr>
+              <a:buSzPct val="140000"/>
+              <a:buFont typeface="Wingdings" panose="05000000000000000000" pitchFamily="2" charset="2"/>
+              <a:buChar char="§"/>
+              <a:defRPr sz="2100"/>
+            </a:lvl3pPr>
+            <a:lvl4pPr marL="1457325" lvl="3" indent="-342900" algn="l">
+              <a:spcBef>
+                <a:spcPts val="600"/>
+              </a:spcBef>
+              <a:spcAft>
+                <a:spcPts val="600"/>
+              </a:spcAft>
+              <a:buClr>
+                <a:srgbClr val="AF0E3F"/>
+              </a:buClr>
+              <a:buSzPct val="140000"/>
+              <a:buFont typeface="Wingdings" panose="05000000000000000000" pitchFamily="2" charset="2"/>
+              <a:buChar char="§"/>
+              <a:defRPr sz="2100" b="1"/>
+            </a:lvl4pPr>
+            <a:lvl5pPr marL="1800225" lvl="4" indent="-342900" algn="l">
+              <a:spcBef>
+                <a:spcPts val="600"/>
+              </a:spcBef>
+              <a:spcAft>
+                <a:spcPts val="600"/>
+              </a:spcAft>
+              <a:buClr>
+                <a:srgbClr val="AF0E3F"/>
+              </a:buClr>
+              <a:buSzPct val="140000"/>
+              <a:buFont typeface="Wingdings" panose="05000000000000000000" pitchFamily="2" charset="2"/>
+              <a:buChar char="§"/>
+              <a:defRPr sz="2100" i="1">
+                <a:solidFill>
+                  <a:srgbClr val="C00000"/>
+                </a:solidFill>
+              </a:defRPr>
+            </a:lvl5pPr>
+            <a:lvl6pPr marL="1800225" lvl="5" indent="0" algn="l">
+              <a:spcBef>
+                <a:spcPts val="600"/>
+              </a:spcBef>
+              <a:spcAft>
+                <a:spcPts val="600"/>
+              </a:spcAft>
+              <a:buClr>
+                <a:srgbClr val="AF0E3F"/>
+              </a:buClr>
+              <a:buSzPct val="140000"/>
+              <a:buFont typeface="Wingdings" panose="05000000000000000000" pitchFamily="2" charset="2"/>
+              <a:buNone/>
+              <a:defRPr sz="2100"/>
+            </a:lvl6pPr>
+            <a:lvl7pPr marL="2400300" lvl="6" indent="-257175" algn="l">
+              <a:spcBef>
+                <a:spcPts val="270"/>
+              </a:spcBef>
+              <a:spcAft>
+                <a:spcPts val="0"/>
+              </a:spcAft>
+              <a:buSzPts val="1800"/>
+              <a:buChar char="•"/>
+              <a:defRPr/>
+            </a:lvl7pPr>
+            <a:lvl8pPr marL="2743200" lvl="7" indent="-257175" algn="l">
+              <a:spcBef>
+                <a:spcPts val="270"/>
+              </a:spcBef>
+              <a:spcAft>
+                <a:spcPts val="0"/>
+              </a:spcAft>
+              <a:buSzPts val="1800"/>
+              <a:buChar char="•"/>
+              <a:defRPr/>
+            </a:lvl8pPr>
+            <a:lvl9pPr marL="3086100" lvl="8" indent="-257175" algn="l">
+              <a:spcBef>
+                <a:spcPts val="270"/>
+              </a:spcBef>
+              <a:spcAft>
+                <a:spcPts val="0"/>
+              </a:spcAft>
+              <a:buSzPts val="1800"/>
+              <a:buChar char="•"/>
+              <a:defRPr/>
+            </a:lvl9pPr>
+          </a:lstStyle>
+          <a:p>
+            <a:r>
+              <a:rPr lang="en-PH" dirty="0"/>
+              <a:t>Sample text</a:t>
+            </a:r>
+          </a:p>
+        </p:txBody>
+      </p:sp>
+      <p:pic>
+        <p:nvPicPr>
+          <p:cNvPr id="3" name="Graphic 2" descr="Quill with solid fill">
+            <a:extLst>
+              <a:ext uri="{FF2B5EF4-FFF2-40B4-BE49-F238E27FC236}">
+                <a16:creationId xmlns:a16="http://schemas.microsoft.com/office/drawing/2014/main" id="{B9FFA53B-2F18-9DF8-3F6A-763705EA42D4}"/>
+              </a:ext>
+            </a:extLst>
+          </p:cNvPr>
+          <p:cNvPicPr>
+            <a:picLocks noChangeAspect="1"/>
+          </p:cNvPicPr>
+          <p:nvPr userDrawn="1"/>
+        </p:nvPicPr>
+        <p:blipFill>
+          <a:blip r:embed="rId2">
+            <a:extLst>
+              <a:ext uri="{28A0092B-C50C-407E-A947-70E740481C1C}">
+                <a14:useLocalDpi xmlns:a14="http://schemas.microsoft.com/office/drawing/2010/main" val="0"/>
+              </a:ext>
+              <a:ext uri="{96DAC541-7B7A-43D3-8B79-37D633B846F1}">
+                <asvg:svgBlip xmlns:asvg="http://schemas.microsoft.com/office/drawing/2016/SVG/main" r:embed="rId3"/>
+              </a:ext>
+            </a:extLst>
+          </a:blip>
+          <a:stretch>
+            <a:fillRect/>
+          </a:stretch>
+        </p:blipFill>
+        <p:spPr>
+          <a:xfrm>
+            <a:off x="628648" y="108870"/>
+            <a:ext cx="1216291" cy="1216291"/>
+          </a:xfrm>
+          <a:prstGeom prst="rect">
+            <a:avLst/>
+          </a:prstGeom>
+          <a:effectLst>
+            <a:outerShdw dist="38100" dir="8100000" algn="tr" rotWithShape="0">
+              <a:srgbClr val="D64045"/>
+            </a:outerShdw>
+          </a:effectLst>
+        </p:spPr>
+      </p:pic>
+      <p:grpSp>
+        <p:nvGrpSpPr>
+          <p:cNvPr id="2" name="Group 1">
+            <a:extLst>
+              <a:ext uri="{FF2B5EF4-FFF2-40B4-BE49-F238E27FC236}">
+                <a16:creationId xmlns:a16="http://schemas.microsoft.com/office/drawing/2014/main" id="{BDEF291E-D32F-A650-73A0-C6F41F2BDFAB}"/>
+              </a:ext>
+            </a:extLst>
+          </p:cNvPr>
+          <p:cNvGrpSpPr/>
+          <p:nvPr userDrawn="1"/>
+        </p:nvGrpSpPr>
+        <p:grpSpPr>
+          <a:xfrm>
+            <a:off x="457200" y="3829324"/>
+            <a:ext cx="5773918" cy="1057912"/>
+            <a:chOff x="457200" y="3196343"/>
+            <a:chExt cx="5773918" cy="1057912"/>
+          </a:xfrm>
+        </p:grpSpPr>
+        <p:sp>
+          <p:nvSpPr>
+            <p:cNvPr id="13" name="Google Shape;28;p31">
+              <a:extLst>
+                <a:ext uri="{FF2B5EF4-FFF2-40B4-BE49-F238E27FC236}">
+                  <a16:creationId xmlns:a16="http://schemas.microsoft.com/office/drawing/2014/main" id="{69155587-274E-3D4D-6FAB-37A2307CD7B0}"/>
+                </a:ext>
+              </a:extLst>
+            </p:cNvPr>
+            <p:cNvSpPr txBox="1">
+              <a:spLocks/>
+            </p:cNvSpPr>
+            <p:nvPr userDrawn="1"/>
+          </p:nvSpPr>
+          <p:spPr>
+            <a:xfrm>
+              <a:off x="457200" y="3442604"/>
+              <a:ext cx="5773918" cy="619827"/>
+            </a:xfrm>
+            <a:prstGeom prst="rect">
+              <a:avLst/>
+            </a:prstGeom>
+            <a:noFill/>
+            <a:ln>
+              <a:noFill/>
+            </a:ln>
+          </p:spPr>
+          <p:txBody>
+            <a:bodyPr spcFirstLastPara="1" wrap="square" lIns="91425" tIns="45700" rIns="91425" bIns="45700" anchor="ctr" anchorCtr="0">
+              <a:noAutofit/>
+            </a:bodyPr>
+            <a:lstStyle>
+              <a:defPPr marR="0" lvl="0" algn="l" rtl="0">
+                <a:lnSpc>
+                  <a:spcPct val="100000"/>
+                </a:lnSpc>
+                <a:spcBef>
+                  <a:spcPts val="0"/>
+                </a:spcBef>
+                <a:spcAft>
+                  <a:spcPts val="0"/>
+                </a:spcAft>
+              </a:defPPr>
+              <a:lvl1pPr marR="0" lvl="0" algn="l" rtl="0" eaLnBrk="1" hangingPunct="1">
+                <a:lnSpc>
+                  <a:spcPct val="100000"/>
+                </a:lnSpc>
+                <a:spcBef>
+                  <a:spcPts val="0"/>
+                </a:spcBef>
+                <a:spcAft>
+                  <a:spcPts val="0"/>
+                </a:spcAft>
+                <a:buClr>
+                  <a:srgbClr val="C00000"/>
+                </a:buClr>
+                <a:buSzPts val="1800"/>
+                <a:buFont typeface="Arial"/>
+                <a:buNone/>
+                <a:defRPr sz="6000" b="1" i="0" u="none" strike="noStrike" cap="none">
+                  <a:ln w="0">
+                    <a:noFill/>
+                  </a:ln>
+                  <a:solidFill>
+                    <a:srgbClr val="D64045"/>
+                  </a:solidFill>
+                  <a:effectLst>
+                    <a:outerShdw dist="38100" dir="8100000" algn="tr" rotWithShape="0">
+                      <a:srgbClr val="467599"/>
+                    </a:outerShdw>
+                  </a:effectLst>
+                  <a:latin typeface="Bahnschrift Condensed" panose="020B0502040204020203" pitchFamily="34" charset="0"/>
+                  <a:ea typeface="Verdana" panose="020B0604030504040204" pitchFamily="34" charset="0"/>
+                  <a:cs typeface="Helvetica" panose="020B0604020202020204" pitchFamily="34" charset="0"/>
+                  <a:sym typeface="Arial"/>
+                </a:defRPr>
+              </a:lvl1pPr>
+              <a:lvl2pPr marR="0" lvl="1" algn="l" rtl="0" eaLnBrk="1" hangingPunct="1">
+                <a:lnSpc>
+                  <a:spcPct val="100000"/>
+                </a:lnSpc>
+                <a:spcBef>
+                  <a:spcPts val="0"/>
+                </a:spcBef>
+                <a:spcAft>
+                  <a:spcPts val="0"/>
+                </a:spcAft>
+                <a:buClr>
+                  <a:srgbClr val="000000"/>
+                </a:buClr>
+                <a:buSzPts val="1400"/>
+                <a:buFont typeface="Arial"/>
+                <a:buNone/>
+                <a:defRPr sz="1050" b="0" i="0" u="none" strike="noStrike" cap="none">
+                  <a:solidFill>
+                    <a:srgbClr val="000000"/>
+                  </a:solidFill>
+                  <a:latin typeface="Arial"/>
+                  <a:ea typeface="Arial"/>
+                  <a:cs typeface="Arial"/>
+                  <a:sym typeface="Arial"/>
+                </a:defRPr>
+              </a:lvl2pPr>
+              <a:lvl3pPr marR="0" lvl="2" algn="l" rtl="0" eaLnBrk="1" hangingPunct="1">
+                <a:lnSpc>
+                  <a:spcPct val="100000"/>
+                </a:lnSpc>
+                <a:spcBef>
+                  <a:spcPts val="0"/>
+                </a:spcBef>
+                <a:spcAft>
+                  <a:spcPts val="0"/>
+                </a:spcAft>
+                <a:buClr>
+                  <a:srgbClr val="000000"/>
+                </a:buClr>
+                <a:buSzPts val="1400"/>
+                <a:buFont typeface="Arial"/>
+                <a:buNone/>
+                <a:defRPr sz="1050" b="0" i="0" u="none" strike="noStrike" cap="none">
+                  <a:solidFill>
+                    <a:srgbClr val="000000"/>
+                  </a:solidFill>
+                  <a:latin typeface="Arial"/>
+                  <a:ea typeface="Arial"/>
+                  <a:cs typeface="Arial"/>
+                  <a:sym typeface="Arial"/>
+                </a:defRPr>
+              </a:lvl3pPr>
+              <a:lvl4pPr marR="0" lvl="3" algn="l" rtl="0" eaLnBrk="1" hangingPunct="1">
+                <a:lnSpc>
+                  <a:spcPct val="100000"/>
+                </a:lnSpc>
+                <a:spcBef>
+                  <a:spcPts val="0"/>
+                </a:spcBef>
+                <a:spcAft>
+                  <a:spcPts val="0"/>
+                </a:spcAft>
+                <a:buClr>
+                  <a:srgbClr val="000000"/>
+                </a:buClr>
+                <a:buSzPts val="1400"/>
+                <a:buFont typeface="Arial"/>
+                <a:buNone/>
+                <a:defRPr sz="1050" b="0" i="0" u="none" strike="noStrike" cap="none">
+                  <a:solidFill>
+                    <a:srgbClr val="000000"/>
+                  </a:solidFill>
+                  <a:latin typeface="Arial"/>
+                  <a:ea typeface="Arial"/>
+                  <a:cs typeface="Arial"/>
+                  <a:sym typeface="Arial"/>
+                </a:defRPr>
+              </a:lvl4pPr>
+              <a:lvl5pPr marR="0" lvl="4" algn="l" rtl="0" eaLnBrk="1" hangingPunct="1">
+                <a:lnSpc>
+                  <a:spcPct val="100000"/>
+                </a:lnSpc>
+                <a:spcBef>
+                  <a:spcPts val="0"/>
+                </a:spcBef>
+                <a:spcAft>
+                  <a:spcPts val="0"/>
+                </a:spcAft>
+                <a:buClr>
+                  <a:srgbClr val="000000"/>
+                </a:buClr>
+                <a:buSzPts val="1400"/>
+                <a:buFont typeface="Arial"/>
+                <a:buNone/>
+                <a:defRPr sz="1050" b="0" i="0" u="none" strike="noStrike" cap="none">
+                  <a:solidFill>
+                    <a:srgbClr val="000000"/>
+                  </a:solidFill>
+                  <a:latin typeface="Arial"/>
+                  <a:ea typeface="Arial"/>
+                  <a:cs typeface="Arial"/>
+                  <a:sym typeface="Arial"/>
+                </a:defRPr>
+              </a:lvl5pPr>
+              <a:lvl6pPr marR="0" lvl="5" algn="l" rtl="0" eaLnBrk="1" hangingPunct="1">
+                <a:lnSpc>
+                  <a:spcPct val="100000"/>
+                </a:lnSpc>
+                <a:spcBef>
+                  <a:spcPts val="0"/>
+                </a:spcBef>
+                <a:spcAft>
+                  <a:spcPts val="0"/>
+                </a:spcAft>
+                <a:buClr>
+                  <a:srgbClr val="000000"/>
+                </a:buClr>
+                <a:buSzPts val="1400"/>
+                <a:buFont typeface="Arial"/>
+                <a:buNone/>
+                <a:defRPr sz="1050" b="0" i="0" u="none" strike="noStrike" cap="none">
+                  <a:solidFill>
+                    <a:srgbClr val="000000"/>
+                  </a:solidFill>
+                  <a:latin typeface="Arial"/>
+                  <a:ea typeface="Arial"/>
+                  <a:cs typeface="Arial"/>
+                  <a:sym typeface="Arial"/>
+                </a:defRPr>
+              </a:lvl6pPr>
+              <a:lvl7pPr marR="0" lvl="6" algn="l" rtl="0" eaLnBrk="1" hangingPunct="1">
+                <a:lnSpc>
+                  <a:spcPct val="100000"/>
+                </a:lnSpc>
+                <a:spcBef>
+                  <a:spcPts val="0"/>
+                </a:spcBef>
+                <a:spcAft>
+                  <a:spcPts val="0"/>
+                </a:spcAft>
+                <a:buClr>
+                  <a:srgbClr val="000000"/>
+                </a:buClr>
+                <a:buSzPts val="1400"/>
+                <a:buFont typeface="Arial"/>
+                <a:buNone/>
+                <a:defRPr sz="1050" b="0" i="0" u="none" strike="noStrike" cap="none">
+                  <a:solidFill>
+                    <a:srgbClr val="000000"/>
+                  </a:solidFill>
+                  <a:latin typeface="Arial"/>
+                  <a:ea typeface="Arial"/>
+                  <a:cs typeface="Arial"/>
+                  <a:sym typeface="Arial"/>
+                </a:defRPr>
+              </a:lvl7pPr>
+              <a:lvl8pPr marR="0" lvl="7" algn="l" rtl="0" eaLnBrk="1" hangingPunct="1">
+                <a:lnSpc>
+                  <a:spcPct val="100000"/>
+                </a:lnSpc>
+                <a:spcBef>
+                  <a:spcPts val="0"/>
+                </a:spcBef>
+                <a:spcAft>
+                  <a:spcPts val="0"/>
+                </a:spcAft>
+                <a:buClr>
+                  <a:srgbClr val="000000"/>
+                </a:buClr>
+                <a:buSzPts val="1400"/>
+                <a:buFont typeface="Arial"/>
+                <a:buNone/>
+                <a:defRPr sz="1050" b="0" i="0" u="none" strike="noStrike" cap="none">
+                  <a:solidFill>
+                    <a:srgbClr val="000000"/>
+                  </a:solidFill>
+                  <a:latin typeface="Arial"/>
+                  <a:ea typeface="Arial"/>
+                  <a:cs typeface="Arial"/>
+                  <a:sym typeface="Arial"/>
+                </a:defRPr>
+              </a:lvl8pPr>
+              <a:lvl9pPr marR="0" lvl="8" algn="l" rtl="0" eaLnBrk="1" hangingPunct="1">
+                <a:lnSpc>
+                  <a:spcPct val="100000"/>
+                </a:lnSpc>
+                <a:spcBef>
+                  <a:spcPts val="0"/>
+                </a:spcBef>
+                <a:spcAft>
+                  <a:spcPts val="0"/>
+                </a:spcAft>
+                <a:buClr>
+                  <a:srgbClr val="000000"/>
+                </a:buClr>
+                <a:buSzPts val="1400"/>
+                <a:buFont typeface="Arial"/>
+                <a:buNone/>
+                <a:defRPr sz="1050" b="0" i="0" u="none" strike="noStrike" cap="none">
+                  <a:solidFill>
+                    <a:srgbClr val="000000"/>
+                  </a:solidFill>
+                  <a:latin typeface="Arial"/>
+                  <a:ea typeface="Arial"/>
+                  <a:cs typeface="Arial"/>
+                  <a:sym typeface="Arial"/>
+                </a:defRPr>
+              </a:lvl9pPr>
+            </a:lstStyle>
+            <a:p>
+              <a:pPr algn="l"/>
+              <a:r>
+                <a:rPr lang="en-US" dirty="0"/>
+                <a:t>		 references</a:t>
+              </a:r>
+            </a:p>
+          </p:txBody>
+        </p:sp>
+        <p:pic>
+          <p:nvPicPr>
+            <p:cNvPr id="5" name="Graphic 4" descr="Books on shelf with solid fill">
+              <a:extLst>
+                <a:ext uri="{FF2B5EF4-FFF2-40B4-BE49-F238E27FC236}">
+                  <a16:creationId xmlns:a16="http://schemas.microsoft.com/office/drawing/2014/main" id="{AB4532E4-388F-287E-4D9F-36F277E56A34}"/>
+                </a:ext>
+              </a:extLst>
+            </p:cNvPr>
+            <p:cNvPicPr>
+              <a:picLocks noChangeAspect="1"/>
+            </p:cNvPicPr>
+            <p:nvPr userDrawn="1"/>
+          </p:nvPicPr>
+          <p:blipFill>
+            <a:blip r:embed="rId4">
+              <a:extLst>
+                <a:ext uri="{28A0092B-C50C-407E-A947-70E740481C1C}">
+                  <a14:useLocalDpi xmlns:a14="http://schemas.microsoft.com/office/drawing/2010/main" val="0"/>
+                </a:ext>
+                <a:ext uri="{96DAC541-7B7A-43D3-8B79-37D633B846F1}">
+                  <asvg:svgBlip xmlns:asvg="http://schemas.microsoft.com/office/drawing/2016/SVG/main" r:embed="rId5"/>
+                </a:ext>
+              </a:extLst>
+            </a:blip>
+            <a:stretch>
+              <a:fillRect/>
+            </a:stretch>
+          </p:blipFill>
+          <p:spPr>
+            <a:xfrm>
+              <a:off x="628648" y="3196343"/>
+              <a:ext cx="1057912" cy="1057912"/>
+            </a:xfrm>
+            <a:prstGeom prst="rect">
+              <a:avLst/>
+            </a:prstGeom>
+            <a:effectLst>
+              <a:outerShdw dist="38100" dir="8100000" algn="tr" rotWithShape="0">
+                <a:srgbClr val="467599"/>
+              </a:outerShdw>
+            </a:effectLst>
+          </p:spPr>
+        </p:pic>
+      </p:grpSp>
+    </p:spTree>
+    <p:extLst>
+      <p:ext uri="{BB962C8B-B14F-4D97-AF65-F5344CB8AC3E}">
+        <p14:creationId xmlns:p14="http://schemas.microsoft.com/office/powerpoint/2010/main" val="2984985541"/>
+      </p:ext>
+    </p:extLst>
+  </p:cSld>
+  <p:clrMapOvr>
+    <a:masterClrMapping/>
+  </p:clrMapOvr>
+  <mc:AlternateContent xmlns:mc="http://schemas.openxmlformats.org/markup-compatibility/2006" xmlns:p14="http://schemas.microsoft.com/office/powerpoint/2010/main">
+    <mc:Choice Requires="p14">
+      <p:transition p14:dur="200">
+        <p:fade/>
+      </p:transition>
+    </mc:Choice>
+    <mc:Fallback xmlns:ahyp="http://schemas.microsoft.com/office/drawing/2018/hyperlinkcolor" xmlns:p15="http://schemas.microsoft.com/office/powerpoint/2012/main" xmlns:com="http://schemas.openxmlformats.org/drawingml/2006/compatibility" xmlns:pvml="urn:schemas-microsoft-com:office:powerpoint" xmlns:v="urn:schemas-microsoft-com:vml" xmlns:o="urn:schemas-microsoft-com:office:office" xmlns:dgm="http://schemas.openxmlformats.org/drawingml/2006/diagram" xmlns:c="http://schemas.openxmlformats.org/drawingml/2006/chart" xmlns:mv="urn:schemas-microsoft-com:mac:vml" xmlns="">
+      <p:transition>
+        <p:fade/>
+      </p:transition>
+    </mc:Fallback>
+  </mc:AlternateContent>
+</p:sldLayout>
+</file>
+
+<file path=ppt/slideLayouts/slideLayout5.xml><?xml version="1.0" encoding="utf-8"?>
 <p:sldLayout xmlns:a="http://schemas.openxmlformats.org/drawingml/2006/main" xmlns:r="http://schemas.openxmlformats.org/officeDocument/2006/relationships" xmlns:p="http://schemas.openxmlformats.org/presentationml/2006/main" type="obj" preserve="1">
   <p:cSld name="Title and Content">
     <p:spTree>
@@ -5695,7 +8461,7 @@
 </p:sldLayout>
 </file>
 
-<file path=ppt/slideLayouts/slideLayout4.xml><?xml version="1.0" encoding="utf-8"?>
+<file path=ppt/slideLayouts/slideLayout6.xml><?xml version="1.0" encoding="utf-8"?>
 <p:sldLayout xmlns:a="http://schemas.openxmlformats.org/drawingml/2006/main" xmlns:r="http://schemas.openxmlformats.org/officeDocument/2006/relationships" xmlns:p="http://schemas.openxmlformats.org/presentationml/2006/main" type="secHead" preserve="1">
   <p:cSld name="Section Header">
     <p:spTree>
@@ -5946,7 +8712,7 @@
 </p:sldLayout>
 </file>
 
-<file path=ppt/slideLayouts/slideLayout5.xml><?xml version="1.0" encoding="utf-8"?>
+<file path=ppt/slideLayouts/slideLayout7.xml><?xml version="1.0" encoding="utf-8"?>
 <p:sldLayout xmlns:a="http://schemas.openxmlformats.org/drawingml/2006/main" xmlns:r="http://schemas.openxmlformats.org/officeDocument/2006/relationships" xmlns:p="http://schemas.openxmlformats.org/presentationml/2006/main" type="twoObj" preserve="1">
   <p:cSld name="Two Content">
     <p:spTree>
@@ -6185,7 +8951,7 @@
 </p:sldLayout>
 </file>
 
-<file path=ppt/slideLayouts/slideLayout6.xml><?xml version="1.0" encoding="utf-8"?>
+<file path=ppt/slideLayouts/slideLayout8.xml><?xml version="1.0" encoding="utf-8"?>
 <p:sldLayout xmlns:a="http://schemas.openxmlformats.org/drawingml/2006/main" xmlns:r="http://schemas.openxmlformats.org/officeDocument/2006/relationships" xmlns:p="http://schemas.openxmlformats.org/presentationml/2006/main" type="twoTxTwoObj" preserve="1">
   <p:cSld name="Comparison">
     <p:spTree>
@@ -6559,7 +9325,7 @@
 </p:sldLayout>
 </file>
 
-<file path=ppt/slideLayouts/slideLayout7.xml><?xml version="1.0" encoding="utf-8"?>
+<file path=ppt/slideLayouts/slideLayout9.xml><?xml version="1.0" encoding="utf-8"?>
 <p:sldLayout xmlns:a="http://schemas.openxmlformats.org/drawingml/2006/main" xmlns:r="http://schemas.openxmlformats.org/officeDocument/2006/relationships" xmlns:p="http://schemas.openxmlformats.org/presentationml/2006/main" type="titleOnly" preserve="1">
   <p:cSld name="Title Only">
     <p:spTree>
@@ -6675,392 +9441,6 @@
     <p:extLst>
       <p:ext uri="{BB962C8B-B14F-4D97-AF65-F5344CB8AC3E}">
         <p14:creationId xmlns:p14="http://schemas.microsoft.com/office/powerpoint/2010/main" val="1672111681"/>
-      </p:ext>
-    </p:extLst>
-  </p:cSld>
-  <p:clrMapOvr>
-    <a:masterClrMapping/>
-  </p:clrMapOvr>
-</p:sldLayout>
-</file>
-
-<file path=ppt/slideLayouts/slideLayout8.xml><?xml version="1.0" encoding="utf-8"?>
-<p:sldLayout xmlns:a="http://schemas.openxmlformats.org/drawingml/2006/main" xmlns:r="http://schemas.openxmlformats.org/officeDocument/2006/relationships" xmlns:p="http://schemas.openxmlformats.org/presentationml/2006/main" type="blank" preserve="1">
-  <p:cSld name="Blank">
-    <p:spTree>
-      <p:nvGrpSpPr>
-        <p:cNvPr id="1" name=""/>
-        <p:cNvGrpSpPr/>
-        <p:nvPr/>
-      </p:nvGrpSpPr>
-      <p:grpSpPr>
-        <a:xfrm>
-          <a:off x="0" y="0"/>
-          <a:ext cx="0" cy="0"/>
-          <a:chOff x="0" y="0"/>
-          <a:chExt cx="0" cy="0"/>
-        </a:xfrm>
-      </p:grpSpPr>
-      <p:sp>
-        <p:nvSpPr>
-          <p:cNvPr id="2" name="Date Placeholder 1"/>
-          <p:cNvSpPr>
-            <a:spLocks noGrp="1"/>
-          </p:cNvSpPr>
-          <p:nvPr>
-            <p:ph type="dt" sz="half" idx="10"/>
-          </p:nvPr>
-        </p:nvSpPr>
-        <p:spPr>
-          <a:xfrm>
-            <a:off x="628650" y="6356351"/>
-            <a:ext cx="2057400" cy="365125"/>
-          </a:xfrm>
-          <a:prstGeom prst="rect">
-            <a:avLst/>
-          </a:prstGeom>
-        </p:spPr>
-        <p:txBody>
-          <a:bodyPr/>
-          <a:lstStyle/>
-          <a:p>
-            <a:endParaRPr lang="en-US"/>
-          </a:p>
-        </p:txBody>
-      </p:sp>
-      <p:sp>
-        <p:nvSpPr>
-          <p:cNvPr id="3" name="Footer Placeholder 2"/>
-          <p:cNvSpPr>
-            <a:spLocks noGrp="1"/>
-          </p:cNvSpPr>
-          <p:nvPr>
-            <p:ph type="ftr" sz="quarter" idx="11"/>
-          </p:nvPr>
-        </p:nvSpPr>
-        <p:spPr/>
-        <p:txBody>
-          <a:bodyPr/>
-          <a:lstStyle/>
-          <a:p>
-            <a:r>
-              <a:rPr lang="en-US"/>
-              <a:t>Physics 301 - Advanced Signal and Image Processing</a:t>
-            </a:r>
-          </a:p>
-        </p:txBody>
-      </p:sp>
-      <p:sp>
-        <p:nvSpPr>
-          <p:cNvPr id="4" name="Slide Number Placeholder 3"/>
-          <p:cNvSpPr>
-            <a:spLocks noGrp="1"/>
-          </p:cNvSpPr>
-          <p:nvPr>
-            <p:ph type="sldNum" sz="quarter" idx="12"/>
-          </p:nvPr>
-        </p:nvSpPr>
-        <p:spPr/>
-        <p:txBody>
-          <a:bodyPr/>
-          <a:lstStyle/>
-          <a:p>
-            <a:fld id="{8262CFD8-7A98-47E6-A2CC-B17DDA24BA0E}" type="slidenum">
-              <a:rPr lang="en-US" smtClean="0"/>
-              <a:t>‹#›</a:t>
-            </a:fld>
-            <a:endParaRPr lang="en-US"/>
-          </a:p>
-        </p:txBody>
-      </p:sp>
-    </p:spTree>
-    <p:extLst>
-      <p:ext uri="{BB962C8B-B14F-4D97-AF65-F5344CB8AC3E}">
-        <p14:creationId xmlns:p14="http://schemas.microsoft.com/office/powerpoint/2010/main" val="3604995932"/>
-      </p:ext>
-    </p:extLst>
-  </p:cSld>
-  <p:clrMapOvr>
-    <a:masterClrMapping/>
-  </p:clrMapOvr>
-</p:sldLayout>
-</file>
-
-<file path=ppt/slideLayouts/slideLayout9.xml><?xml version="1.0" encoding="utf-8"?>
-<p:sldLayout xmlns:a="http://schemas.openxmlformats.org/drawingml/2006/main" xmlns:r="http://schemas.openxmlformats.org/officeDocument/2006/relationships" xmlns:p="http://schemas.openxmlformats.org/presentationml/2006/main" type="objTx" preserve="1">
-  <p:cSld name="Content with Caption">
-    <p:spTree>
-      <p:nvGrpSpPr>
-        <p:cNvPr id="1" name=""/>
-        <p:cNvGrpSpPr/>
-        <p:nvPr/>
-      </p:nvGrpSpPr>
-      <p:grpSpPr>
-        <a:xfrm>
-          <a:off x="0" y="0"/>
-          <a:ext cx="0" cy="0"/>
-          <a:chOff x="0" y="0"/>
-          <a:chExt cx="0" cy="0"/>
-        </a:xfrm>
-      </p:grpSpPr>
-      <p:sp>
-        <p:nvSpPr>
-          <p:cNvPr id="2" name="Title 1"/>
-          <p:cNvSpPr>
-            <a:spLocks noGrp="1"/>
-          </p:cNvSpPr>
-          <p:nvPr>
-            <p:ph type="title"/>
-          </p:nvPr>
-        </p:nvSpPr>
-        <p:spPr>
-          <a:xfrm>
-            <a:off x="629841" y="457200"/>
-            <a:ext cx="2949178" cy="1600200"/>
-          </a:xfrm>
-        </p:spPr>
-        <p:txBody>
-          <a:bodyPr anchor="b"/>
-          <a:lstStyle>
-            <a:lvl1pPr>
-              <a:defRPr sz="3200"/>
-            </a:lvl1pPr>
-          </a:lstStyle>
-          <a:p>
-            <a:r>
-              <a:rPr lang="en-US"/>
-              <a:t>Click to edit Master title style</a:t>
-            </a:r>
-            <a:endParaRPr lang="en-US" dirty="0"/>
-          </a:p>
-        </p:txBody>
-      </p:sp>
-      <p:sp>
-        <p:nvSpPr>
-          <p:cNvPr id="3" name="Content Placeholder 2"/>
-          <p:cNvSpPr>
-            <a:spLocks noGrp="1"/>
-          </p:cNvSpPr>
-          <p:nvPr>
-            <p:ph idx="1"/>
-          </p:nvPr>
-        </p:nvSpPr>
-        <p:spPr>
-          <a:xfrm>
-            <a:off x="3887391" y="987426"/>
-            <a:ext cx="4629150" cy="4873625"/>
-          </a:xfrm>
-        </p:spPr>
-        <p:txBody>
-          <a:bodyPr/>
-          <a:lstStyle>
-            <a:lvl1pPr>
-              <a:defRPr sz="3200"/>
-            </a:lvl1pPr>
-            <a:lvl2pPr>
-              <a:defRPr sz="2800"/>
-            </a:lvl2pPr>
-            <a:lvl3pPr>
-              <a:defRPr sz="2400"/>
-            </a:lvl3pPr>
-            <a:lvl4pPr>
-              <a:defRPr sz="2000"/>
-            </a:lvl4pPr>
-            <a:lvl5pPr>
-              <a:defRPr sz="2000"/>
-            </a:lvl5pPr>
-            <a:lvl6pPr>
-              <a:defRPr sz="2000"/>
-            </a:lvl6pPr>
-            <a:lvl7pPr>
-              <a:defRPr sz="2000"/>
-            </a:lvl7pPr>
-            <a:lvl8pPr>
-              <a:defRPr sz="2000"/>
-            </a:lvl8pPr>
-            <a:lvl9pPr>
-              <a:defRPr sz="2000"/>
-            </a:lvl9pPr>
-          </a:lstStyle>
-          <a:p>
-            <a:pPr lvl="0"/>
-            <a:r>
-              <a:rPr lang="en-US"/>
-              <a:t>Click to edit Master text styles</a:t>
-            </a:r>
-          </a:p>
-          <a:p>
-            <a:pPr lvl="1"/>
-            <a:r>
-              <a:rPr lang="en-US"/>
-              <a:t>Second level</a:t>
-            </a:r>
-          </a:p>
-          <a:p>
-            <a:pPr lvl="2"/>
-            <a:r>
-              <a:rPr lang="en-US"/>
-              <a:t>Third level</a:t>
-            </a:r>
-          </a:p>
-          <a:p>
-            <a:pPr lvl="3"/>
-            <a:r>
-              <a:rPr lang="en-US"/>
-              <a:t>Fourth level</a:t>
-            </a:r>
-          </a:p>
-          <a:p>
-            <a:pPr lvl="4"/>
-            <a:r>
-              <a:rPr lang="en-US"/>
-              <a:t>Fifth level</a:t>
-            </a:r>
-            <a:endParaRPr lang="en-US" dirty="0"/>
-          </a:p>
-        </p:txBody>
-      </p:sp>
-      <p:sp>
-        <p:nvSpPr>
-          <p:cNvPr id="4" name="Text Placeholder 3"/>
-          <p:cNvSpPr>
-            <a:spLocks noGrp="1"/>
-          </p:cNvSpPr>
-          <p:nvPr>
-            <p:ph type="body" sz="half" idx="2"/>
-          </p:nvPr>
-        </p:nvSpPr>
-        <p:spPr>
-          <a:xfrm>
-            <a:off x="629841" y="2057400"/>
-            <a:ext cx="2949178" cy="3811588"/>
-          </a:xfrm>
-        </p:spPr>
-        <p:txBody>
-          <a:bodyPr/>
-          <a:lstStyle>
-            <a:lvl1pPr marL="0" indent="0">
-              <a:buNone/>
-              <a:defRPr sz="1600"/>
-            </a:lvl1pPr>
-            <a:lvl2pPr marL="457200" indent="0">
-              <a:buNone/>
-              <a:defRPr sz="1400"/>
-            </a:lvl2pPr>
-            <a:lvl3pPr marL="914400" indent="0">
-              <a:buNone/>
-              <a:defRPr sz="1200"/>
-            </a:lvl3pPr>
-            <a:lvl4pPr marL="1371600" indent="0">
-              <a:buNone/>
-              <a:defRPr sz="1000"/>
-            </a:lvl4pPr>
-            <a:lvl5pPr marL="1828800" indent="0">
-              <a:buNone/>
-              <a:defRPr sz="1000"/>
-            </a:lvl5pPr>
-            <a:lvl6pPr marL="2286000" indent="0">
-              <a:buNone/>
-              <a:defRPr sz="1000"/>
-            </a:lvl6pPr>
-            <a:lvl7pPr marL="2743200" indent="0">
-              <a:buNone/>
-              <a:defRPr sz="1000"/>
-            </a:lvl7pPr>
-            <a:lvl8pPr marL="3200400" indent="0">
-              <a:buNone/>
-              <a:defRPr sz="1000"/>
-            </a:lvl8pPr>
-            <a:lvl9pPr marL="3657600" indent="0">
-              <a:buNone/>
-              <a:defRPr sz="1000"/>
-            </a:lvl9pPr>
-          </a:lstStyle>
-          <a:p>
-            <a:pPr lvl="0"/>
-            <a:r>
-              <a:rPr lang="en-US"/>
-              <a:t>Click to edit Master text styles</a:t>
-            </a:r>
-          </a:p>
-        </p:txBody>
-      </p:sp>
-      <p:sp>
-        <p:nvSpPr>
-          <p:cNvPr id="5" name="Date Placeholder 4"/>
-          <p:cNvSpPr>
-            <a:spLocks noGrp="1"/>
-          </p:cNvSpPr>
-          <p:nvPr>
-            <p:ph type="dt" sz="half" idx="10"/>
-          </p:nvPr>
-        </p:nvSpPr>
-        <p:spPr>
-          <a:xfrm>
-            <a:off x="628650" y="6356351"/>
-            <a:ext cx="2057400" cy="365125"/>
-          </a:xfrm>
-          <a:prstGeom prst="rect">
-            <a:avLst/>
-          </a:prstGeom>
-        </p:spPr>
-        <p:txBody>
-          <a:bodyPr/>
-          <a:lstStyle/>
-          <a:p>
-            <a:endParaRPr lang="en-US"/>
-          </a:p>
-        </p:txBody>
-      </p:sp>
-      <p:sp>
-        <p:nvSpPr>
-          <p:cNvPr id="6" name="Footer Placeholder 5"/>
-          <p:cNvSpPr>
-            <a:spLocks noGrp="1"/>
-          </p:cNvSpPr>
-          <p:nvPr>
-            <p:ph type="ftr" sz="quarter" idx="11"/>
-          </p:nvPr>
-        </p:nvSpPr>
-        <p:spPr/>
-        <p:txBody>
-          <a:bodyPr/>
-          <a:lstStyle/>
-          <a:p>
-            <a:r>
-              <a:rPr lang="en-US"/>
-              <a:t>Physics 301 - Advanced Signal and Image Processing</a:t>
-            </a:r>
-          </a:p>
-        </p:txBody>
-      </p:sp>
-      <p:sp>
-        <p:nvSpPr>
-          <p:cNvPr id="7" name="Slide Number Placeholder 6"/>
-          <p:cNvSpPr>
-            <a:spLocks noGrp="1"/>
-          </p:cNvSpPr>
-          <p:nvPr>
-            <p:ph type="sldNum" sz="quarter" idx="12"/>
-          </p:nvPr>
-        </p:nvSpPr>
-        <p:spPr/>
-        <p:txBody>
-          <a:bodyPr/>
-          <a:lstStyle/>
-          <a:p>
-            <a:fld id="{8262CFD8-7A98-47E6-A2CC-B17DDA24BA0E}" type="slidenum">
-              <a:rPr lang="en-US" smtClean="0"/>
-              <a:t>‹#›</a:t>
-            </a:fld>
-            <a:endParaRPr lang="en-US"/>
-          </a:p>
-        </p:txBody>
-      </p:sp>
-    </p:spTree>
-    <p:extLst>
-      <p:ext uri="{BB962C8B-B14F-4D97-AF65-F5344CB8AC3E}">
-        <p14:creationId xmlns:p14="http://schemas.microsoft.com/office/powerpoint/2010/main" val="4138949225"/>
       </p:ext>
     </p:extLst>
   </p:cSld>
@@ -7107,13 +9487,13 @@
           <p:nvPr userDrawn="1"/>
         </p:nvPicPr>
         <p:blipFill>
-          <a:blip r:embed="rId14">
+          <a:blip r:embed="rId16">
             <a:extLst>
               <a:ext uri="{28A0092B-C50C-407E-A947-70E740481C1C}">
                 <a14:useLocalDpi xmlns:a14="http://schemas.microsoft.com/office/drawing/2010/main" val="0"/>
               </a:ext>
               <a:ext uri="{96DAC541-7B7A-43D3-8B79-37D633B846F1}">
-                <asvg:svgBlip xmlns:asvg="http://schemas.microsoft.com/office/drawing/2016/SVG/main" r:embed="rId15"/>
+                <asvg:svgBlip xmlns:asvg="http://schemas.microsoft.com/office/drawing/2016/SVG/main" r:embed="rId17"/>
               </a:ext>
             </a:extLst>
           </a:blip>
@@ -7146,13 +9526,13 @@
           <p:nvPr userDrawn="1"/>
         </p:nvPicPr>
         <p:blipFill>
-          <a:blip r:embed="rId16">
+          <a:blip r:embed="rId18">
             <a:extLst>
               <a:ext uri="{28A0092B-C50C-407E-A947-70E740481C1C}">
                 <a14:useLocalDpi xmlns:a14="http://schemas.microsoft.com/office/drawing/2010/main" val="0"/>
               </a:ext>
               <a:ext uri="{96DAC541-7B7A-43D3-8B79-37D633B846F1}">
-                <asvg:svgBlip xmlns:asvg="http://schemas.microsoft.com/office/drawing/2016/SVG/main" r:embed="rId17"/>
+                <asvg:svgBlip xmlns:asvg="http://schemas.microsoft.com/office/drawing/2016/SVG/main" r:embed="rId19"/>
               </a:ext>
             </a:extLst>
           </a:blip>
@@ -7356,16 +9736,18 @@
   <p:sldLayoutIdLst>
     <p:sldLayoutId id="2147483661" r:id="rId1"/>
     <p:sldLayoutId id="2147483672" r:id="rId2"/>
-    <p:sldLayoutId id="2147483662" r:id="rId3"/>
-    <p:sldLayoutId id="2147483663" r:id="rId4"/>
-    <p:sldLayoutId id="2147483664" r:id="rId5"/>
-    <p:sldLayoutId id="2147483665" r:id="rId6"/>
-    <p:sldLayoutId id="2147483666" r:id="rId7"/>
-    <p:sldLayoutId id="2147483667" r:id="rId8"/>
-    <p:sldLayoutId id="2147483668" r:id="rId9"/>
-    <p:sldLayoutId id="2147483669" r:id="rId10"/>
-    <p:sldLayoutId id="2147483670" r:id="rId11"/>
-    <p:sldLayoutId id="2147483671" r:id="rId12"/>
+    <p:sldLayoutId id="2147483673" r:id="rId3"/>
+    <p:sldLayoutId id="2147483674" r:id="rId4"/>
+    <p:sldLayoutId id="2147483662" r:id="rId5"/>
+    <p:sldLayoutId id="2147483663" r:id="rId6"/>
+    <p:sldLayoutId id="2147483664" r:id="rId7"/>
+    <p:sldLayoutId id="2147483665" r:id="rId8"/>
+    <p:sldLayoutId id="2147483666" r:id="rId9"/>
+    <p:sldLayoutId id="2147483667" r:id="rId10"/>
+    <p:sldLayoutId id="2147483668" r:id="rId11"/>
+    <p:sldLayoutId id="2147483669" r:id="rId12"/>
+    <p:sldLayoutId id="2147483670" r:id="rId13"/>
+    <p:sldLayoutId id="2147483671" r:id="rId14"/>
   </p:sldLayoutIdLst>
   <p:hf hdr="0" dt="0"/>
   <p:txStyles>
@@ -7688,6 +10070,42 @@
           <a:chExt cx="0" cy="0"/>
         </a:xfrm>
       </p:grpSpPr>
+      <p:pic>
+        <p:nvPicPr>
+          <p:cNvPr id="2" name="Picture 1" descr="A picture containing background pattern&#10;&#10;Description automatically generated">
+            <a:extLst>
+              <a:ext uri="{FF2B5EF4-FFF2-40B4-BE49-F238E27FC236}">
+                <a16:creationId xmlns:a16="http://schemas.microsoft.com/office/drawing/2014/main" id="{45B626FA-720E-61BE-CC6E-3BA947159D84}"/>
+              </a:ext>
+            </a:extLst>
+          </p:cNvPr>
+          <p:cNvPicPr>
+            <a:picLocks noChangeAspect="1"/>
+          </p:cNvPicPr>
+          <p:nvPr/>
+        </p:nvPicPr>
+        <p:blipFill>
+          <a:blip r:embed="rId2">
+            <a:extLst>
+              <a:ext uri="{28A0092B-C50C-407E-A947-70E740481C1C}">
+                <a14:useLocalDpi xmlns:a14="http://schemas.microsoft.com/office/drawing/2010/main" val="0"/>
+              </a:ext>
+            </a:extLst>
+          </a:blip>
+          <a:stretch>
+            <a:fillRect/>
+          </a:stretch>
+        </p:blipFill>
+        <p:spPr>
+          <a:xfrm>
+            <a:off x="201529" y="144121"/>
+            <a:ext cx="849365" cy="849365"/>
+          </a:xfrm>
+          <a:prstGeom prst="rect">
+            <a:avLst/>
+          </a:prstGeom>
+        </p:spPr>
+      </p:pic>
     </p:spTree>
     <p:extLst>
       <p:ext uri="{BB962C8B-B14F-4D97-AF65-F5344CB8AC3E}">
@@ -7801,7 +10219,17 @@
             </a:pPr>
             <a:r>
               <a:rPr lang="en-US" sz="2000" dirty="0"/>
-              <a:t>Overall, we demonstrated how PCA can compress large datasets into small representative eigenvectors and shown how sufficient the reconstruction were using RMSE and SAM metrics.</a:t>
+              <a:t>Overall, we demonstrated how </a:t>
+            </a:r>
+            <a:r>
+              <a:rPr lang="en-US" sz="2000" dirty="0">
+                <a:latin typeface="Bahnschrift SemiBold" panose="020B0502040204020203" pitchFamily="34" charset="0"/>
+              </a:rPr>
+              <a:t>PCA can compress large datasets into small representative eigenvectors</a:t>
+            </a:r>
+            <a:r>
+              <a:rPr lang="en-US" sz="2000" dirty="0"/>
+              <a:t> and we’ve shown how sufficient the reconstruction were using RMSE and SAM metrics.</a:t>
             </a:r>
           </a:p>
           <a:p>
@@ -8567,10 +10995,10 @@
       </p:grpSpPr>
       <p:sp>
         <p:nvSpPr>
-          <p:cNvPr id="2" name="Footer Placeholder 1">
+          <p:cNvPr id="5" name="Text Placeholder 4">
             <a:extLst>
               <a:ext uri="{FF2B5EF4-FFF2-40B4-BE49-F238E27FC236}">
-                <a16:creationId xmlns:a16="http://schemas.microsoft.com/office/drawing/2014/main" id="{0119B976-BF6E-0B15-F21A-F0DB09CB3231}"/>
+                <a16:creationId xmlns:a16="http://schemas.microsoft.com/office/drawing/2014/main" id="{AE1588FE-B398-8D82-E60A-3C7E91FE14CF}"/>
               </a:ext>
             </a:extLst>
           </p:cNvPr>
@@ -8578,18 +11006,63 @@
             <a:spLocks noGrp="1"/>
           </p:cNvSpPr>
           <p:nvPr>
-            <p:ph type="ftr" sz="quarter" idx="11"/>
+            <p:ph type="body" idx="1"/>
           </p:nvPr>
         </p:nvSpPr>
-        <p:spPr/>
+        <p:spPr>
+          <a:xfrm>
+            <a:off x="628649" y="1325161"/>
+            <a:ext cx="8058151" cy="2572584"/>
+          </a:xfrm>
+        </p:spPr>
         <p:txBody>
           <a:bodyPr/>
           <a:lstStyle/>
           <a:p>
-            <a:r>
-              <a:rPr lang="en-US"/>
-              <a:t>Physics 301 - Advanced Signal and Image Processing</a:t>
-            </a:r>
+            <a:pPr marL="98583" indent="457200">
+              <a:buNone/>
+            </a:pPr>
+            <a:r>
+              <a:rPr lang="en-US" sz="1400" dirty="0"/>
+              <a:t>In my </a:t>
+            </a:r>
+            <a:r>
+              <a:rPr lang="en-US" dirty="0"/>
+              <a:t>undergraduate skill building training, Dr. Soriano has guided me step-by-step in understanding how Principal Components Analysis works and so, I’d like to give her credit for my smooth execution of this activity. In fact, before I used machine learning, PCA is a state-of-the-art regression technique which I used in reconstructing spectra (which I’ll do in Activity 4). This activity one of the most exciting because we got to work with actual images. I’d like to thank my classmates for providing the face dataset that was used in this activity. More than the technical skillset satisfaction, I’m elated with the realization as to how everything is very much related to each other. Imagine reconstructing a face with just 5 inputs! Out of excitement, I think I went beyond as I measured the eigenvector frequencies, quantified the reconstruction accuracies, discussed the outlier results, and provided sufficient visualization.</a:t>
+            </a:r>
+          </a:p>
+          <a:p>
+            <a:pPr marL="98583" indent="457200">
+              <a:buNone/>
+            </a:pPr>
+            <a:r>
+              <a:rPr lang="en-US" sz="1400" dirty="0"/>
+              <a:t>In this activity, I’d give myself a score of </a:t>
+            </a:r>
+            <a:r>
+              <a:rPr lang="en-US" sz="2000" dirty="0">
+                <a:highlight>
+                  <a:srgbClr val="FFEE9E"/>
+                </a:highlight>
+                <a:latin typeface="Bahnschrift SemiBold" panose="020B0502040204020203" pitchFamily="34" charset="0"/>
+              </a:rPr>
+              <a:t>100/100.</a:t>
+            </a:r>
+            <a:endParaRPr lang="en-US" sz="1400" dirty="0">
+              <a:highlight>
+                <a:srgbClr val="FFEE9E"/>
+              </a:highlight>
+              <a:latin typeface="Bahnschrift SemiBold" panose="020B0502040204020203" pitchFamily="34" charset="0"/>
+            </a:endParaRPr>
+          </a:p>
+          <a:p>
+            <a:endParaRPr lang="en-US" dirty="0"/>
+          </a:p>
+          <a:p>
+            <a:pPr marL="98583" indent="0">
+              <a:buNone/>
+            </a:pPr>
+            <a:endParaRPr lang="en-US" dirty="0"/>
           </a:p>
         </p:txBody>
       </p:sp>
@@ -8616,17 +11089,17 @@
           <a:p>
             <a:r>
               <a:rPr lang="en-US" dirty="0"/>
-              <a:t>References</a:t>
+              <a:t>	reflection</a:t>
             </a:r>
           </a:p>
         </p:txBody>
       </p:sp>
       <p:sp>
         <p:nvSpPr>
-          <p:cNvPr id="9" name="Content Placeholder 8">
+          <p:cNvPr id="2" name="Footer Placeholder 1">
             <a:extLst>
               <a:ext uri="{FF2B5EF4-FFF2-40B4-BE49-F238E27FC236}">
-                <a16:creationId xmlns:a16="http://schemas.microsoft.com/office/drawing/2014/main" id="{E96D88BF-6568-DE4E-D016-9ECF8ED14643}"/>
+                <a16:creationId xmlns:a16="http://schemas.microsoft.com/office/drawing/2014/main" id="{0119B976-BF6E-0B15-F21A-F0DB09CB3231}"/>
               </a:ext>
             </a:extLst>
           </p:cNvPr>
@@ -8634,7 +11107,7 @@
             <a:spLocks noGrp="1"/>
           </p:cNvSpPr>
           <p:nvPr>
-            <p:ph idx="1"/>
+            <p:ph type="ftr" sz="quarter" idx="3"/>
           </p:nvPr>
         </p:nvSpPr>
         <p:spPr/>
@@ -8642,7 +11115,10 @@
           <a:bodyPr/>
           <a:lstStyle/>
           <a:p>
-            <a:endParaRPr lang="en-US"/>
+            <a:r>
+              <a:rPr lang="en-US"/>
+              <a:t>Physics 301 - Advanced Signal and Image Processing</a:t>
+            </a:r>
           </a:p>
         </p:txBody>
       </p:sp>
@@ -8659,7 +11135,7 @@
             <a:spLocks noGrp="1"/>
           </p:cNvSpPr>
           <p:nvPr>
-            <p:ph type="sldNum" sz="quarter" idx="12"/>
+            <p:ph type="sldNum" sz="quarter" idx="4"/>
           </p:nvPr>
         </p:nvSpPr>
         <p:spPr/>
@@ -8672,6 +11148,87 @@
               <a:t>13</a:t>
             </a:fld>
             <a:endParaRPr lang="en-US"/>
+          </a:p>
+        </p:txBody>
+      </p:sp>
+      <p:sp>
+        <p:nvSpPr>
+          <p:cNvPr id="6" name="Text Placeholder 5">
+            <a:extLst>
+              <a:ext uri="{FF2B5EF4-FFF2-40B4-BE49-F238E27FC236}">
+                <a16:creationId xmlns:a16="http://schemas.microsoft.com/office/drawing/2014/main" id="{594B448E-6B29-9976-866C-9D0723CB332B}"/>
+              </a:ext>
+            </a:extLst>
+          </p:cNvPr>
+          <p:cNvSpPr>
+            <a:spLocks noGrp="1"/>
+          </p:cNvSpPr>
+          <p:nvPr>
+            <p:ph type="body" idx="10"/>
+          </p:nvPr>
+        </p:nvSpPr>
+        <p:spPr/>
+        <p:txBody>
+          <a:bodyPr/>
+          <a:lstStyle/>
+          <a:p>
+            <a:r>
+              <a:rPr lang="en-US" dirty="0"/>
+              <a:t>[1] M. Soriano, Physics 301 – Principal Components Analysis for Compression, (2022).</a:t>
+            </a:r>
+          </a:p>
+          <a:p>
+            <a:r>
+              <a:rPr lang="en-US" dirty="0"/>
+              <a:t>[2] </a:t>
+            </a:r>
+            <a:r>
+              <a:rPr lang="en-US" dirty="0" err="1">
+                <a:hlinkClick r:id="rId2"/>
+              </a:rPr>
+              <a:t>sklearn.decomposition.PCA</a:t>
+            </a:r>
+            <a:r>
+              <a:rPr lang="en-US" dirty="0">
+                <a:hlinkClick r:id="rId2"/>
+              </a:rPr>
+              <a:t> — scikit-learn 1.1.1 documentation</a:t>
+            </a:r>
+            <a:endParaRPr lang="en-US" dirty="0"/>
+          </a:p>
+          <a:p>
+            <a:r>
+              <a:rPr lang="en-US" dirty="0"/>
+              <a:t>[3] </a:t>
+            </a:r>
+            <a:r>
+              <a:rPr lang="en-US" dirty="0">
+                <a:hlinkClick r:id="rId3"/>
+              </a:rPr>
+              <a:t>Discrete Fourier Transform (</a:t>
+            </a:r>
+            <a:r>
+              <a:rPr lang="en-US" dirty="0" err="1">
+                <a:hlinkClick r:id="rId3"/>
+              </a:rPr>
+              <a:t>numpy.fft</a:t>
+            </a:r>
+            <a:r>
+              <a:rPr lang="en-US" dirty="0">
+                <a:hlinkClick r:id="rId3"/>
+              </a:rPr>
+              <a:t>) — NumPy v1.22 Manual</a:t>
+            </a:r>
+            <a:endParaRPr lang="en-US" dirty="0"/>
+          </a:p>
+          <a:p>
+            <a:r>
+              <a:rPr lang="en-US" dirty="0"/>
+              <a:t>[4] P. E. Dennison, K. Q. Halligan, and D. A. Roberts, A comparison of error metrics and constraints for multiple endmember spectral mixture analysis and spectral angle mapper, Remote Sens. Environ. 93, 359 (2004).</a:t>
+            </a:r>
+          </a:p>
+          <a:p>
+            <a:endParaRPr lang="en-US" dirty="0"/>
           </a:p>
         </p:txBody>
       </p:sp>
@@ -8685,93 +11242,18 @@
   <p:clrMapOvr>
     <a:masterClrMapping/>
   </p:clrMapOvr>
-</p:sld>
-</file>
-
-<file path=ppt/slides/slide14.xml><?xml version="1.0" encoding="utf-8"?>
-<p:sld xmlns:a="http://schemas.openxmlformats.org/drawingml/2006/main" xmlns:r="http://schemas.openxmlformats.org/officeDocument/2006/relationships" xmlns:p="http://schemas.openxmlformats.org/presentationml/2006/main">
-  <p:cSld>
-    <p:spTree>
-      <p:nvGrpSpPr>
-        <p:cNvPr id="1" name=""/>
-        <p:cNvGrpSpPr/>
-        <p:nvPr/>
-      </p:nvGrpSpPr>
-      <p:grpSpPr>
-        <a:xfrm>
-          <a:off x="0" y="0"/>
-          <a:ext cx="0" cy="0"/>
-          <a:chOff x="0" y="0"/>
-          <a:chExt cx="0" cy="0"/>
-        </a:xfrm>
-      </p:grpSpPr>
-      <p:sp>
-        <p:nvSpPr>
-          <p:cNvPr id="2" name="Footer Placeholder 1">
-            <a:extLst>
-              <a:ext uri="{FF2B5EF4-FFF2-40B4-BE49-F238E27FC236}">
-                <a16:creationId xmlns:a16="http://schemas.microsoft.com/office/drawing/2014/main" id="{EA6DDDA0-FACF-A898-10C7-28525A7B5D07}"/>
-              </a:ext>
-            </a:extLst>
-          </p:cNvPr>
-          <p:cNvSpPr>
-            <a:spLocks noGrp="1"/>
-          </p:cNvSpPr>
-          <p:nvPr>
-            <p:ph type="ftr" sz="quarter" idx="11"/>
-          </p:nvPr>
-        </p:nvSpPr>
-        <p:spPr/>
-        <p:txBody>
-          <a:bodyPr/>
-          <a:lstStyle/>
-          <a:p>
-            <a:r>
-              <a:rPr lang="en-US"/>
-              <a:t>Physics 301 - Advanced Signal and Image Processing</a:t>
-            </a:r>
-          </a:p>
-        </p:txBody>
-      </p:sp>
-      <p:sp>
-        <p:nvSpPr>
-          <p:cNvPr id="3" name="Slide Number Placeholder 2">
-            <a:extLst>
-              <a:ext uri="{FF2B5EF4-FFF2-40B4-BE49-F238E27FC236}">
-                <a16:creationId xmlns:a16="http://schemas.microsoft.com/office/drawing/2014/main" id="{D000F6E4-9CF8-1D07-ED6E-6403F6014DDA}"/>
-              </a:ext>
-            </a:extLst>
-          </p:cNvPr>
-          <p:cNvSpPr>
-            <a:spLocks noGrp="1"/>
-          </p:cNvSpPr>
-          <p:nvPr>
-            <p:ph type="sldNum" sz="quarter" idx="12"/>
-          </p:nvPr>
-        </p:nvSpPr>
-        <p:spPr/>
-        <p:txBody>
-          <a:bodyPr/>
-          <a:lstStyle/>
-          <a:p>
-            <a:fld id="{8262CFD8-7A98-47E6-A2CC-B17DDA24BA0E}" type="slidenum">
-              <a:rPr lang="en-US" smtClean="0"/>
-              <a:t>14</a:t>
-            </a:fld>
-            <a:endParaRPr lang="en-US"/>
-          </a:p>
-        </p:txBody>
-      </p:sp>
-    </p:spTree>
-    <p:extLst>
-      <p:ext uri="{BB962C8B-B14F-4D97-AF65-F5344CB8AC3E}">
-        <p14:creationId xmlns:p14="http://schemas.microsoft.com/office/powerpoint/2010/main" val="1238991180"/>
-      </p:ext>
-    </p:extLst>
-  </p:cSld>
-  <p:clrMapOvr>
-    <a:masterClrMapping/>
-  </p:clrMapOvr>
+  <mc:AlternateContent xmlns:mc="http://schemas.openxmlformats.org/markup-compatibility/2006" xmlns:p14="http://schemas.microsoft.com/office/powerpoint/2010/main">
+    <mc:Choice Requires="p14">
+      <p:transition p14:dur="200">
+        <p:fade/>
+      </p:transition>
+    </mc:Choice>
+    <mc:Fallback xmlns:ahyp="http://schemas.microsoft.com/office/drawing/2018/hyperlinkcolor" xmlns:p15="http://schemas.microsoft.com/office/powerpoint/2012/main" xmlns:com="http://schemas.openxmlformats.org/drawingml/2006/compatibility" xmlns:pvml="urn:schemas-microsoft-com:office:powerpoint" xmlns:v="urn:schemas-microsoft-com:vml" xmlns:o="urn:schemas-microsoft-com:office:office" xmlns:dgm="http://schemas.openxmlformats.org/drawingml/2006/diagram" xmlns:c="http://schemas.openxmlformats.org/drawingml/2006/chart" xmlns:mv="urn:schemas-microsoft-com:mac:vml" xmlns="">
+      <p:transition>
+        <p:fade/>
+      </p:transition>
+    </mc:Fallback>
+  </mc:AlternateContent>
 </p:sld>
 </file>
 
@@ -8792,54 +11274,34 @@
           <a:chExt cx="0" cy="0"/>
         </a:xfrm>
       </p:grpSpPr>
-      <p:sp>
-        <p:nvSpPr>
-          <p:cNvPr id="3" name="Text Placeholder 2">
+      <p:graphicFrame>
+        <p:nvGraphicFramePr>
+          <p:cNvPr id="8" name="Text Placeholder 1">
             <a:extLst>
               <a:ext uri="{FF2B5EF4-FFF2-40B4-BE49-F238E27FC236}">
-                <a16:creationId xmlns:a16="http://schemas.microsoft.com/office/drawing/2014/main" id="{4141F4F5-C6F4-7B1D-CD33-64FE462A99F5}"/>
+                <a16:creationId xmlns:a16="http://schemas.microsoft.com/office/drawing/2014/main" id="{0B842D4E-BA5F-A2C5-AE04-7E52CBED838A}"/>
               </a:ext>
             </a:extLst>
           </p:cNvPr>
-          <p:cNvSpPr>
-            <a:spLocks noGrp="1"/>
-          </p:cNvSpPr>
+          <p:cNvGraphicFramePr/>
           <p:nvPr>
-            <p:ph type="body" idx="10"/>
+            <p:extLst>
+              <p:ext uri="{D42A27DB-BD31-4B8C-83A1-F6EECF244321}">
+                <p14:modId xmlns:p14="http://schemas.microsoft.com/office/powerpoint/2010/main" val="1491925886"/>
+              </p:ext>
+            </p:extLst>
           </p:nvPr>
-        </p:nvSpPr>
-        <p:spPr/>
-        <p:txBody>
-          <a:bodyPr>
-            <a:normAutofit fontScale="92500" lnSpcReduction="20000"/>
-          </a:bodyPr>
-          <a:lstStyle/>
-          <a:p>
-            <a:r>
-              <a:rPr lang="en-US" dirty="0"/>
-              <a:t>Color information is affected by light source, object spectral property, and sensor sensitivity.</a:t>
-            </a:r>
-          </a:p>
-          <a:p>
-            <a:r>
-              <a:rPr lang="en-US" dirty="0"/>
-              <a:t>Spectral information is a more stable descriptor of an object.</a:t>
-            </a:r>
-          </a:p>
-          <a:p>
-            <a:r>
-              <a:rPr lang="en-US" dirty="0"/>
-              <a:t>There is a variety of hyperspectral databases available.</a:t>
-            </a:r>
-          </a:p>
-          <a:p>
-            <a:r>
-              <a:rPr lang="en-US" dirty="0"/>
-              <a:t>Converting spectral information into color is necessary for many reasons.</a:t>
-            </a:r>
-          </a:p>
-        </p:txBody>
-      </p:sp>
+        </p:nvGraphicFramePr>
+        <p:xfrm>
+          <a:off x="628649" y="585387"/>
+          <a:ext cx="8058151" cy="2137701"/>
+        </p:xfrm>
+        <a:graphic>
+          <a:graphicData uri="http://schemas.openxmlformats.org/drawingml/2006/diagram">
+            <dgm:relIds xmlns:dgm="http://schemas.openxmlformats.org/drawingml/2006/diagram" xmlns:r="http://schemas.openxmlformats.org/officeDocument/2006/relationships" r:dm="rId2" r:lo="rId3" r:qs="rId4" r:cs="rId5"/>
+          </a:graphicData>
+        </a:graphic>
+      </p:graphicFrame>
       <p:sp>
         <p:nvSpPr>
           <p:cNvPr id="4" name="Title 3">
@@ -8927,34 +11389,118 @@
           </a:p>
         </p:txBody>
       </p:sp>
-      <p:graphicFrame>
-        <p:nvGraphicFramePr>
-          <p:cNvPr id="8" name="Text Placeholder 1">
+      <p:sp>
+        <p:nvSpPr>
+          <p:cNvPr id="2" name="Text Placeholder 1">
             <a:extLst>
               <a:ext uri="{FF2B5EF4-FFF2-40B4-BE49-F238E27FC236}">
-                <a16:creationId xmlns:a16="http://schemas.microsoft.com/office/drawing/2014/main" id="{0B842D4E-BA5F-A2C5-AE04-7E52CBED838A}"/>
+                <a16:creationId xmlns:a16="http://schemas.microsoft.com/office/drawing/2014/main" id="{44A81EBC-945C-FF82-FD8B-A783E44DBD4C}"/>
               </a:ext>
             </a:extLst>
           </p:cNvPr>
-          <p:cNvGraphicFramePr/>
+          <p:cNvSpPr>
+            <a:spLocks noGrp="1"/>
+          </p:cNvSpPr>
           <p:nvPr>
-            <p:extLst>
-              <p:ext uri="{D42A27DB-BD31-4B8C-83A1-F6EECF244321}">
-                <p14:modId xmlns:p14="http://schemas.microsoft.com/office/powerpoint/2010/main" val="3106875978"/>
-              </p:ext>
-            </p:extLst>
+            <p:ph type="body" idx="10"/>
           </p:nvPr>
-        </p:nvGraphicFramePr>
-        <p:xfrm>
-          <a:off x="628649" y="991786"/>
-          <a:ext cx="8058151" cy="2137701"/>
-        </p:xfrm>
-        <a:graphic>
-          <a:graphicData uri="http://schemas.openxmlformats.org/drawingml/2006/diagram">
-            <dgm:relIds xmlns:dgm="http://schemas.openxmlformats.org/drawingml/2006/diagram" xmlns:r="http://schemas.openxmlformats.org/officeDocument/2006/relationships" r:dm="rId2" r:lo="rId3" r:qs="rId4" r:cs="rId5"/>
-          </a:graphicData>
-        </a:graphic>
-      </p:graphicFrame>
+        </p:nvSpPr>
+        <p:spPr/>
+        <p:txBody>
+          <a:bodyPr>
+            <a:noAutofit/>
+          </a:bodyPr>
+          <a:lstStyle/>
+          <a:p>
+            <a:r>
+              <a:rPr lang="en-US" dirty="0"/>
+              <a:t>Eigenvectors/eigenfaces are analogous to how a bunch of weighted sines and cosines reconstruct signals through linear superposition.</a:t>
+            </a:r>
+          </a:p>
+          <a:p>
+            <a:r>
+              <a:rPr lang="en-US" dirty="0"/>
+              <a:t>Spectral metrics quantify facial reconstruction similarity but outliers in the dataset tend to go around these metrics.</a:t>
+            </a:r>
+          </a:p>
+          <a:p>
+            <a:r>
+              <a:rPr lang="en-US" dirty="0"/>
+              <a:t>PCA can compress large datasets into small representative eigenvectors, effectively reducing its dimensionality.</a:t>
+            </a:r>
+          </a:p>
+        </p:txBody>
+      </p:sp>
+      <p:sp>
+        <p:nvSpPr>
+          <p:cNvPr id="7" name="Text Placeholder 6">
+            <a:extLst>
+              <a:ext uri="{FF2B5EF4-FFF2-40B4-BE49-F238E27FC236}">
+                <a16:creationId xmlns:a16="http://schemas.microsoft.com/office/drawing/2014/main" id="{38E481DD-E255-41F6-13E3-C5B8A6EC2F59}"/>
+              </a:ext>
+            </a:extLst>
+          </p:cNvPr>
+          <p:cNvSpPr>
+            <a:spLocks noGrp="1"/>
+          </p:cNvSpPr>
+          <p:nvPr>
+            <p:ph type="body" idx="11"/>
+          </p:nvPr>
+        </p:nvSpPr>
+        <p:spPr/>
+        <p:txBody>
+          <a:bodyPr/>
+          <a:lstStyle/>
+          <a:p>
+            <a:r>
+              <a:rPr lang="en-US" dirty="0">
+                <a:hlinkClick r:id="rId7"/>
+              </a:rPr>
+              <a:t>Physics-301/Activity 03 - PCA for Compression .</a:t>
+            </a:r>
+            <a:r>
+              <a:rPr lang="en-US" dirty="0" err="1">
+                <a:hlinkClick r:id="rId7"/>
+              </a:rPr>
+              <a:t>ipynb</a:t>
+            </a:r>
+            <a:r>
+              <a:rPr lang="en-US" dirty="0">
+                <a:hlinkClick r:id="rId7"/>
+              </a:rPr>
+              <a:t> at main · </a:t>
+            </a:r>
+            <a:r>
+              <a:rPr lang="en-US" dirty="0" err="1">
+                <a:hlinkClick r:id="rId7"/>
+              </a:rPr>
+              <a:t>reneprincipejr</a:t>
+            </a:r>
+            <a:r>
+              <a:rPr lang="en-US" dirty="0">
+                <a:hlinkClick r:id="rId7"/>
+              </a:rPr>
+              <a:t>/Physics-301 (github.com)</a:t>
+            </a:r>
+            <a:endParaRPr lang="en-US" dirty="0"/>
+          </a:p>
+          <a:p>
+            <a:r>
+              <a:rPr lang="en-US" dirty="0">
+                <a:hlinkClick r:id="rId8"/>
+              </a:rPr>
+              <a:t>https://drive.google.com/file/d/1WPMBsni7iw4YS_oNa47vaFy5YixpR_sG/view?usp=sharing</a:t>
+            </a:r>
+            <a:r>
+              <a:rPr lang="en-US" dirty="0"/>
+              <a:t> </a:t>
+            </a:r>
+          </a:p>
+          <a:p>
+            <a:endParaRPr lang="en-US" dirty="0"/>
+          </a:p>
+        </p:txBody>
+      </p:sp>
     </p:spTree>
     <p:extLst>
       <p:ext uri="{BB962C8B-B14F-4D97-AF65-F5344CB8AC3E}">
@@ -9055,8 +11601,8 @@
           </a:p>
         </p:txBody>
       </p:sp>
-      <mc:AlternateContent xmlns:mc="http://schemas.openxmlformats.org/markup-compatibility/2006">
-        <mc:Choice xmlns:a14="http://schemas.microsoft.com/office/drawing/2010/main" Requires="a14">
+      <mc:AlternateContent xmlns:mc="http://schemas.openxmlformats.org/markup-compatibility/2006" xmlns:a14="http://schemas.microsoft.com/office/drawing/2010/main">
+        <mc:Choice Requires="a14">
           <p:sp>
             <p:nvSpPr>
               <p:cNvPr id="4" name="Content Placeholder 3">
@@ -9084,8 +11630,27 @@
                   <a:buNone/>
                 </a:pPr>
                 <a:r>
+                  <a:rPr lang="en-US" dirty="0">
+                    <a:highlight>
+                      <a:srgbClr val="FFEE9E"/>
+                    </a:highlight>
+                    <a:latin typeface="Bahnschrift SemiBold" panose="020B0502040204020203" pitchFamily="34" charset="0"/>
+                  </a:rPr>
+                  <a:t>Principal Components Analysis </a:t>
+                </a:r>
+                <a:r>
                   <a:rPr lang="en-US" dirty="0"/>
-                  <a:t>Principal Components Analysis is a useful tool to represent a high-dimensional data into a few representative basis vectors which satisfies the eigenvalues equation given by</a:t>
+                  <a:t>is a useful tool to </a:t>
+                </a:r>
+                <a:r>
+                  <a:rPr lang="en-US" dirty="0">
+                    <a:latin typeface="Bahnschrift SemiBold" panose="020B0502040204020203" pitchFamily="34" charset="0"/>
+                  </a:rPr>
+                  <a:t>represent a high-dimensional data into a few basis vectors</a:t>
+                </a:r>
+                <a:r>
+                  <a:rPr lang="en-US" dirty="0"/>
+                  <a:t> which satisfies the eigenvalues equation given by</a:t>
                 </a:r>
               </a:p>
               <a:p>
@@ -9207,7 +11772,27 @@
                 </a:pPr>
                 <a:r>
                   <a:rPr lang="en-US" sz="2000" dirty="0"/>
-                  <a:t>The quality of compression is determined by how large the cumulative sum of the first few eigenvalues can represent the variance of the entire dataset. </a:t>
+                  <a:t>The </a:t>
+                </a:r>
+                <a:r>
+                  <a:rPr lang="en-US" sz="2000" dirty="0">
+                    <a:latin typeface="Bahnschrift SemiBold" panose="020B0502040204020203" pitchFamily="34" charset="0"/>
+                  </a:rPr>
+                  <a:t>quality</a:t>
+                </a:r>
+                <a:r>
+                  <a:rPr lang="en-US" sz="2000" dirty="0"/>
+                  <a:t> of compression is determined by how large the cumulative sum of the first few eigenvalues can </a:t>
+                </a:r>
+                <a:r>
+                  <a:rPr lang="en-US" sz="2000" dirty="0">
+                    <a:latin typeface="Bahnschrift SemiBold" panose="020B0502040204020203" pitchFamily="34" charset="0"/>
+                  </a:rPr>
+                  <a:t>represent the variance of the entire dataset </a:t>
+                </a:r>
+                <a:r>
+                  <a:rPr lang="en-US" sz="2000" dirty="0"/>
+                  <a:t>[1].</a:t>
                 </a:r>
               </a:p>
               <a:p>
@@ -9216,13 +11801,39 @@
                 </a:pPr>
                 <a:r>
                   <a:rPr lang="en-US" sz="2000" dirty="0"/>
-                  <a:t>In this activity, the objective is to derive eigenvectors and their eigenvalues from database of face pictures and qualitatively and quantitatively assess the face reconstructions attempts.</a:t>
+                  <a:t>In this activity, the objective is to </a:t>
+                </a:r>
+                <a:r>
+                  <a:rPr lang="en-US" sz="2000" dirty="0">
+                    <a:solidFill>
+                      <a:srgbClr val="D64045"/>
+                    </a:solidFill>
+                    <a:latin typeface="Bahnschrift SemiBold" panose="020B0502040204020203" pitchFamily="34" charset="0"/>
+                  </a:rPr>
+                  <a:t>derive eigenvectors and their eigenvalues from database of face pictures</a:t>
+                </a:r>
+                <a:r>
+                  <a:rPr lang="en-US" sz="2000" dirty="0"/>
+                  <a:t> and </a:t>
+                </a:r>
+                <a:r>
+                  <a:rPr lang="en-US" sz="2000" dirty="0">
+                    <a:solidFill>
+                      <a:srgbClr val="467599"/>
+                    </a:solidFill>
+                    <a:latin typeface="Bahnschrift SemiBold" panose="020B0502040204020203" pitchFamily="34" charset="0"/>
+                  </a:rPr>
+                  <a:t>qualitatively and quantitatively assess the face reconstructions attempts</a:t>
+                </a:r>
+                <a:r>
+                  <a:rPr lang="en-US" sz="2000" dirty="0"/>
+                  <a:t>.</a:t>
                 </a:r>
               </a:p>
             </p:txBody>
           </p:sp>
         </mc:Choice>
-        <mc:Fallback>
+        <mc:Fallback xmlns="">
           <p:sp>
             <p:nvSpPr>
               <p:cNvPr id="4" name="Content Placeholder 3">
@@ -9403,7 +12014,27 @@
             </a:pPr>
             <a:r>
               <a:rPr lang="en-US" sz="1800" dirty="0"/>
-              <a:t>11 sets of 5 face pictures were compiled and mosaicked into a 55x2500 concatenated image. This flattened dataset and its covariance matrix are shown below. The sets are distinguishable given the separability on every five-index interval along y. Then,  we use the </a:t>
+              <a:t>11 sets of 5 face pictures were compiled and mosaicked into a 55x2500 concatenated image. This flattened dataset and its covariance matrix are shown below. The sets are </a:t>
+            </a:r>
+            <a:r>
+              <a:rPr lang="en-US" sz="1800" dirty="0">
+                <a:latin typeface="Bahnschrift SemiBold" panose="020B0502040204020203" pitchFamily="34" charset="0"/>
+              </a:rPr>
+              <a:t>distinguishable</a:t>
+            </a:r>
+            <a:r>
+              <a:rPr lang="en-US" sz="1800" dirty="0"/>
+              <a:t> given the separability on every </a:t>
+            </a:r>
+            <a:r>
+              <a:rPr lang="en-US" sz="1800" dirty="0">
+                <a:latin typeface="Bahnschrift SemiBold" panose="020B0502040204020203" pitchFamily="34" charset="0"/>
+              </a:rPr>
+              <a:t>five-index interval along y</a:t>
+            </a:r>
+            <a:r>
+              <a:rPr lang="en-US" sz="1800" dirty="0"/>
+              <a:t>. Then, we use the </a:t>
             </a:r>
             <a:r>
               <a:rPr lang="en-US" sz="1800" i="1" dirty="0" err="1"/>
@@ -9411,7 +12042,7 @@
             </a:r>
             <a:r>
               <a:rPr lang="en-US" sz="1800" dirty="0"/>
-              <a:t> in Python to facilitate the Principal Components Analysis.</a:t>
+              <a:t> in Python to facilitate the Principal Components Analysis [2].</a:t>
             </a:r>
           </a:p>
         </p:txBody>
@@ -9605,7 +12236,27 @@
             </a:pPr>
             <a:r>
               <a:rPr lang="en-US" sz="2000" dirty="0"/>
-              <a:t>Taking the cumulative sum of the normalized eigenvalues, we can see that at around 30 principal components can represent 99% of the variance in the face database. Therefore, a set of 2500 datapoints can be represented by 30 principal components with 1% error in representation, hence the “compression”.</a:t>
+              <a:t>Taking the cumulative sum of the normalized eigenvalues, we can see that at around 30 principal components can represent 99% of the variance in the face database. Therefore, </a:t>
+            </a:r>
+            <a:r>
+              <a:rPr lang="en-US" sz="2000" dirty="0">
+                <a:latin typeface="Bahnschrift SemiBold" panose="020B0502040204020203" pitchFamily="34" charset="0"/>
+              </a:rPr>
+              <a:t>a set of 2500 datapoints can be represented by 30 principal components with 1% error</a:t>
+            </a:r>
+            <a:r>
+              <a:rPr lang="en-US" sz="2000" dirty="0"/>
+              <a:t> in representation, hence the “</a:t>
+            </a:r>
+            <a:r>
+              <a:rPr lang="en-US" sz="2000" dirty="0">
+                <a:latin typeface="Bahnschrift SemiBold" panose="020B0502040204020203" pitchFamily="34" charset="0"/>
+              </a:rPr>
+              <a:t>compression</a:t>
+            </a:r>
+            <a:r>
+              <a:rPr lang="en-US" sz="2000" dirty="0"/>
+              <a:t>”.</a:t>
             </a:r>
           </a:p>
         </p:txBody>
@@ -9798,7 +12449,27 @@
             </a:pPr>
             <a:r>
               <a:rPr lang="en-US" sz="1800" dirty="0"/>
-              <a:t>In optics, any signal can be represented as superposition of sines and cosines of varying frequency. I find this analogous to PCA’s eigenvectors which constitutes the facial reconstruction. Taking the Fourier transform reveals that indeed, each eigenvector have varying frequencies. After all, the facial reconstruction is just a linear superposition of these eigenvectors with weights indicated by the eigenvalue calculated.</a:t>
+              <a:t>In optics, </a:t>
+            </a:r>
+            <a:r>
+              <a:rPr lang="en-US" sz="1800" dirty="0">
+                <a:latin typeface="Bahnschrift SemiBold" panose="020B0502040204020203" pitchFamily="34" charset="0"/>
+              </a:rPr>
+              <a:t>any signal can be represented as superposition of sines and cosines of varying frequency</a:t>
+            </a:r>
+            <a:r>
+              <a:rPr lang="en-US" sz="1800" dirty="0"/>
+              <a:t>. I find this analogous to PCA’s eigenvectors which constitutes the facial reconstruction. Taking the Fourier transform reveals that indeed, </a:t>
+            </a:r>
+            <a:r>
+              <a:rPr lang="en-US" sz="1800" dirty="0">
+                <a:latin typeface="Bahnschrift SemiBold" panose="020B0502040204020203" pitchFamily="34" charset="0"/>
+              </a:rPr>
+              <a:t>each eigenvector had varying frequencies </a:t>
+            </a:r>
+            <a:r>
+              <a:rPr lang="en-US" sz="1800" dirty="0"/>
+              <a:t>[3]. Visualizing these eigenvectors into eigenfaces, combinations of these pseudo-images constitute facial reconstruction as it is just a linear superposition of these eigenfaces weighted by the calculated eigenvalues.</a:t>
             </a:r>
           </a:p>
         </p:txBody>
@@ -9861,8 +12532,55 @@
         </p:blipFill>
         <p:spPr bwMode="auto">
           <a:xfrm>
-            <a:off x="1828800" y="3015932"/>
-            <a:ext cx="5486400" cy="3340419"/>
+            <a:off x="285750" y="3366831"/>
+            <a:ext cx="4572000" cy="2783682"/>
+          </a:xfrm>
+          <a:prstGeom prst="rect">
+            <a:avLst/>
+          </a:prstGeom>
+          <a:noFill/>
+          <a:extLst>
+            <a:ext uri="{909E8E84-426E-40DD-AFC4-6F175D3DCCD1}">
+              <a14:hiddenFill xmlns:a14="http://schemas.microsoft.com/office/drawing/2010/main">
+                <a:solidFill>
+                  <a:srgbClr val="FFFFFF"/>
+                </a:solidFill>
+              </a14:hiddenFill>
+            </a:ext>
+          </a:extLst>
+        </p:spPr>
+      </p:pic>
+      <p:pic>
+        <p:nvPicPr>
+          <p:cNvPr id="1030" name="Picture 6">
+            <a:extLst>
+              <a:ext uri="{FF2B5EF4-FFF2-40B4-BE49-F238E27FC236}">
+                <a16:creationId xmlns:a16="http://schemas.microsoft.com/office/drawing/2014/main" id="{58A1BEA5-A07E-D301-1E4A-F15854EBA12B}"/>
+              </a:ext>
+            </a:extLst>
+          </p:cNvPr>
+          <p:cNvPicPr>
+            <a:picLocks noChangeAspect="1" noChangeArrowheads="1"/>
+          </p:cNvPicPr>
+          <p:nvPr/>
+        </p:nvPicPr>
+        <p:blipFill>
+          <a:blip r:embed="rId3">
+            <a:extLst>
+              <a:ext uri="{28A0092B-C50C-407E-A947-70E740481C1C}">
+                <a14:useLocalDpi xmlns:a14="http://schemas.microsoft.com/office/drawing/2010/main" val="0"/>
+              </a:ext>
+            </a:extLst>
+          </a:blip>
+          <a:srcRect/>
+          <a:stretch>
+            <a:fillRect/>
+          </a:stretch>
+        </p:blipFill>
+        <p:spPr bwMode="auto">
+          <a:xfrm>
+            <a:off x="4924425" y="3214609"/>
+            <a:ext cx="3657600" cy="2962354"/>
           </a:xfrm>
           <a:prstGeom prst="rect">
             <a:avLst/>
@@ -9965,8 +12683,8 @@
           </a:p>
         </p:txBody>
       </p:sp>
-      <mc:AlternateContent xmlns:mc="http://schemas.openxmlformats.org/markup-compatibility/2006">
-        <mc:Choice xmlns:a14="http://schemas.microsoft.com/office/drawing/2010/main" Requires="a14">
+      <mc:AlternateContent xmlns:mc="http://schemas.openxmlformats.org/markup-compatibility/2006" xmlns:a14="http://schemas.microsoft.com/office/drawing/2010/main">
+        <mc:Choice Requires="a14">
           <p:sp>
             <p:nvSpPr>
               <p:cNvPr id="6" name="Content Placeholder 5">
@@ -9993,7 +12711,104 @@
                 </a:pPr>
                 <a:r>
                   <a:rPr lang="en-US" sz="1800" dirty="0"/>
-                  <a:t>We employed RMSE and SAM metrics which measures the residual error and structure shape similarity between the actual </a:t>
+                  <a:t>We employed </a:t>
+                </a:r>
+                <a:r>
+                  <a:rPr lang="en-US" sz="1800" dirty="0">
+                    <a:solidFill>
+                      <a:srgbClr val="D64045"/>
+                    </a:solidFill>
+                    <a:latin typeface="Bahnschrift SemiBold" panose="020B0502040204020203" pitchFamily="34" charset="0"/>
+                  </a:rPr>
+                  <a:t>RMSE</a:t>
+                </a:r>
+                <a:r>
+                  <a:rPr lang="en-US" sz="1800" dirty="0"/>
+                  <a:t> and </a:t>
+                </a:r>
+                <a:r>
+                  <a:rPr lang="en-US" sz="1800" dirty="0">
+                    <a:solidFill>
+                      <a:srgbClr val="467599"/>
+                    </a:solidFill>
+                    <a:latin typeface="Bahnschrift SemiBold" panose="020B0502040204020203" pitchFamily="34" charset="0"/>
+                  </a:rPr>
+                  <a:t>SAM</a:t>
+                </a:r>
+                <a:r>
+                  <a:rPr lang="en-US" sz="1800" dirty="0"/>
+                  <a:t> metrics which measures the </a:t>
+                </a:r>
+                <a:r>
+                  <a:rPr lang="en-US" sz="1800" dirty="0">
+                    <a:solidFill>
+                      <a:srgbClr val="D64045"/>
+                    </a:solidFill>
+                    <a:latin typeface="Bahnschrift SemiBold" panose="020B0502040204020203" pitchFamily="34" charset="0"/>
+                  </a:rPr>
+                  <a:t>residual</a:t>
+                </a:r>
+                <a:r>
+                  <a:rPr lang="en-US" sz="1800" dirty="0">
+                    <a:latin typeface="Bahnschrift SemiBold" panose="020B0502040204020203" pitchFamily="34" charset="0"/>
+                  </a:rPr>
+                  <a:t> </a:t>
+                </a:r>
+                <a:r>
+                  <a:rPr lang="en-US" sz="1800" dirty="0">
+                    <a:solidFill>
+                      <a:srgbClr val="D64045"/>
+                    </a:solidFill>
+                    <a:latin typeface="Bahnschrift SemiBold" panose="020B0502040204020203" pitchFamily="34" charset="0"/>
+                  </a:rPr>
+                  <a:t>error</a:t>
+                </a:r>
+                <a:r>
+                  <a:rPr lang="en-US" sz="1800" dirty="0"/>
+                  <a:t> and </a:t>
+                </a:r>
+                <a:r>
+                  <a:rPr lang="en-US" sz="1800" dirty="0">
+                    <a:solidFill>
+                      <a:srgbClr val="467599"/>
+                    </a:solidFill>
+                    <a:latin typeface="Bahnschrift SemiBold" panose="020B0502040204020203" pitchFamily="34" charset="0"/>
+                  </a:rPr>
+                  <a:t>structure</a:t>
+                </a:r>
+                <a:r>
+                  <a:rPr lang="en-US" sz="1800" dirty="0">
+                    <a:latin typeface="Bahnschrift SemiBold" panose="020B0502040204020203" pitchFamily="34" charset="0"/>
+                  </a:rPr>
+                  <a:t> </a:t>
+                </a:r>
+                <a:r>
+                  <a:rPr lang="en-US" sz="1800" dirty="0">
+                    <a:solidFill>
+                      <a:srgbClr val="467599"/>
+                    </a:solidFill>
+                    <a:latin typeface="Bahnschrift SemiBold" panose="020B0502040204020203" pitchFamily="34" charset="0"/>
+                  </a:rPr>
+                  <a:t>shape</a:t>
+                </a:r>
+                <a:r>
+                  <a:rPr lang="en-US" sz="1800" dirty="0">
+                    <a:latin typeface="Bahnschrift SemiBold" panose="020B0502040204020203" pitchFamily="34" charset="0"/>
+                  </a:rPr>
+                  <a:t> </a:t>
+                </a:r>
+                <a:r>
+                  <a:rPr lang="en-US" sz="1800" dirty="0">
+                    <a:solidFill>
+                      <a:srgbClr val="467599"/>
+                    </a:solidFill>
+                    <a:latin typeface="Bahnschrift SemiBold" panose="020B0502040204020203" pitchFamily="34" charset="0"/>
+                  </a:rPr>
+                  <a:t>similarity</a:t>
+                </a:r>
+                <a:r>
+                  <a:rPr lang="en-US" sz="1800" dirty="0"/>
+                  <a:t> between the actual </a:t>
                 </a:r>
                 <a14:m>
                   <m:oMath xmlns:m="http://schemas.openxmlformats.org/officeDocument/2006/math">
@@ -10075,7 +12890,7 @@
                 </a14:m>
                 <a:r>
                   <a:rPr lang="en-US" sz="1800" dirty="0"/>
-                  <a:t> faces, respectively. As shown below, using more eigenfaces allows us to reconstruct better as shown by the declining errors.</a:t>
+                  <a:t> faces, respectively [4]. As shown below, using more eigenfaces allows us to reconstruct better as shown by the declining errors.</a:t>
                 </a:r>
                 <a:br>
                   <a:rPr lang="en-US" sz="1800" dirty="0"/>
@@ -10653,13 +13468,7 @@
                                           <a:rPr lang="en-US" sz="1800" i="1">
                                             <a:latin typeface="Cambria Math" panose="02040503050406030204" pitchFamily="18" charset="0"/>
                                           </a:rPr>
-                                          <m:t> </m:t>
-                                        </m:r>
-                                        <m:r>
-                                          <a:rPr lang="en-US" sz="1800" i="1">
-                                            <a:latin typeface="Cambria Math" panose="02040503050406030204" pitchFamily="18" charset="0"/>
-                                          </a:rPr>
-                                          <m:t> </m:t>
+                                          <m:t>  </m:t>
                                         </m:r>
                                       </m:e>
                                     </m:nary>
@@ -10693,7 +13502,7 @@
             </p:txBody>
           </p:sp>
         </mc:Choice>
-        <mc:Fallback>
+        <mc:Fallback xmlns="">
           <p:sp>
             <p:nvSpPr>
               <p:cNvPr id="6" name="Content Placeholder 5">
@@ -10921,7 +13730,17 @@
             </a:pPr>
             <a:r>
               <a:rPr lang="en-US" sz="1800" dirty="0"/>
-              <a:t>Shown here is the reconstruction of my face using increasing number of principal components. At N = 5, the reconstruction is already recognizable with RMSE = 0.0677 and SAM = 0.107.</a:t>
+              <a:t>Shown here is the reconstruction of my face using increasing number of principal components. </a:t>
+            </a:r>
+            <a:r>
+              <a:rPr lang="en-US" sz="1800" dirty="0">
+                <a:latin typeface="Bahnschrift SemiBold" panose="020B0502040204020203" pitchFamily="34" charset="0"/>
+              </a:rPr>
+              <a:t>At N = 5, the reconstruction is already recognizable with RMSE = 0.0677 and SAM = 0.107</a:t>
+            </a:r>
+            <a:r>
+              <a:rPr lang="en-US" sz="1800" dirty="0"/>
+              <a:t>.</a:t>
             </a:r>
           </a:p>
         </p:txBody>
@@ -11066,12 +13885,104 @@
               <a:t>Averaging the 5 facial image reconstruction of the 11 sets, the disparity in their reconstruction errors trend are mainly attributed to the quality of capture. </a:t>
             </a:r>
             <a:r>
-              <a:rPr lang="en-US" sz="1800" dirty="0" err="1"/>
+              <a:rPr lang="en-US" sz="1800" dirty="0" err="1">
+                <a:latin typeface="Bahnschrift SemiBold" panose="020B0502040204020203" pitchFamily="34" charset="0"/>
+              </a:rPr>
               <a:t>Jonel</a:t>
             </a:r>
             <a:r>
               <a:rPr lang="en-US" sz="1800" dirty="0"/>
-              <a:t> and Lloyd’s error values were low, but they are considered as outliers because unlike the rest of the dataset, their images contain their capture their entire head, hence unaligned with the rest of the data.</a:t>
+              <a:t> and </a:t>
+            </a:r>
+            <a:r>
+              <a:rPr lang="en-US" sz="1800" dirty="0">
+                <a:latin typeface="Bahnschrift SemiBold" panose="020B0502040204020203" pitchFamily="34" charset="0"/>
+              </a:rPr>
+              <a:t>Lloyd’s</a:t>
+            </a:r>
+            <a:r>
+              <a:rPr lang="en-US" sz="1800" dirty="0"/>
+              <a:t> error values were low, but they are considered as </a:t>
+            </a:r>
+            <a:r>
+              <a:rPr lang="en-US" sz="1800" dirty="0">
+                <a:latin typeface="Bahnschrift SemiBold" panose="020B0502040204020203" pitchFamily="34" charset="0"/>
+              </a:rPr>
+              <a:t>outliers</a:t>
+            </a:r>
+            <a:r>
+              <a:rPr lang="en-US" sz="1800" dirty="0"/>
+              <a:t> because unlike the rest of the dataset, their images contain captures of their entire head, hence </a:t>
+            </a:r>
+            <a:r>
+              <a:rPr lang="en-US" sz="1800" dirty="0">
+                <a:latin typeface="Bahnschrift SemiBold" panose="020B0502040204020203" pitchFamily="34" charset="0"/>
+              </a:rPr>
+              <a:t>unaligned</a:t>
+            </a:r>
+            <a:r>
+              <a:rPr lang="en-US" sz="1800" dirty="0"/>
+              <a:t> </a:t>
+            </a:r>
+            <a:r>
+              <a:rPr lang="en-US" sz="1800" dirty="0">
+                <a:latin typeface="Bahnschrift SemiBold" panose="020B0502040204020203" pitchFamily="34" charset="0"/>
+              </a:rPr>
+              <a:t>with</a:t>
+            </a:r>
+            <a:r>
+              <a:rPr lang="en-US" sz="1800" dirty="0"/>
+              <a:t> </a:t>
+            </a:r>
+            <a:r>
+              <a:rPr lang="en-US" sz="1800" dirty="0">
+                <a:latin typeface="Bahnschrift SemiBold" panose="020B0502040204020203" pitchFamily="34" charset="0"/>
+              </a:rPr>
+              <a:t>the</a:t>
+            </a:r>
+            <a:r>
+              <a:rPr lang="en-US" sz="1800" dirty="0"/>
+              <a:t> </a:t>
+            </a:r>
+            <a:r>
+              <a:rPr lang="en-US" sz="1800" dirty="0">
+                <a:latin typeface="Bahnschrift SemiBold" panose="020B0502040204020203" pitchFamily="34" charset="0"/>
+              </a:rPr>
+              <a:t>rest</a:t>
+            </a:r>
+            <a:r>
+              <a:rPr lang="en-US" sz="1800" dirty="0"/>
+              <a:t> </a:t>
+            </a:r>
+            <a:r>
+              <a:rPr lang="en-US" sz="1800" dirty="0">
+                <a:latin typeface="Bahnschrift SemiBold" panose="020B0502040204020203" pitchFamily="34" charset="0"/>
+              </a:rPr>
+              <a:t>of</a:t>
+            </a:r>
+            <a:r>
+              <a:rPr lang="en-US" sz="1800" dirty="0"/>
+              <a:t> </a:t>
+            </a:r>
+            <a:r>
+              <a:rPr lang="en-US" sz="1800" dirty="0">
+                <a:latin typeface="Bahnschrift SemiBold" panose="020B0502040204020203" pitchFamily="34" charset="0"/>
+              </a:rPr>
+              <a:t>the</a:t>
+            </a:r>
+            <a:r>
+              <a:rPr lang="en-US" sz="1800" dirty="0"/>
+              <a:t> </a:t>
+            </a:r>
+            <a:r>
+              <a:rPr lang="en-US" sz="1800" dirty="0">
+                <a:latin typeface="Bahnschrift SemiBold" panose="020B0502040204020203" pitchFamily="34" charset="0"/>
+              </a:rPr>
+              <a:t>data</a:t>
+            </a:r>
+            <a:r>
+              <a:rPr lang="en-US" sz="1800" dirty="0"/>
+              <a:t>.</a:t>
             </a:r>
           </a:p>
         </p:txBody>

</xml_diff>

<commit_message>
Fixed the PDF renders
</commit_message>
<xml_diff>
--- a/03 PCA for Compression/Activity 3 - PCA for Compression.pptx
+++ b/03 PCA for Compression/Activity 3 - PCA for Compression.pptx
@@ -2785,7 +2785,7 @@
           <a:p>
             <a:fld id="{5C1B11F4-4A81-4A1F-8746-8659FC968F94}" type="datetimeFigureOut">
               <a:rPr lang="en-US" smtClean="0"/>
-              <a:t>6/6/2022</a:t>
+              <a:t>6/7/2022</a:t>
             </a:fld>
             <a:endParaRPr lang="en-US"/>
           </a:p>
@@ -5263,7 +5263,7 @@
               </a:buClr>
               <a:buSzPts val="1800"/>
               <a:buNone/>
-              <a:defRPr sz="6000" b="1">
+              <a:defRPr sz="6000" b="1" spc="-300">
                 <a:ln w="0">
                   <a:noFill/>
                 </a:ln>
@@ -5275,7 +5275,7 @@
                     <a:srgbClr val="D64045"/>
                   </a:outerShdw>
                 </a:effectLst>
-                <a:latin typeface="Bahnschrift Condensed" panose="020B0502040204020203" pitchFamily="34" charset="0"/>
+                <a:latin typeface="Bahnschrift SemiBold" panose="020B0502040204020203" pitchFamily="34" charset="0"/>
                 <a:cs typeface="Helvetica" panose="020B0604020202020204" pitchFamily="34" charset="0"/>
               </a:defRPr>
             </a:lvl1pPr>
@@ -5436,9 +5436,9 @@
         <p:grpSpPr>
           <a:xfrm>
             <a:off x="457200" y="2618293"/>
-            <a:ext cx="5773918" cy="1143536"/>
+            <a:ext cx="6528062" cy="1143536"/>
             <a:chOff x="457200" y="3429000"/>
-            <a:chExt cx="5773918" cy="1143536"/>
+            <a:chExt cx="6528062" cy="1143536"/>
           </a:xfrm>
         </p:grpSpPr>
         <p:sp>
@@ -5458,7 +5458,7 @@
           <p:spPr>
             <a:xfrm>
               <a:off x="457200" y="3791354"/>
-              <a:ext cx="5773918" cy="619827"/>
+              <a:ext cx="6528062" cy="619827"/>
             </a:xfrm>
             <a:prstGeom prst="rect">
               <a:avLst/>
@@ -5730,7 +5730,9 @@
             <a:p>
               <a:pPr algn="l"/>
               <a:r>
-                <a:rPr lang="en-US" dirty="0"/>
+                <a:rPr lang="en-US" spc="-300" dirty="0">
+                  <a:latin typeface="Bahnschrift SemiBold" panose="020B0502040204020203" pitchFamily="34" charset="0"/>
+                </a:rPr>
                 <a:t>		 key take-aways</a:t>
               </a:r>
             </a:p>
@@ -5889,7 +5891,7 @@
         <p:fade/>
       </p:transition>
     </mc:Choice>
-    <mc:Fallback xmlns:ahyp="http://schemas.microsoft.com/office/drawing/2018/hyperlinkcolor" xmlns:p15="http://schemas.microsoft.com/office/powerpoint/2012/main" xmlns:com="http://schemas.openxmlformats.org/drawingml/2006/compatibility" xmlns:pvml="urn:schemas-microsoft-com:office:powerpoint" xmlns:v="urn:schemas-microsoft-com:vml" xmlns:o="urn:schemas-microsoft-com:office:office" xmlns:dgm="http://schemas.openxmlformats.org/drawingml/2006/diagram" xmlns:c="http://schemas.openxmlformats.org/drawingml/2006/chart" xmlns:mv="urn:schemas-microsoft-com:mac:vml" xmlns="">
+    <mc:Fallback xmlns="" xmlns:mv="urn:schemas-microsoft-com:mac:vml" xmlns:c="http://schemas.openxmlformats.org/drawingml/2006/chart" xmlns:dgm="http://schemas.openxmlformats.org/drawingml/2006/diagram" xmlns:o="urn:schemas-microsoft-com:office:office" xmlns:v="urn:schemas-microsoft-com:vml" xmlns:pvml="urn:schemas-microsoft-com:office:powerpoint" xmlns:com="http://schemas.openxmlformats.org/drawingml/2006/compatibility" xmlns:p15="http://schemas.microsoft.com/office/powerpoint/2012/main" xmlns:ahyp="http://schemas.microsoft.com/office/drawing/2018/hyperlinkcolor">
       <p:transition>
         <p:fade/>
       </p:transition>
@@ -6151,7 +6153,7 @@
               </a:buClr>
               <a:buSzPts val="1800"/>
               <a:buNone/>
-              <a:defRPr sz="6000" b="1">
+              <a:defRPr sz="6000" b="1" spc="-300">
                 <a:ln w="0">
                   <a:noFill/>
                 </a:ln>
@@ -6163,7 +6165,7 @@
                     <a:srgbClr val="D64045"/>
                   </a:outerShdw>
                 </a:effectLst>
-                <a:latin typeface="Bahnschrift Condensed" panose="020B0502040204020203" pitchFamily="34" charset="0"/>
+                <a:latin typeface="Bahnschrift SemiBold" panose="020B0502040204020203" pitchFamily="34" charset="0"/>
                 <a:cs typeface="Helvetica" panose="020B0604020202020204" pitchFamily="34" charset="0"/>
               </a:defRPr>
             </a:lvl1pPr>
@@ -6416,10 +6418,10 @@
         </p:nvGrpSpPr>
         <p:grpSpPr>
           <a:xfrm>
-            <a:off x="457200" y="1946934"/>
-            <a:ext cx="5773918" cy="1143536"/>
-            <a:chOff x="457200" y="3429000"/>
-            <a:chExt cx="5773918" cy="1143536"/>
+            <a:off x="457199" y="1946934"/>
+            <a:ext cx="6311245" cy="1143536"/>
+            <a:chOff x="457199" y="3429000"/>
+            <a:chExt cx="6311245" cy="1143536"/>
           </a:xfrm>
         </p:grpSpPr>
         <p:sp>
@@ -6438,8 +6440,8 @@
           </p:nvSpPr>
           <p:spPr>
             <a:xfrm>
-              <a:off x="457200" y="3791354"/>
-              <a:ext cx="5773918" cy="619827"/>
+              <a:off x="457199" y="3791354"/>
+              <a:ext cx="6311245" cy="619827"/>
             </a:xfrm>
             <a:prstGeom prst="rect">
               <a:avLst/>
@@ -6711,7 +6713,9 @@
             <a:p>
               <a:pPr algn="l"/>
               <a:r>
-                <a:rPr lang="en-US" dirty="0"/>
+                <a:rPr lang="en-US" spc="-300" dirty="0">
+                  <a:latin typeface="Bahnschrift SemiBold" panose="020B0502040204020203" pitchFamily="34" charset="0"/>
+                </a:rPr>
                 <a:t>		 key take-aways</a:t>
               </a:r>
             </a:p>
@@ -7196,7 +7200,7 @@
         <p:fade/>
       </p:transition>
     </mc:Choice>
-    <mc:Fallback xmlns:ahyp="http://schemas.microsoft.com/office/drawing/2018/hyperlinkcolor" xmlns:p15="http://schemas.microsoft.com/office/powerpoint/2012/main" xmlns:com="http://schemas.openxmlformats.org/drawingml/2006/compatibility" xmlns:pvml="urn:schemas-microsoft-com:office:powerpoint" xmlns:v="urn:schemas-microsoft-com:vml" xmlns:o="urn:schemas-microsoft-com:office:office" xmlns:dgm="http://schemas.openxmlformats.org/drawingml/2006/diagram" xmlns:c="http://schemas.openxmlformats.org/drawingml/2006/chart" xmlns:mv="urn:schemas-microsoft-com:mac:vml" xmlns="">
+    <mc:Fallback xmlns="" xmlns:mv="urn:schemas-microsoft-com:mac:vml" xmlns:c="http://schemas.openxmlformats.org/drawingml/2006/chart" xmlns:dgm="http://schemas.openxmlformats.org/drawingml/2006/diagram" xmlns:o="urn:schemas-microsoft-com:office:office" xmlns:v="urn:schemas-microsoft-com:vml" xmlns:pvml="urn:schemas-microsoft-com:office:powerpoint" xmlns:com="http://schemas.openxmlformats.org/drawingml/2006/compatibility" xmlns:p15="http://schemas.microsoft.com/office/powerpoint/2012/main" xmlns:ahyp="http://schemas.microsoft.com/office/drawing/2018/hyperlinkcolor">
       <p:transition>
         <p:fade/>
       </p:transition>
@@ -7458,7 +7462,7 @@
               </a:buClr>
               <a:buSzPts val="1800"/>
               <a:buNone/>
-              <a:defRPr sz="6000" b="1">
+              <a:defRPr sz="6000" b="1" spc="-300">
                 <a:ln w="0">
                   <a:noFill/>
                 </a:ln>
@@ -7470,7 +7474,7 @@
                     <a:srgbClr val="D64045"/>
                   </a:outerShdw>
                 </a:effectLst>
-                <a:latin typeface="Bahnschrift Condensed" panose="020B0502040204020203" pitchFamily="34" charset="0"/>
+                <a:latin typeface="Bahnschrift SemiBold" panose="020B0502040204020203" pitchFamily="34" charset="0"/>
                 <a:cs typeface="Helvetica" panose="020B0604020202020204" pitchFamily="34" charset="0"/>
               </a:defRPr>
             </a:lvl1pPr>
@@ -8204,7 +8208,13 @@
               <a:pPr algn="l"/>
               <a:r>
                 <a:rPr lang="en-US" dirty="0"/>
-                <a:t>		 references</a:t>
+                <a:t>		 </a:t>
+              </a:r>
+              <a:r>
+                <a:rPr lang="en-US" spc="-300" dirty="0">
+                  <a:latin typeface="Bahnschrift SemiBold" panose="020B0502040204020203" pitchFamily="34" charset="0"/>
+                </a:rPr>
+                <a:t>references</a:t>
               </a:r>
             </a:p>
           </p:txBody>
@@ -8270,7 +8280,7 @@
         <p:fade/>
       </p:transition>
     </mc:Choice>
-    <mc:Fallback xmlns:ahyp="http://schemas.microsoft.com/office/drawing/2018/hyperlinkcolor" xmlns:p15="http://schemas.microsoft.com/office/powerpoint/2012/main" xmlns:com="http://schemas.openxmlformats.org/drawingml/2006/compatibility" xmlns:pvml="urn:schemas-microsoft-com:office:powerpoint" xmlns:v="urn:schemas-microsoft-com:vml" xmlns:o="urn:schemas-microsoft-com:office:office" xmlns:dgm="http://schemas.openxmlformats.org/drawingml/2006/diagram" xmlns:c="http://schemas.openxmlformats.org/drawingml/2006/chart" xmlns:mv="urn:schemas-microsoft-com:mac:vml" xmlns="">
+    <mc:Fallback xmlns="" xmlns:mv="urn:schemas-microsoft-com:mac:vml" xmlns:c="http://schemas.openxmlformats.org/drawingml/2006/chart" xmlns:dgm="http://schemas.openxmlformats.org/drawingml/2006/diagram" xmlns:o="urn:schemas-microsoft-com:office:office" xmlns:v="urn:schemas-microsoft-com:vml" xmlns:pvml="urn:schemas-microsoft-com:office:powerpoint" xmlns:com="http://schemas.openxmlformats.org/drawingml/2006/compatibility" xmlns:p15="http://schemas.microsoft.com/office/powerpoint/2012/main" xmlns:ahyp="http://schemas.microsoft.com/office/drawing/2018/hyperlinkcolor">
       <p:transition>
         <p:fade/>
       </p:transition>
@@ -8332,7 +8342,13 @@
         <p:spPr/>
         <p:txBody>
           <a:bodyPr/>
-          <a:lstStyle/>
+          <a:lstStyle>
+            <a:lvl1pPr>
+              <a:defRPr spc="-300">
+                <a:latin typeface="Bahnschrift SemiBold" panose="020B0502040204020203" pitchFamily="34" charset="0"/>
+              </a:defRPr>
+            </a:lvl1pPr>
+          </a:lstStyle>
           <a:p>
             <a:r>
               <a:rPr lang="en-US" dirty="0"/>
@@ -11248,7 +11264,7 @@
         <p:fade/>
       </p:transition>
     </mc:Choice>
-    <mc:Fallback xmlns:ahyp="http://schemas.microsoft.com/office/drawing/2018/hyperlinkcolor" xmlns:p15="http://schemas.microsoft.com/office/powerpoint/2012/main" xmlns:com="http://schemas.openxmlformats.org/drawingml/2006/compatibility" xmlns:pvml="urn:schemas-microsoft-com:office:powerpoint" xmlns:v="urn:schemas-microsoft-com:vml" xmlns:o="urn:schemas-microsoft-com:office:office" xmlns:dgm="http://schemas.openxmlformats.org/drawingml/2006/diagram" xmlns:c="http://schemas.openxmlformats.org/drawingml/2006/chart" xmlns:mv="urn:schemas-microsoft-com:mac:vml" xmlns="">
+    <mc:Fallback xmlns="" xmlns:mv="urn:schemas-microsoft-com:mac:vml" xmlns:c="http://schemas.openxmlformats.org/drawingml/2006/chart" xmlns:dgm="http://schemas.openxmlformats.org/drawingml/2006/diagram" xmlns:o="urn:schemas-microsoft-com:office:office" xmlns:v="urn:schemas-microsoft-com:vml" xmlns:pvml="urn:schemas-microsoft-com:office:powerpoint" xmlns:com="http://schemas.openxmlformats.org/drawingml/2006/compatibility" xmlns:p15="http://schemas.microsoft.com/office/powerpoint/2012/main" xmlns:ahyp="http://schemas.microsoft.com/office/drawing/2018/hyperlinkcolor">
       <p:transition>
         <p:fade/>
       </p:transition>
@@ -11517,7 +11533,7 @@
         <p:fade/>
       </p:transition>
     </mc:Choice>
-    <mc:Fallback xmlns:ahyp="http://schemas.microsoft.com/office/drawing/2018/hyperlinkcolor" xmlns:p15="http://schemas.microsoft.com/office/powerpoint/2012/main" xmlns:com="http://schemas.openxmlformats.org/drawingml/2006/compatibility" xmlns:pvml="urn:schemas-microsoft-com:office:powerpoint" xmlns:v="urn:schemas-microsoft-com:vml" xmlns:o="urn:schemas-microsoft-com:office:office" xmlns:dgm="http://schemas.openxmlformats.org/drawingml/2006/diagram" xmlns:c="http://schemas.openxmlformats.org/drawingml/2006/chart" xmlns:mv="urn:schemas-microsoft-com:mac:vml" xmlns="">
+    <mc:Fallback xmlns="" xmlns:mv="urn:schemas-microsoft-com:mac:vml" xmlns:c="http://schemas.openxmlformats.org/drawingml/2006/chart" xmlns:dgm="http://schemas.openxmlformats.org/drawingml/2006/diagram" xmlns:o="urn:schemas-microsoft-com:office:office" xmlns:v="urn:schemas-microsoft-com:vml" xmlns:pvml="urn:schemas-microsoft-com:office:powerpoint" xmlns:com="http://schemas.openxmlformats.org/drawingml/2006/compatibility" xmlns:p15="http://schemas.microsoft.com/office/powerpoint/2012/main" xmlns:ahyp="http://schemas.microsoft.com/office/drawing/2018/hyperlinkcolor">
       <p:transition>
         <p:fade/>
       </p:transition>

</xml_diff>

<commit_message>
Finished Activity 5 code
</commit_message>
<xml_diff>
--- a/03 PCA for Compression/Activity 3 - PCA for Compression.pptx
+++ b/03 PCA for Compression/Activity 3 - PCA for Compression.pptx
@@ -3655,7 +3655,11 @@
                 <a:solidFill>
                   <a:srgbClr val="467599"/>
                 </a:solidFill>
-                <a:effectLst/>
+                <a:effectLst>
+                  <a:outerShdw dist="50800" dir="8100000" algn="tr" rotWithShape="0">
+                    <a:prstClr val="black"/>
+                  </a:outerShdw>
+                </a:effectLst>
                 <a:latin typeface="Bahnschrift Condensed" panose="020B0502040204020203" pitchFamily="34" charset="0"/>
                 <a:ea typeface="Verdana" panose="020B0604030504040204" pitchFamily="34" charset="0"/>
                 <a:cs typeface="Helvetica" panose="020B0604020202020204" pitchFamily="34" charset="0"/>
@@ -3667,7 +3671,11 @@
                 <a:solidFill>
                   <a:srgbClr val="D64045"/>
                 </a:solidFill>
-                <a:effectLst/>
+                <a:effectLst>
+                  <a:outerShdw dist="50800" dir="8100000" algn="tr" rotWithShape="0">
+                    <a:prstClr val="black"/>
+                  </a:outerShdw>
+                </a:effectLst>
                 <a:latin typeface="Bahnschrift Condensed" panose="020B0502040204020203" pitchFamily="34" charset="0"/>
                 <a:ea typeface="Verdana" panose="020B0604030504040204" pitchFamily="34" charset="0"/>
                 <a:cs typeface="Helvetica" panose="020B0604020202020204" pitchFamily="34" charset="0"/>
@@ -3717,7 +3725,11 @@
                 <a:solidFill>
                   <a:srgbClr val="467599"/>
                 </a:solidFill>
-                <a:effectLst/>
+                <a:effectLst>
+                  <a:outerShdw dist="50800" dir="8100000" algn="tr" rotWithShape="0">
+                    <a:prstClr val="black"/>
+                  </a:outerShdw>
+                </a:effectLst>
                 <a:latin typeface="Bahnschrift Condensed" panose="020B0502040204020203" pitchFamily="34" charset="0"/>
                 <a:ea typeface="Verdana" panose="020B0604030504040204" pitchFamily="34" charset="0"/>
                 <a:cs typeface="Helvetica" panose="020B0604020202020204" pitchFamily="34" charset="0"/>
@@ -3729,7 +3741,11 @@
                 <a:solidFill>
                   <a:srgbClr val="D64045"/>
                 </a:solidFill>
-                <a:effectLst/>
+                <a:effectLst>
+                  <a:outerShdw dist="50800" dir="8100000" algn="tr" rotWithShape="0">
+                    <a:prstClr val="black"/>
+                  </a:outerShdw>
+                </a:effectLst>
                 <a:latin typeface="Bahnschrift Condensed" panose="020B0502040204020203" pitchFamily="34" charset="0"/>
                 <a:ea typeface="Verdana" panose="020B0604030504040204" pitchFamily="34" charset="0"/>
                 <a:cs typeface="Helvetica" panose="020B0604020202020204" pitchFamily="34" charset="0"/>
@@ -3779,7 +3795,11 @@
                 <a:solidFill>
                   <a:srgbClr val="467599"/>
                 </a:solidFill>
-                <a:effectLst/>
+                <a:effectLst>
+                  <a:outerShdw dist="50800" dir="8100000" algn="tr" rotWithShape="0">
+                    <a:prstClr val="black"/>
+                  </a:outerShdw>
+                </a:effectLst>
                 <a:latin typeface="Bahnschrift Condensed" panose="020B0502040204020203" pitchFamily="34" charset="0"/>
                 <a:ea typeface="Verdana" panose="020B0604030504040204" pitchFamily="34" charset="0"/>
                 <a:cs typeface="Helvetica" panose="020B0604020202020204" pitchFamily="34" charset="0"/>
@@ -3791,7 +3811,11 @@
                 <a:solidFill>
                   <a:srgbClr val="D64045"/>
                 </a:solidFill>
-                <a:effectLst/>
+                <a:effectLst>
+                  <a:outerShdw dist="50800" dir="8100000" algn="tr" rotWithShape="0">
+                    <a:prstClr val="black"/>
+                  </a:outerShdw>
+                </a:effectLst>
                 <a:latin typeface="Bahnschrift Condensed" panose="020B0502040204020203" pitchFamily="34" charset="0"/>
                 <a:ea typeface="Verdana" panose="020B0604030504040204" pitchFamily="34" charset="0"/>
                 <a:cs typeface="Helvetica" panose="020B0604020202020204" pitchFamily="34" charset="0"/>
@@ -5891,7 +5915,7 @@
         <p:fade/>
       </p:transition>
     </mc:Choice>
-    <mc:Fallback xmlns="" xmlns:mv="urn:schemas-microsoft-com:mac:vml" xmlns:c="http://schemas.openxmlformats.org/drawingml/2006/chart" xmlns:dgm="http://schemas.openxmlformats.org/drawingml/2006/diagram" xmlns:o="urn:schemas-microsoft-com:office:office" xmlns:v="urn:schemas-microsoft-com:vml" xmlns:pvml="urn:schemas-microsoft-com:office:powerpoint" xmlns:com="http://schemas.openxmlformats.org/drawingml/2006/compatibility" xmlns:p15="http://schemas.microsoft.com/office/powerpoint/2012/main" xmlns:ahyp="http://schemas.microsoft.com/office/drawing/2018/hyperlinkcolor">
+    <mc:Fallback xmlns:ahyp="http://schemas.microsoft.com/office/drawing/2018/hyperlinkcolor" xmlns:p15="http://schemas.microsoft.com/office/powerpoint/2012/main" xmlns:com="http://schemas.openxmlformats.org/drawingml/2006/compatibility" xmlns:pvml="urn:schemas-microsoft-com:office:powerpoint" xmlns:v="urn:schemas-microsoft-com:vml" xmlns:o="urn:schemas-microsoft-com:office:office" xmlns:dgm="http://schemas.openxmlformats.org/drawingml/2006/diagram" xmlns:c="http://schemas.openxmlformats.org/drawingml/2006/chart" xmlns:mv="urn:schemas-microsoft-com:mac:vml" xmlns="">
       <p:transition>
         <p:fade/>
       </p:transition>
@@ -7200,7 +7224,7 @@
         <p:fade/>
       </p:transition>
     </mc:Choice>
-    <mc:Fallback xmlns="" xmlns:mv="urn:schemas-microsoft-com:mac:vml" xmlns:c="http://schemas.openxmlformats.org/drawingml/2006/chart" xmlns:dgm="http://schemas.openxmlformats.org/drawingml/2006/diagram" xmlns:o="urn:schemas-microsoft-com:office:office" xmlns:v="urn:schemas-microsoft-com:vml" xmlns:pvml="urn:schemas-microsoft-com:office:powerpoint" xmlns:com="http://schemas.openxmlformats.org/drawingml/2006/compatibility" xmlns:p15="http://schemas.microsoft.com/office/powerpoint/2012/main" xmlns:ahyp="http://schemas.microsoft.com/office/drawing/2018/hyperlinkcolor">
+    <mc:Fallback xmlns:ahyp="http://schemas.microsoft.com/office/drawing/2018/hyperlinkcolor" xmlns:p15="http://schemas.microsoft.com/office/powerpoint/2012/main" xmlns:com="http://schemas.openxmlformats.org/drawingml/2006/compatibility" xmlns:pvml="urn:schemas-microsoft-com:office:powerpoint" xmlns:v="urn:schemas-microsoft-com:vml" xmlns:o="urn:schemas-microsoft-com:office:office" xmlns:dgm="http://schemas.openxmlformats.org/drawingml/2006/diagram" xmlns:c="http://schemas.openxmlformats.org/drawingml/2006/chart" xmlns:mv="urn:schemas-microsoft-com:mac:vml" xmlns="">
       <p:transition>
         <p:fade/>
       </p:transition>
@@ -8280,7 +8304,7 @@
         <p:fade/>
       </p:transition>
     </mc:Choice>
-    <mc:Fallback xmlns="" xmlns:mv="urn:schemas-microsoft-com:mac:vml" xmlns:c="http://schemas.openxmlformats.org/drawingml/2006/chart" xmlns:dgm="http://schemas.openxmlformats.org/drawingml/2006/diagram" xmlns:o="urn:schemas-microsoft-com:office:office" xmlns:v="urn:schemas-microsoft-com:vml" xmlns:pvml="urn:schemas-microsoft-com:office:powerpoint" xmlns:com="http://schemas.openxmlformats.org/drawingml/2006/compatibility" xmlns:p15="http://schemas.microsoft.com/office/powerpoint/2012/main" xmlns:ahyp="http://schemas.microsoft.com/office/drawing/2018/hyperlinkcolor">
+    <mc:Fallback xmlns:ahyp="http://schemas.microsoft.com/office/drawing/2018/hyperlinkcolor" xmlns:p15="http://schemas.microsoft.com/office/powerpoint/2012/main" xmlns:com="http://schemas.openxmlformats.org/drawingml/2006/compatibility" xmlns:pvml="urn:schemas-microsoft-com:office:powerpoint" xmlns:v="urn:schemas-microsoft-com:vml" xmlns:o="urn:schemas-microsoft-com:office:office" xmlns:dgm="http://schemas.openxmlformats.org/drawingml/2006/diagram" xmlns:c="http://schemas.openxmlformats.org/drawingml/2006/chart" xmlns:mv="urn:schemas-microsoft-com:mac:vml" xmlns="">
       <p:transition>
         <p:fade/>
       </p:transition>
@@ -10241,7 +10265,7 @@
               <a:rPr lang="en-US" sz="2000" dirty="0">
                 <a:latin typeface="Bahnschrift SemiBold" panose="020B0502040204020203" pitchFamily="34" charset="0"/>
               </a:rPr>
-              <a:t>PCA can compress large datasets into small representative eigenvectors</a:t>
+              <a:t>PCA can compress large datasets into small representative eigenvectors,</a:t>
             </a:r>
             <a:r>
               <a:rPr lang="en-US" sz="2000" dirty="0"/>
@@ -11264,7 +11288,7 @@
         <p:fade/>
       </p:transition>
     </mc:Choice>
-    <mc:Fallback xmlns="" xmlns:mv="urn:schemas-microsoft-com:mac:vml" xmlns:c="http://schemas.openxmlformats.org/drawingml/2006/chart" xmlns:dgm="http://schemas.openxmlformats.org/drawingml/2006/diagram" xmlns:o="urn:schemas-microsoft-com:office:office" xmlns:v="urn:schemas-microsoft-com:vml" xmlns:pvml="urn:schemas-microsoft-com:office:powerpoint" xmlns:com="http://schemas.openxmlformats.org/drawingml/2006/compatibility" xmlns:p15="http://schemas.microsoft.com/office/powerpoint/2012/main" xmlns:ahyp="http://schemas.microsoft.com/office/drawing/2018/hyperlinkcolor">
+    <mc:Fallback xmlns:ahyp="http://schemas.microsoft.com/office/drawing/2018/hyperlinkcolor" xmlns:p15="http://schemas.microsoft.com/office/powerpoint/2012/main" xmlns:com="http://schemas.openxmlformats.org/drawingml/2006/compatibility" xmlns:pvml="urn:schemas-microsoft-com:office:powerpoint" xmlns:v="urn:schemas-microsoft-com:vml" xmlns:o="urn:schemas-microsoft-com:office:office" xmlns:dgm="http://schemas.openxmlformats.org/drawingml/2006/diagram" xmlns:c="http://schemas.openxmlformats.org/drawingml/2006/chart" xmlns:mv="urn:schemas-microsoft-com:mac:vml" xmlns="">
       <p:transition>
         <p:fade/>
       </p:transition>
@@ -11533,7 +11557,7 @@
         <p:fade/>
       </p:transition>
     </mc:Choice>
-    <mc:Fallback xmlns="" xmlns:mv="urn:schemas-microsoft-com:mac:vml" xmlns:c="http://schemas.openxmlformats.org/drawingml/2006/chart" xmlns:dgm="http://schemas.openxmlformats.org/drawingml/2006/diagram" xmlns:o="urn:schemas-microsoft-com:office:office" xmlns:v="urn:schemas-microsoft-com:vml" xmlns:pvml="urn:schemas-microsoft-com:office:powerpoint" xmlns:com="http://schemas.openxmlformats.org/drawingml/2006/compatibility" xmlns:p15="http://schemas.microsoft.com/office/powerpoint/2012/main" xmlns:ahyp="http://schemas.microsoft.com/office/drawing/2018/hyperlinkcolor">
+    <mc:Fallback xmlns:ahyp="http://schemas.microsoft.com/office/drawing/2018/hyperlinkcolor" xmlns:p15="http://schemas.microsoft.com/office/powerpoint/2012/main" xmlns:com="http://schemas.openxmlformats.org/drawingml/2006/compatibility" xmlns:pvml="urn:schemas-microsoft-com:office:powerpoint" xmlns:v="urn:schemas-microsoft-com:vml" xmlns:o="urn:schemas-microsoft-com:office:office" xmlns:dgm="http://schemas.openxmlformats.org/drawingml/2006/diagram" xmlns:c="http://schemas.openxmlformats.org/drawingml/2006/chart" xmlns:mv="urn:schemas-microsoft-com:mac:vml" xmlns="">
       <p:transition>
         <p:fade/>
       </p:transition>

</xml_diff>